<commit_message>
Corrigida a apresentação do Rede Social Tagarelas
</commit_message>
<xml_diff>
--- a/docs/Portal Tagarelas - PPT.pptx
+++ b/docs/Portal Tagarelas - PPT.pptx
@@ -1,21 +1,22 @@
 
 <file path=ppt/presentation.xml><?xml version="1.0" encoding="utf-8"?>
-<p:presentation xmlns:a="http://schemas.openxmlformats.org/drawingml/2006/main" xmlns:r="http://schemas.openxmlformats.org/officeDocument/2006/relationships" xmlns:p="http://schemas.openxmlformats.org/presentationml/2006/main">
+<p:presentation xmlns:a="http://schemas.openxmlformats.org/drawingml/2006/main" xmlns:r="http://schemas.openxmlformats.org/officeDocument/2006/relationships" xmlns:p="http://schemas.openxmlformats.org/presentationml/2006/main" saveSubsetFonts="1">
   <p:sldMasterIdLst>
-    <p:sldMasterId id="2147483648" r:id="rId5"/>
+    <p:sldMasterId id="2147483648" r:id="rId1"/>
   </p:sldMasterIdLst>
   <p:notesMasterIdLst>
-    <p:notesMasterId r:id="rId7"/>
+    <p:notesMasterId r:id="rId11"/>
   </p:notesMasterIdLst>
   <p:sldIdLst>
-    <p:sldId id="256" r:id="rId8"/>
-    <p:sldId id="257" r:id="rId9"/>
-    <p:sldId id="258" r:id="rId10"/>
-    <p:sldId id="259" r:id="rId11"/>
-    <p:sldId id="260" r:id="rId12"/>
-    <p:sldId id="261" r:id="rId13"/>
-    <p:sldId id="262" r:id="rId14"/>
-    <p:sldId id="263" r:id="rId15"/>
+    <p:sldId id="256" r:id="rId2"/>
+    <p:sldId id="257" r:id="rId3"/>
+    <p:sldId id="258" r:id="rId4"/>
+    <p:sldId id="260" r:id="rId5"/>
+    <p:sldId id="261" r:id="rId6"/>
+    <p:sldId id="259" r:id="rId7"/>
+    <p:sldId id="262" r:id="rId8"/>
+    <p:sldId id="263" r:id="rId9"/>
+    <p:sldId id="264" r:id="rId10"/>
   </p:sldIdLst>
   <p:sldSz cx="13004800" cy="9753600"/>
   <p:notesSz cx="6858000" cy="9144000"/>
@@ -35,7 +36,7 @@
       <a:buFontTx/>
       <a:buNone/>
       <a:tabLst/>
-      <a:defRPr b="0" baseline="0" cap="none" i="0" spc="0" strike="noStrike" sz="1800" u="none" kumimoji="0" normalizeH="0">
+      <a:defRPr kumimoji="0" sz="1800" b="0" i="0" u="none" strike="noStrike" cap="none" spc="0" normalizeH="0" baseline="0">
         <a:ln>
           <a:noFill/>
         </a:ln>
@@ -61,7 +62,7 @@
       <a:buFontTx/>
       <a:buNone/>
       <a:tabLst/>
-      <a:defRPr b="0" baseline="0" cap="none" i="0" spc="0" strike="noStrike" sz="3600" u="none" kumimoji="0" normalizeH="0">
+      <a:defRPr kumimoji="0" sz="3600" b="0" i="0" u="none" strike="noStrike" cap="none" spc="0" normalizeH="0" baseline="0">
         <a:ln>
           <a:noFill/>
         </a:ln>
@@ -91,7 +92,7 @@
       <a:buFontTx/>
       <a:buNone/>
       <a:tabLst/>
-      <a:defRPr b="0" baseline="0" cap="none" i="0" spc="0" strike="noStrike" sz="3600" u="none" kumimoji="0" normalizeH="0">
+      <a:defRPr kumimoji="0" sz="3600" b="0" i="0" u="none" strike="noStrike" cap="none" spc="0" normalizeH="0" baseline="0">
         <a:ln>
           <a:noFill/>
         </a:ln>
@@ -121,7 +122,7 @@
       <a:buFontTx/>
       <a:buNone/>
       <a:tabLst/>
-      <a:defRPr b="0" baseline="0" cap="none" i="0" spc="0" strike="noStrike" sz="3600" u="none" kumimoji="0" normalizeH="0">
+      <a:defRPr kumimoji="0" sz="3600" b="0" i="0" u="none" strike="noStrike" cap="none" spc="0" normalizeH="0" baseline="0">
         <a:ln>
           <a:noFill/>
         </a:ln>
@@ -151,7 +152,7 @@
       <a:buFontTx/>
       <a:buNone/>
       <a:tabLst/>
-      <a:defRPr b="0" baseline="0" cap="none" i="0" spc="0" strike="noStrike" sz="3600" u="none" kumimoji="0" normalizeH="0">
+      <a:defRPr kumimoji="0" sz="3600" b="0" i="0" u="none" strike="noStrike" cap="none" spc="0" normalizeH="0" baseline="0">
         <a:ln>
           <a:noFill/>
         </a:ln>
@@ -181,7 +182,7 @@
       <a:buFontTx/>
       <a:buNone/>
       <a:tabLst/>
-      <a:defRPr b="0" baseline="0" cap="none" i="0" spc="0" strike="noStrike" sz="3600" u="none" kumimoji="0" normalizeH="0">
+      <a:defRPr kumimoji="0" sz="3600" b="0" i="0" u="none" strike="noStrike" cap="none" spc="0" normalizeH="0" baseline="0">
         <a:ln>
           <a:noFill/>
         </a:ln>
@@ -211,7 +212,7 @@
       <a:buFontTx/>
       <a:buNone/>
       <a:tabLst/>
-      <a:defRPr b="0" baseline="0" cap="none" i="0" spc="0" strike="noStrike" sz="3600" u="none" kumimoji="0" normalizeH="0">
+      <a:defRPr kumimoji="0" sz="3600" b="0" i="0" u="none" strike="noStrike" cap="none" spc="0" normalizeH="0" baseline="0">
         <a:ln>
           <a:noFill/>
         </a:ln>
@@ -241,7 +242,7 @@
       <a:buFontTx/>
       <a:buNone/>
       <a:tabLst/>
-      <a:defRPr b="0" baseline="0" cap="none" i="0" spc="0" strike="noStrike" sz="3600" u="none" kumimoji="0" normalizeH="0">
+      <a:defRPr kumimoji="0" sz="3600" b="0" i="0" u="none" strike="noStrike" cap="none" spc="0" normalizeH="0" baseline="0">
         <a:ln>
           <a:noFill/>
         </a:ln>
@@ -271,7 +272,7 @@
       <a:buFontTx/>
       <a:buNone/>
       <a:tabLst/>
-      <a:defRPr b="0" baseline="0" cap="none" i="0" spc="0" strike="noStrike" sz="3600" u="none" kumimoji="0" normalizeH="0">
+      <a:defRPr kumimoji="0" sz="3600" b="0" i="0" u="none" strike="noStrike" cap="none" spc="0" normalizeH="0" baseline="0">
         <a:ln>
           <a:noFill/>
         </a:ln>
@@ -301,7 +302,7 @@
       <a:buFontTx/>
       <a:buNone/>
       <a:tabLst/>
-      <a:defRPr b="0" baseline="0" cap="none" i="0" spc="0" strike="noStrike" sz="3600" u="none" kumimoji="0" normalizeH="0">
+      <a:defRPr kumimoji="0" sz="3600" b="0" i="0" u="none" strike="noStrike" cap="none" spc="0" normalizeH="0" baseline="0">
         <a:ln>
           <a:noFill/>
         </a:ln>
@@ -320,13 +321,14 @@
 </p:presentation>
 </file>
 
-<file path=ppt/commentAuthors.xml><?xml version="1.0" encoding="utf-8"?>
-<p:cmAuthorLst xmlns:a="http://schemas.openxmlformats.org/drawingml/2006/main" xmlns:r="http://schemas.openxmlformats.org/officeDocument/2006/relationships" xmlns:p="http://schemas.openxmlformats.org/presentationml/2006/main"/>
-</file>
-
 <file path=ppt/notesMasters/notesMaster1.xml><?xml version="1.0" encoding="utf-8"?>
 <p:notesMaster xmlns:a="http://schemas.openxmlformats.org/drawingml/2006/main" xmlns:r="http://schemas.openxmlformats.org/officeDocument/2006/relationships" xmlns:p="http://schemas.openxmlformats.org/presentationml/2006/main">
   <p:cSld>
+    <p:bg>
+      <p:bgRef idx="1001">
+        <a:schemeClr val="bg1"/>
+      </p:bgRef>
+    </p:bg>
     <p:spTree>
       <p:nvGrpSpPr>
         <p:cNvPr id="1" name=""/>
@@ -344,7 +346,9 @@
       <p:sp>
         <p:nvSpPr>
           <p:cNvPr id="116" name="Shape 116"/>
-          <p:cNvSpPr/>
+          <p:cNvSpPr>
+            <a:spLocks noGrp="1" noRot="1" noChangeAspect="1"/>
+          </p:cNvSpPr>
           <p:nvPr>
             <p:ph type="sldImg"/>
           </p:nvPr>
@@ -362,14 +366,16 @@
           <a:bodyPr/>
           <a:lstStyle/>
           <a:p>
-            <a:pPr/>
+            <a:endParaRPr/>
           </a:p>
         </p:txBody>
       </p:sp>
       <p:sp>
         <p:nvSpPr>
           <p:cNvPr id="117" name="Shape 117"/>
-          <p:cNvSpPr/>
+          <p:cNvSpPr>
+            <a:spLocks noGrp="1"/>
+          </p:cNvSpPr>
           <p:nvPr>
             <p:ph type="body" sz="quarter" idx="1"/>
           </p:nvPr>
@@ -387,7 +393,7 @@
           <a:bodyPr/>
           <a:lstStyle/>
           <a:p>
-            <a:pPr/>
+            <a:endParaRPr/>
           </a:p>
         </p:txBody>
       </p:sp>
@@ -499,7 +505,7 @@
 </file>
 
 <file path=ppt/slideLayouts/slideLayout1.xml><?xml version="1.0" encoding="utf-8"?>
-<p:sldLayout xmlns:a="http://schemas.openxmlformats.org/drawingml/2006/main" xmlns:r="http://schemas.openxmlformats.org/officeDocument/2006/relationships" xmlns:p="http://schemas.openxmlformats.org/presentationml/2006/main" type="title" showMasterSp="1" showMasterPhAnim="1">
+<p:sldLayout xmlns:a="http://schemas.openxmlformats.org/drawingml/2006/main" xmlns:r="http://schemas.openxmlformats.org/officeDocument/2006/relationships" xmlns:p="http://schemas.openxmlformats.org/presentationml/2006/main" type="title">
   <p:cSld name="Título e Subtítulo">
     <p:spTree>
       <p:nvGrpSpPr>
@@ -518,7 +524,9 @@
       <p:sp>
         <p:nvSpPr>
           <p:cNvPr id="11" name="Shape 11"/>
-          <p:cNvSpPr/>
+          <p:cNvSpPr>
+            <a:spLocks noGrp="1"/>
+          </p:cNvSpPr>
           <p:nvPr>
             <p:ph type="title"/>
           </p:nvPr>
@@ -536,7 +544,6 @@
           <a:bodyPr anchor="b"/>
           <a:lstStyle/>
           <a:p>
-            <a:pPr/>
             <a:r>
               <a:t>Texto do Título</a:t>
             </a:r>
@@ -546,7 +553,9 @@
       <p:sp>
         <p:nvSpPr>
           <p:cNvPr id="12" name="Shape 12"/>
-          <p:cNvSpPr/>
+          <p:cNvSpPr>
+            <a:spLocks noGrp="1"/>
+          </p:cNvSpPr>
           <p:nvPr>
             <p:ph type="body" sz="quarter" idx="1"/>
           </p:nvPr>
@@ -605,7 +614,6 @@
             </a:lvl5pPr>
           </a:lstStyle>
           <a:p>
-            <a:pPr/>
             <a:r>
               <a:t>Nível de Corpo Um</a:t>
             </a:r>
@@ -639,7 +647,9 @@
       <p:sp>
         <p:nvSpPr>
           <p:cNvPr id="13" name="Shape 13"/>
-          <p:cNvSpPr/>
+          <p:cNvSpPr>
+            <a:spLocks noGrp="1"/>
+          </p:cNvSpPr>
           <p:nvPr>
             <p:ph type="sldNum" sz="quarter" idx="2"/>
           </p:nvPr>
@@ -653,8 +663,10 @@
           <a:bodyPr/>
           <a:lstStyle/>
           <a:p>
-            <a:pPr/>
-            <a:fld id="{86CB4B4D-7CA3-9044-876B-883B54F8677D}" type="slidenum"/>
+            <a:fld id="{86CB4B4D-7CA3-9044-876B-883B54F8677D}" type="slidenum">
+              <a:t>‹n.º›</a:t>
+            </a:fld>
+            <a:endParaRPr/>
           </a:p>
         </p:txBody>
       </p:sp>
@@ -663,12 +675,12 @@
   <p:clrMapOvr>
     <a:masterClrMapping/>
   </p:clrMapOvr>
-  <p:transition xmlns:p14="http://schemas.microsoft.com/office/powerpoint/2010/main" spd="med" advClick="1"/>
+  <p:transition spd="med"/>
 </p:sldLayout>
 </file>
 
 <file path=ppt/slideLayouts/slideLayout10.xml><?xml version="1.0" encoding="utf-8"?>
-<p:sldLayout xmlns:a="http://schemas.openxmlformats.org/drawingml/2006/main" xmlns:r="http://schemas.openxmlformats.org/officeDocument/2006/relationships" xmlns:p="http://schemas.openxmlformats.org/presentationml/2006/main" type="tx" showMasterSp="1" showMasterPhAnim="1">
+<p:sldLayout xmlns:a="http://schemas.openxmlformats.org/drawingml/2006/main" xmlns:r="http://schemas.openxmlformats.org/officeDocument/2006/relationships" xmlns:p="http://schemas.openxmlformats.org/presentationml/2006/main" type="tx">
   <p:cSld name="Citação">
     <p:spTree>
       <p:nvGrpSpPr>
@@ -687,7 +699,9 @@
       <p:sp>
         <p:nvSpPr>
           <p:cNvPr id="93" name="Shape 93"/>
-          <p:cNvSpPr/>
+          <p:cNvSpPr>
+            <a:spLocks noGrp="1"/>
+          </p:cNvSpPr>
           <p:nvPr>
             <p:ph type="body" sz="quarter" idx="13"/>
           </p:nvPr>
@@ -721,7 +735,6 @@
             </a:lvl1pPr>
           </a:lstStyle>
           <a:p>
-            <a:pPr/>
             <a:r>
               <a:t>–Jaime Silveira</a:t>
             </a:r>
@@ -731,7 +744,9 @@
       <p:sp>
         <p:nvSpPr>
           <p:cNvPr id="94" name="Shape 94"/>
-          <p:cNvSpPr/>
+          <p:cNvSpPr>
+            <a:spLocks noGrp="1"/>
+          </p:cNvSpPr>
           <p:nvPr>
             <p:ph type="body" sz="quarter" idx="14"/>
           </p:nvPr>
@@ -760,7 +775,6 @@
             </a:lvl1pPr>
           </a:lstStyle>
           <a:p>
-            <a:pPr/>
             <a:r>
               <a:t>“Digite uma citação aqui.” </a:t>
             </a:r>
@@ -770,7 +784,9 @@
       <p:sp>
         <p:nvSpPr>
           <p:cNvPr id="95" name="Shape 95"/>
-          <p:cNvSpPr/>
+          <p:cNvSpPr>
+            <a:spLocks noGrp="1"/>
+          </p:cNvSpPr>
           <p:nvPr>
             <p:ph type="sldNum" sz="quarter" idx="2"/>
           </p:nvPr>
@@ -784,8 +800,10 @@
           <a:bodyPr/>
           <a:lstStyle/>
           <a:p>
-            <a:pPr/>
-            <a:fld id="{86CB4B4D-7CA3-9044-876B-883B54F8677D}" type="slidenum"/>
+            <a:fld id="{86CB4B4D-7CA3-9044-876B-883B54F8677D}" type="slidenum">
+              <a:t>‹n.º›</a:t>
+            </a:fld>
+            <a:endParaRPr/>
           </a:p>
         </p:txBody>
       </p:sp>
@@ -794,12 +812,12 @@
   <p:clrMapOvr>
     <a:masterClrMapping/>
   </p:clrMapOvr>
-  <p:transition xmlns:p14="http://schemas.microsoft.com/office/powerpoint/2010/main" spd="med" advClick="1"/>
+  <p:transition spd="med"/>
 </p:sldLayout>
 </file>
 
 <file path=ppt/slideLayouts/slideLayout11.xml><?xml version="1.0" encoding="utf-8"?>
-<p:sldLayout xmlns:a="http://schemas.openxmlformats.org/drawingml/2006/main" xmlns:r="http://schemas.openxmlformats.org/officeDocument/2006/relationships" xmlns:p="http://schemas.openxmlformats.org/presentationml/2006/main" type="tx" showMasterSp="1" showMasterPhAnim="1">
+<p:sldLayout xmlns:a="http://schemas.openxmlformats.org/drawingml/2006/main" xmlns:r="http://schemas.openxmlformats.org/officeDocument/2006/relationships" xmlns:p="http://schemas.openxmlformats.org/presentationml/2006/main" type="tx">
   <p:cSld name="Foto">
     <p:spTree>
       <p:nvGrpSpPr>
@@ -818,7 +836,9 @@
       <p:sp>
         <p:nvSpPr>
           <p:cNvPr id="102" name="Shape 102"/>
-          <p:cNvSpPr/>
+          <p:cNvSpPr>
+            <a:spLocks noGrp="1"/>
+          </p:cNvSpPr>
           <p:nvPr>
             <p:ph type="pic" idx="13"/>
           </p:nvPr>
@@ -838,14 +858,16 @@
           </a:bodyPr>
           <a:lstStyle/>
           <a:p>
-            <a:pPr/>
+            <a:endParaRPr/>
           </a:p>
         </p:txBody>
       </p:sp>
       <p:sp>
         <p:nvSpPr>
           <p:cNvPr id="103" name="Shape 103"/>
-          <p:cNvSpPr/>
+          <p:cNvSpPr>
+            <a:spLocks noGrp="1"/>
+          </p:cNvSpPr>
           <p:nvPr>
             <p:ph type="sldNum" sz="quarter" idx="2"/>
           </p:nvPr>
@@ -859,8 +881,10 @@
           <a:bodyPr/>
           <a:lstStyle/>
           <a:p>
-            <a:pPr/>
-            <a:fld id="{86CB4B4D-7CA3-9044-876B-883B54F8677D}" type="slidenum"/>
+            <a:fld id="{86CB4B4D-7CA3-9044-876B-883B54F8677D}" type="slidenum">
+              <a:t>‹n.º›</a:t>
+            </a:fld>
+            <a:endParaRPr/>
           </a:p>
         </p:txBody>
       </p:sp>
@@ -869,12 +893,12 @@
   <p:clrMapOvr>
     <a:masterClrMapping/>
   </p:clrMapOvr>
-  <p:transition xmlns:p14="http://schemas.microsoft.com/office/powerpoint/2010/main" spd="med" advClick="1"/>
+  <p:transition spd="med"/>
 </p:sldLayout>
 </file>
 
 <file path=ppt/slideLayouts/slideLayout12.xml><?xml version="1.0" encoding="utf-8"?>
-<p:sldLayout xmlns:a="http://schemas.openxmlformats.org/drawingml/2006/main" xmlns:r="http://schemas.openxmlformats.org/officeDocument/2006/relationships" xmlns:p="http://schemas.openxmlformats.org/presentationml/2006/main" type="tx" showMasterSp="1" showMasterPhAnim="1">
+<p:sldLayout xmlns:a="http://schemas.openxmlformats.org/drawingml/2006/main" xmlns:r="http://schemas.openxmlformats.org/officeDocument/2006/relationships" xmlns:p="http://schemas.openxmlformats.org/presentationml/2006/main" type="tx">
   <p:cSld name="Em Branco">
     <p:spTree>
       <p:nvGrpSpPr>
@@ -893,7 +917,9 @@
       <p:sp>
         <p:nvSpPr>
           <p:cNvPr id="110" name="Shape 110"/>
-          <p:cNvSpPr/>
+          <p:cNvSpPr>
+            <a:spLocks noGrp="1"/>
+          </p:cNvSpPr>
           <p:nvPr>
             <p:ph type="sldNum" sz="quarter" idx="2"/>
           </p:nvPr>
@@ -907,8 +933,10 @@
           <a:bodyPr/>
           <a:lstStyle/>
           <a:p>
-            <a:pPr/>
-            <a:fld id="{86CB4B4D-7CA3-9044-876B-883B54F8677D}" type="slidenum"/>
+            <a:fld id="{86CB4B4D-7CA3-9044-876B-883B54F8677D}" type="slidenum">
+              <a:t>‹n.º›</a:t>
+            </a:fld>
+            <a:endParaRPr/>
           </a:p>
         </p:txBody>
       </p:sp>
@@ -917,12 +945,12 @@
   <p:clrMapOvr>
     <a:masterClrMapping/>
   </p:clrMapOvr>
-  <p:transition xmlns:p14="http://schemas.microsoft.com/office/powerpoint/2010/main" spd="med" advClick="1"/>
+  <p:transition spd="med"/>
 </p:sldLayout>
 </file>
 
 <file path=ppt/slideLayouts/slideLayout2.xml><?xml version="1.0" encoding="utf-8"?>
-<p:sldLayout xmlns:a="http://schemas.openxmlformats.org/drawingml/2006/main" xmlns:r="http://schemas.openxmlformats.org/officeDocument/2006/relationships" xmlns:p="http://schemas.openxmlformats.org/presentationml/2006/main" type="tx" showMasterSp="1" showMasterPhAnim="1">
+<p:sldLayout xmlns:a="http://schemas.openxmlformats.org/drawingml/2006/main" xmlns:r="http://schemas.openxmlformats.org/officeDocument/2006/relationships" xmlns:p="http://schemas.openxmlformats.org/presentationml/2006/main" type="tx">
   <p:cSld name="Foto - Horizontal">
     <p:spTree>
       <p:nvGrpSpPr>
@@ -941,7 +969,9 @@
       <p:sp>
         <p:nvSpPr>
           <p:cNvPr id="20" name="Shape 20"/>
-          <p:cNvSpPr/>
+          <p:cNvSpPr>
+            <a:spLocks noGrp="1"/>
+          </p:cNvSpPr>
           <p:nvPr>
             <p:ph type="pic" idx="13"/>
           </p:nvPr>
@@ -961,14 +991,16 @@
           </a:bodyPr>
           <a:lstStyle/>
           <a:p>
-            <a:pPr/>
+            <a:endParaRPr/>
           </a:p>
         </p:txBody>
       </p:sp>
       <p:sp>
         <p:nvSpPr>
           <p:cNvPr id="21" name="Shape 21"/>
-          <p:cNvSpPr/>
+          <p:cNvSpPr>
+            <a:spLocks noGrp="1"/>
+          </p:cNvSpPr>
           <p:nvPr>
             <p:ph type="title"/>
           </p:nvPr>
@@ -986,7 +1018,6 @@
           <a:bodyPr anchor="b"/>
           <a:lstStyle/>
           <a:p>
-            <a:pPr/>
             <a:r>
               <a:t>Texto do Título</a:t>
             </a:r>
@@ -996,7 +1027,9 @@
       <p:sp>
         <p:nvSpPr>
           <p:cNvPr id="22" name="Shape 22"/>
-          <p:cNvSpPr/>
+          <p:cNvSpPr>
+            <a:spLocks noGrp="1"/>
+          </p:cNvSpPr>
           <p:nvPr>
             <p:ph type="body" sz="quarter" idx="1"/>
           </p:nvPr>
@@ -1055,7 +1088,6 @@
             </a:lvl5pPr>
           </a:lstStyle>
           <a:p>
-            <a:pPr/>
             <a:r>
               <a:t>Nível de Corpo Um</a:t>
             </a:r>
@@ -1089,7 +1121,9 @@
       <p:sp>
         <p:nvSpPr>
           <p:cNvPr id="23" name="Shape 23"/>
-          <p:cNvSpPr/>
+          <p:cNvSpPr>
+            <a:spLocks noGrp="1"/>
+          </p:cNvSpPr>
           <p:nvPr>
             <p:ph type="sldNum" sz="quarter" idx="2"/>
           </p:nvPr>
@@ -1107,8 +1141,10 @@
           <a:bodyPr/>
           <a:lstStyle/>
           <a:p>
-            <a:pPr/>
-            <a:fld id="{86CB4B4D-7CA3-9044-876B-883B54F8677D}" type="slidenum"/>
+            <a:fld id="{86CB4B4D-7CA3-9044-876B-883B54F8677D}" type="slidenum">
+              <a:t>‹n.º›</a:t>
+            </a:fld>
+            <a:endParaRPr/>
           </a:p>
         </p:txBody>
       </p:sp>
@@ -1117,12 +1153,12 @@
   <p:clrMapOvr>
     <a:masterClrMapping/>
   </p:clrMapOvr>
-  <p:transition xmlns:p14="http://schemas.microsoft.com/office/powerpoint/2010/main" spd="med" advClick="1"/>
+  <p:transition spd="med"/>
 </p:sldLayout>
 </file>
 
 <file path=ppt/slideLayouts/slideLayout3.xml><?xml version="1.0" encoding="utf-8"?>
-<p:sldLayout xmlns:a="http://schemas.openxmlformats.org/drawingml/2006/main" xmlns:r="http://schemas.openxmlformats.org/officeDocument/2006/relationships" xmlns:p="http://schemas.openxmlformats.org/presentationml/2006/main" type="tx" showMasterSp="1" showMasterPhAnim="1">
+<p:sldLayout xmlns:a="http://schemas.openxmlformats.org/drawingml/2006/main" xmlns:r="http://schemas.openxmlformats.org/officeDocument/2006/relationships" xmlns:p="http://schemas.openxmlformats.org/presentationml/2006/main" type="tx">
   <p:cSld name="Título - Centro">
     <p:spTree>
       <p:nvGrpSpPr>
@@ -1141,7 +1177,9 @@
       <p:sp>
         <p:nvSpPr>
           <p:cNvPr id="30" name="Shape 30"/>
-          <p:cNvSpPr/>
+          <p:cNvSpPr>
+            <a:spLocks noGrp="1"/>
+          </p:cNvSpPr>
           <p:nvPr>
             <p:ph type="title"/>
           </p:nvPr>
@@ -1159,7 +1197,6 @@
           <a:bodyPr/>
           <a:lstStyle/>
           <a:p>
-            <a:pPr/>
             <a:r>
               <a:t>Texto do Título</a:t>
             </a:r>
@@ -1169,7 +1206,9 @@
       <p:sp>
         <p:nvSpPr>
           <p:cNvPr id="31" name="Shape 31"/>
-          <p:cNvSpPr/>
+          <p:cNvSpPr>
+            <a:spLocks noGrp="1"/>
+          </p:cNvSpPr>
           <p:nvPr>
             <p:ph type="sldNum" sz="quarter" idx="2"/>
           </p:nvPr>
@@ -1183,8 +1222,10 @@
           <a:bodyPr/>
           <a:lstStyle/>
           <a:p>
-            <a:pPr/>
-            <a:fld id="{86CB4B4D-7CA3-9044-876B-883B54F8677D}" type="slidenum"/>
+            <a:fld id="{86CB4B4D-7CA3-9044-876B-883B54F8677D}" type="slidenum">
+              <a:t>‹n.º›</a:t>
+            </a:fld>
+            <a:endParaRPr/>
           </a:p>
         </p:txBody>
       </p:sp>
@@ -1193,12 +1234,12 @@
   <p:clrMapOvr>
     <a:masterClrMapping/>
   </p:clrMapOvr>
-  <p:transition xmlns:p14="http://schemas.microsoft.com/office/powerpoint/2010/main" spd="med" advClick="1"/>
+  <p:transition spd="med"/>
 </p:sldLayout>
 </file>
 
 <file path=ppt/slideLayouts/slideLayout4.xml><?xml version="1.0" encoding="utf-8"?>
-<p:sldLayout xmlns:a="http://schemas.openxmlformats.org/drawingml/2006/main" xmlns:r="http://schemas.openxmlformats.org/officeDocument/2006/relationships" xmlns:p="http://schemas.openxmlformats.org/presentationml/2006/main" type="tx" showMasterSp="1" showMasterPhAnim="1">
+<p:sldLayout xmlns:a="http://schemas.openxmlformats.org/drawingml/2006/main" xmlns:r="http://schemas.openxmlformats.org/officeDocument/2006/relationships" xmlns:p="http://schemas.openxmlformats.org/presentationml/2006/main" type="tx">
   <p:cSld name="Foto - Vertical">
     <p:spTree>
       <p:nvGrpSpPr>
@@ -1217,7 +1258,9 @@
       <p:sp>
         <p:nvSpPr>
           <p:cNvPr id="38" name="Shape 38"/>
-          <p:cNvSpPr/>
+          <p:cNvSpPr>
+            <a:spLocks noGrp="1"/>
+          </p:cNvSpPr>
           <p:nvPr>
             <p:ph type="pic" sz="half" idx="13"/>
           </p:nvPr>
@@ -1237,14 +1280,16 @@
           </a:bodyPr>
           <a:lstStyle/>
           <a:p>
-            <a:pPr/>
+            <a:endParaRPr/>
           </a:p>
         </p:txBody>
       </p:sp>
       <p:sp>
         <p:nvSpPr>
           <p:cNvPr id="39" name="Shape 39"/>
-          <p:cNvSpPr/>
+          <p:cNvSpPr>
+            <a:spLocks noGrp="1"/>
+          </p:cNvSpPr>
           <p:nvPr>
             <p:ph type="title"/>
           </p:nvPr>
@@ -1266,7 +1311,6 @@
             </a:lvl1pPr>
           </a:lstStyle>
           <a:p>
-            <a:pPr/>
             <a:r>
               <a:t>Texto do Título</a:t>
             </a:r>
@@ -1276,7 +1320,9 @@
       <p:sp>
         <p:nvSpPr>
           <p:cNvPr id="40" name="Shape 40"/>
-          <p:cNvSpPr/>
+          <p:cNvSpPr>
+            <a:spLocks noGrp="1"/>
+          </p:cNvSpPr>
           <p:nvPr>
             <p:ph type="body" sz="quarter" idx="1"/>
           </p:nvPr>
@@ -1335,7 +1381,6 @@
             </a:lvl5pPr>
           </a:lstStyle>
           <a:p>
-            <a:pPr/>
             <a:r>
               <a:t>Nível de Corpo Um</a:t>
             </a:r>
@@ -1369,7 +1414,9 @@
       <p:sp>
         <p:nvSpPr>
           <p:cNvPr id="41" name="Shape 41"/>
-          <p:cNvSpPr/>
+          <p:cNvSpPr>
+            <a:spLocks noGrp="1"/>
+          </p:cNvSpPr>
           <p:nvPr>
             <p:ph type="sldNum" sz="quarter" idx="2"/>
           </p:nvPr>
@@ -1383,8 +1430,10 @@
           <a:bodyPr/>
           <a:lstStyle/>
           <a:p>
-            <a:pPr/>
-            <a:fld id="{86CB4B4D-7CA3-9044-876B-883B54F8677D}" type="slidenum"/>
+            <a:fld id="{86CB4B4D-7CA3-9044-876B-883B54F8677D}" type="slidenum">
+              <a:t>‹n.º›</a:t>
+            </a:fld>
+            <a:endParaRPr/>
           </a:p>
         </p:txBody>
       </p:sp>
@@ -1393,12 +1442,12 @@
   <p:clrMapOvr>
     <a:masterClrMapping/>
   </p:clrMapOvr>
-  <p:transition xmlns:p14="http://schemas.microsoft.com/office/powerpoint/2010/main" spd="med" advClick="1"/>
+  <p:transition spd="med"/>
 </p:sldLayout>
 </file>
 
 <file path=ppt/slideLayouts/slideLayout5.xml><?xml version="1.0" encoding="utf-8"?>
-<p:sldLayout xmlns:a="http://schemas.openxmlformats.org/drawingml/2006/main" xmlns:r="http://schemas.openxmlformats.org/officeDocument/2006/relationships" xmlns:p="http://schemas.openxmlformats.org/presentationml/2006/main" type="tx" showMasterSp="1" showMasterPhAnim="1">
+<p:sldLayout xmlns:a="http://schemas.openxmlformats.org/drawingml/2006/main" xmlns:r="http://schemas.openxmlformats.org/officeDocument/2006/relationships" xmlns:p="http://schemas.openxmlformats.org/presentationml/2006/main" type="tx">
   <p:cSld name="Título - Superior">
     <p:spTree>
       <p:nvGrpSpPr>
@@ -1417,7 +1466,9 @@
       <p:sp>
         <p:nvSpPr>
           <p:cNvPr id="48" name="Shape 48"/>
-          <p:cNvSpPr/>
+          <p:cNvSpPr>
+            <a:spLocks noGrp="1"/>
+          </p:cNvSpPr>
           <p:nvPr>
             <p:ph type="title"/>
           </p:nvPr>
@@ -1431,7 +1482,6 @@
           <a:bodyPr/>
           <a:lstStyle/>
           <a:p>
-            <a:pPr/>
             <a:r>
               <a:t>Texto do Título</a:t>
             </a:r>
@@ -1441,7 +1491,9 @@
       <p:sp>
         <p:nvSpPr>
           <p:cNvPr id="49" name="Shape 49"/>
-          <p:cNvSpPr/>
+          <p:cNvSpPr>
+            <a:spLocks noGrp="1"/>
+          </p:cNvSpPr>
           <p:nvPr>
             <p:ph type="sldNum" sz="quarter" idx="2"/>
           </p:nvPr>
@@ -1455,8 +1507,10 @@
           <a:bodyPr/>
           <a:lstStyle/>
           <a:p>
-            <a:pPr/>
-            <a:fld id="{86CB4B4D-7CA3-9044-876B-883B54F8677D}" type="slidenum"/>
+            <a:fld id="{86CB4B4D-7CA3-9044-876B-883B54F8677D}" type="slidenum">
+              <a:t>‹n.º›</a:t>
+            </a:fld>
+            <a:endParaRPr/>
           </a:p>
         </p:txBody>
       </p:sp>
@@ -1465,12 +1519,12 @@
   <p:clrMapOvr>
     <a:masterClrMapping/>
   </p:clrMapOvr>
-  <p:transition xmlns:p14="http://schemas.microsoft.com/office/powerpoint/2010/main" spd="med" advClick="1"/>
+  <p:transition spd="med"/>
 </p:sldLayout>
 </file>
 
 <file path=ppt/slideLayouts/slideLayout6.xml><?xml version="1.0" encoding="utf-8"?>
-<p:sldLayout xmlns:a="http://schemas.openxmlformats.org/drawingml/2006/main" xmlns:r="http://schemas.openxmlformats.org/officeDocument/2006/relationships" xmlns:p="http://schemas.openxmlformats.org/presentationml/2006/main" type="tx" showMasterSp="1" showMasterPhAnim="1">
+<p:sldLayout xmlns:a="http://schemas.openxmlformats.org/drawingml/2006/main" xmlns:r="http://schemas.openxmlformats.org/officeDocument/2006/relationships" xmlns:p="http://schemas.openxmlformats.org/presentationml/2006/main" type="tx">
   <p:cSld name="Título e Marcadores">
     <p:spTree>
       <p:nvGrpSpPr>
@@ -1489,7 +1543,9 @@
       <p:sp>
         <p:nvSpPr>
           <p:cNvPr id="56" name="Shape 56"/>
-          <p:cNvSpPr/>
+          <p:cNvSpPr>
+            <a:spLocks noGrp="1"/>
+          </p:cNvSpPr>
           <p:nvPr>
             <p:ph type="title"/>
           </p:nvPr>
@@ -1503,7 +1559,6 @@
           <a:bodyPr/>
           <a:lstStyle/>
           <a:p>
-            <a:pPr/>
             <a:r>
               <a:t>Texto do Título</a:t>
             </a:r>
@@ -1513,7 +1568,9 @@
       <p:sp>
         <p:nvSpPr>
           <p:cNvPr id="57" name="Shape 57"/>
-          <p:cNvSpPr/>
+          <p:cNvSpPr>
+            <a:spLocks noGrp="1"/>
+          </p:cNvSpPr>
           <p:nvPr>
             <p:ph type="body" idx="1"/>
           </p:nvPr>
@@ -1527,7 +1584,6 @@
           <a:bodyPr/>
           <a:lstStyle/>
           <a:p>
-            <a:pPr/>
             <a:r>
               <a:t>Nível de Corpo Um</a:t>
             </a:r>
@@ -1561,7 +1617,9 @@
       <p:sp>
         <p:nvSpPr>
           <p:cNvPr id="58" name="Shape 58"/>
-          <p:cNvSpPr/>
+          <p:cNvSpPr>
+            <a:spLocks noGrp="1"/>
+          </p:cNvSpPr>
           <p:nvPr>
             <p:ph type="sldNum" sz="quarter" idx="2"/>
           </p:nvPr>
@@ -1575,8 +1633,10 @@
           <a:bodyPr/>
           <a:lstStyle/>
           <a:p>
-            <a:pPr/>
-            <a:fld id="{86CB4B4D-7CA3-9044-876B-883B54F8677D}" type="slidenum"/>
+            <a:fld id="{86CB4B4D-7CA3-9044-876B-883B54F8677D}" type="slidenum">
+              <a:t>‹n.º›</a:t>
+            </a:fld>
+            <a:endParaRPr/>
           </a:p>
         </p:txBody>
       </p:sp>
@@ -1585,12 +1645,12 @@
   <p:clrMapOvr>
     <a:masterClrMapping/>
   </p:clrMapOvr>
-  <p:transition xmlns:p14="http://schemas.microsoft.com/office/powerpoint/2010/main" spd="med" advClick="1"/>
+  <p:transition spd="med"/>
 </p:sldLayout>
 </file>
 
 <file path=ppt/slideLayouts/slideLayout7.xml><?xml version="1.0" encoding="utf-8"?>
-<p:sldLayout xmlns:a="http://schemas.openxmlformats.org/drawingml/2006/main" xmlns:r="http://schemas.openxmlformats.org/officeDocument/2006/relationships" xmlns:p="http://schemas.openxmlformats.org/presentationml/2006/main" type="tx" showMasterSp="1" showMasterPhAnim="1">
+<p:sldLayout xmlns:a="http://schemas.openxmlformats.org/drawingml/2006/main" xmlns:r="http://schemas.openxmlformats.org/officeDocument/2006/relationships" xmlns:p="http://schemas.openxmlformats.org/presentationml/2006/main" type="tx">
   <p:cSld name="Título, Marcadores e Foto">
     <p:spTree>
       <p:nvGrpSpPr>
@@ -1609,7 +1669,9 @@
       <p:sp>
         <p:nvSpPr>
           <p:cNvPr id="65" name="Shape 65"/>
-          <p:cNvSpPr/>
+          <p:cNvSpPr>
+            <a:spLocks noGrp="1"/>
+          </p:cNvSpPr>
           <p:nvPr>
             <p:ph type="pic" sz="half" idx="13"/>
           </p:nvPr>
@@ -1629,14 +1691,16 @@
           </a:bodyPr>
           <a:lstStyle/>
           <a:p>
-            <a:pPr/>
+            <a:endParaRPr/>
           </a:p>
         </p:txBody>
       </p:sp>
       <p:sp>
         <p:nvSpPr>
           <p:cNvPr id="66" name="Shape 66"/>
-          <p:cNvSpPr/>
+          <p:cNvSpPr>
+            <a:spLocks noGrp="1"/>
+          </p:cNvSpPr>
           <p:nvPr>
             <p:ph type="title"/>
           </p:nvPr>
@@ -1650,7 +1714,6 @@
           <a:bodyPr/>
           <a:lstStyle/>
           <a:p>
-            <a:pPr/>
             <a:r>
               <a:t>Texto do Título</a:t>
             </a:r>
@@ -1660,7 +1723,9 @@
       <p:sp>
         <p:nvSpPr>
           <p:cNvPr id="67" name="Shape 67"/>
-          <p:cNvSpPr/>
+          <p:cNvSpPr>
+            <a:spLocks noGrp="1"/>
+          </p:cNvSpPr>
           <p:nvPr>
             <p:ph type="body" sz="half" idx="1"/>
           </p:nvPr>
@@ -1709,7 +1774,6 @@
             </a:lvl5pPr>
           </a:lstStyle>
           <a:p>
-            <a:pPr/>
             <a:r>
               <a:t>Nível de Corpo Um</a:t>
             </a:r>
@@ -1743,7 +1807,9 @@
       <p:sp>
         <p:nvSpPr>
           <p:cNvPr id="68" name="Shape 68"/>
-          <p:cNvSpPr/>
+          <p:cNvSpPr>
+            <a:spLocks noGrp="1"/>
+          </p:cNvSpPr>
           <p:nvPr>
             <p:ph type="sldNum" sz="quarter" idx="2"/>
           </p:nvPr>
@@ -1757,8 +1823,10 @@
           <a:bodyPr/>
           <a:lstStyle/>
           <a:p>
-            <a:pPr/>
-            <a:fld id="{86CB4B4D-7CA3-9044-876B-883B54F8677D}" type="slidenum"/>
+            <a:fld id="{86CB4B4D-7CA3-9044-876B-883B54F8677D}" type="slidenum">
+              <a:t>‹n.º›</a:t>
+            </a:fld>
+            <a:endParaRPr/>
           </a:p>
         </p:txBody>
       </p:sp>
@@ -1767,12 +1835,12 @@
   <p:clrMapOvr>
     <a:masterClrMapping/>
   </p:clrMapOvr>
-  <p:transition xmlns:p14="http://schemas.microsoft.com/office/powerpoint/2010/main" spd="med" advClick="1"/>
+  <p:transition spd="med"/>
 </p:sldLayout>
 </file>
 
 <file path=ppt/slideLayouts/slideLayout8.xml><?xml version="1.0" encoding="utf-8"?>
-<p:sldLayout xmlns:a="http://schemas.openxmlformats.org/drawingml/2006/main" xmlns:r="http://schemas.openxmlformats.org/officeDocument/2006/relationships" xmlns:p="http://schemas.openxmlformats.org/presentationml/2006/main" type="tx" showMasterSp="1" showMasterPhAnim="1">
+<p:sldLayout xmlns:a="http://schemas.openxmlformats.org/drawingml/2006/main" xmlns:r="http://schemas.openxmlformats.org/officeDocument/2006/relationships" xmlns:p="http://schemas.openxmlformats.org/presentationml/2006/main" type="tx">
   <p:cSld name="Marcadores">
     <p:spTree>
       <p:nvGrpSpPr>
@@ -1791,7 +1859,9 @@
       <p:sp>
         <p:nvSpPr>
           <p:cNvPr id="75" name="Shape 75"/>
-          <p:cNvSpPr/>
+          <p:cNvSpPr>
+            <a:spLocks noGrp="1"/>
+          </p:cNvSpPr>
           <p:nvPr>
             <p:ph type="body" idx="1"/>
           </p:nvPr>
@@ -1809,7 +1879,6 @@
           <a:bodyPr/>
           <a:lstStyle/>
           <a:p>
-            <a:pPr/>
             <a:r>
               <a:t>Nível de Corpo Um</a:t>
             </a:r>
@@ -1843,7 +1912,9 @@
       <p:sp>
         <p:nvSpPr>
           <p:cNvPr id="76" name="Shape 76"/>
-          <p:cNvSpPr/>
+          <p:cNvSpPr>
+            <a:spLocks noGrp="1"/>
+          </p:cNvSpPr>
           <p:nvPr>
             <p:ph type="sldNum" sz="quarter" idx="2"/>
           </p:nvPr>
@@ -1857,8 +1928,10 @@
           <a:bodyPr/>
           <a:lstStyle/>
           <a:p>
-            <a:pPr/>
-            <a:fld id="{86CB4B4D-7CA3-9044-876B-883B54F8677D}" type="slidenum"/>
+            <a:fld id="{86CB4B4D-7CA3-9044-876B-883B54F8677D}" type="slidenum">
+              <a:t>‹n.º›</a:t>
+            </a:fld>
+            <a:endParaRPr/>
           </a:p>
         </p:txBody>
       </p:sp>
@@ -1867,12 +1940,12 @@
   <p:clrMapOvr>
     <a:masterClrMapping/>
   </p:clrMapOvr>
-  <p:transition xmlns:p14="http://schemas.microsoft.com/office/powerpoint/2010/main" spd="med" advClick="1"/>
+  <p:transition spd="med"/>
 </p:sldLayout>
 </file>
 
 <file path=ppt/slideLayouts/slideLayout9.xml><?xml version="1.0" encoding="utf-8"?>
-<p:sldLayout xmlns:a="http://schemas.openxmlformats.org/drawingml/2006/main" xmlns:r="http://schemas.openxmlformats.org/officeDocument/2006/relationships" xmlns:p="http://schemas.openxmlformats.org/presentationml/2006/main" type="tx" showMasterSp="1" showMasterPhAnim="1">
+<p:sldLayout xmlns:a="http://schemas.openxmlformats.org/drawingml/2006/main" xmlns:r="http://schemas.openxmlformats.org/officeDocument/2006/relationships" xmlns:p="http://schemas.openxmlformats.org/presentationml/2006/main" type="tx">
   <p:cSld name="Três Fotos">
     <p:spTree>
       <p:nvGrpSpPr>
@@ -1891,7 +1964,9 @@
       <p:sp>
         <p:nvSpPr>
           <p:cNvPr id="83" name="Shape 83"/>
-          <p:cNvSpPr/>
+          <p:cNvSpPr>
+            <a:spLocks noGrp="1"/>
+          </p:cNvSpPr>
           <p:nvPr>
             <p:ph type="pic" sz="quarter" idx="13"/>
           </p:nvPr>
@@ -1911,14 +1986,16 @@
           </a:bodyPr>
           <a:lstStyle/>
           <a:p>
-            <a:pPr/>
+            <a:endParaRPr/>
           </a:p>
         </p:txBody>
       </p:sp>
       <p:sp>
         <p:nvSpPr>
           <p:cNvPr id="84" name="Shape 84"/>
-          <p:cNvSpPr/>
+          <p:cNvSpPr>
+            <a:spLocks noGrp="1"/>
+          </p:cNvSpPr>
           <p:nvPr>
             <p:ph type="pic" sz="quarter" idx="14"/>
           </p:nvPr>
@@ -1938,14 +2015,16 @@
           </a:bodyPr>
           <a:lstStyle/>
           <a:p>
-            <a:pPr/>
+            <a:endParaRPr/>
           </a:p>
         </p:txBody>
       </p:sp>
       <p:sp>
         <p:nvSpPr>
           <p:cNvPr id="85" name="Shape 85"/>
-          <p:cNvSpPr/>
+          <p:cNvSpPr>
+            <a:spLocks noGrp="1"/>
+          </p:cNvSpPr>
           <p:nvPr>
             <p:ph type="pic" sz="half" idx="15"/>
           </p:nvPr>
@@ -1965,14 +2044,16 @@
           </a:bodyPr>
           <a:lstStyle/>
           <a:p>
-            <a:pPr/>
+            <a:endParaRPr/>
           </a:p>
         </p:txBody>
       </p:sp>
       <p:sp>
         <p:nvSpPr>
           <p:cNvPr id="86" name="Shape 86"/>
-          <p:cNvSpPr/>
+          <p:cNvSpPr>
+            <a:spLocks noGrp="1"/>
+          </p:cNvSpPr>
           <p:nvPr>
             <p:ph type="sldNum" sz="quarter" idx="2"/>
           </p:nvPr>
@@ -1986,8 +2067,10 @@
           <a:bodyPr/>
           <a:lstStyle/>
           <a:p>
-            <a:pPr/>
-            <a:fld id="{86CB4B4D-7CA3-9044-876B-883B54F8677D}" type="slidenum"/>
+            <a:fld id="{86CB4B4D-7CA3-9044-876B-883B54F8677D}" type="slidenum">
+              <a:t>‹n.º›</a:t>
+            </a:fld>
+            <a:endParaRPr/>
           </a:p>
         </p:txBody>
       </p:sp>
@@ -1996,7 +2079,7 @@
   <p:clrMapOvr>
     <a:masterClrMapping/>
   </p:clrMapOvr>
-  <p:transition xmlns:p14="http://schemas.microsoft.com/office/powerpoint/2010/main" spd="med" advClick="1"/>
+  <p:transition spd="med"/>
 </p:sldLayout>
 </file>
 
@@ -2008,6 +2091,7 @@
         <a:solidFill>
           <a:srgbClr val="FFFFFF"/>
         </a:solidFill>
+        <a:effectLst/>
       </p:bgPr>
     </p:bg>
     <p:spTree>
@@ -2027,7 +2111,9 @@
       <p:sp>
         <p:nvSpPr>
           <p:cNvPr id="2" name="Shape 2"/>
-          <p:cNvSpPr/>
+          <p:cNvSpPr>
+            <a:spLocks noGrp="1"/>
+          </p:cNvSpPr>
           <p:nvPr>
             <p:ph type="title"/>
           </p:nvPr>
@@ -2051,11 +2137,10 @@
         </p:spPr>
         <p:txBody>
           <a:bodyPr lIns="50800" tIns="50800" rIns="50800" bIns="50800" anchor="ctr">
-            <a:normAutofit fontScale="100000" lnSpcReduction="0"/>
+            <a:normAutofit/>
           </a:bodyPr>
           <a:lstStyle/>
           <a:p>
-            <a:pPr/>
             <a:r>
               <a:t>Texto do Título</a:t>
             </a:r>
@@ -2065,7 +2150,9 @@
       <p:sp>
         <p:nvSpPr>
           <p:cNvPr id="3" name="Shape 3"/>
-          <p:cNvSpPr/>
+          <p:cNvSpPr>
+            <a:spLocks noGrp="1"/>
+          </p:cNvSpPr>
           <p:nvPr>
             <p:ph type="body" idx="1"/>
           </p:nvPr>
@@ -2089,11 +2176,10 @@
         </p:spPr>
         <p:txBody>
           <a:bodyPr lIns="50800" tIns="50800" rIns="50800" bIns="50800" anchor="ctr">
-            <a:normAutofit fontScale="100000" lnSpcReduction="0"/>
+            <a:normAutofit/>
           </a:bodyPr>
           <a:lstStyle/>
           <a:p>
-            <a:pPr/>
             <a:r>
               <a:t>Nível de Corpo Um</a:t>
             </a:r>
@@ -2127,7 +2213,9 @@
       <p:sp>
         <p:nvSpPr>
           <p:cNvPr id="4" name="Shape 4"/>
-          <p:cNvSpPr/>
+          <p:cNvSpPr>
+            <a:spLocks noGrp="1"/>
+          </p:cNvSpPr>
           <p:nvPr>
             <p:ph type="sldNum" sz="quarter" idx="2"/>
           </p:nvPr>
@@ -2154,8 +2242,10 @@
             </a:lvl1pPr>
           </a:lstStyle>
           <a:p>
-            <a:pPr/>
-            <a:fld id="{86CB4B4D-7CA3-9044-876B-883B54F8677D}" type="slidenum"/>
+            <a:fld id="{86CB4B4D-7CA3-9044-876B-883B54F8677D}" type="slidenum">
+              <a:t>‹n.º›</a:t>
+            </a:fld>
+            <a:endParaRPr/>
           </a:p>
         </p:txBody>
       </p:sp>
@@ -2163,20 +2253,20 @@
   </p:cSld>
   <p:clrMap bg1="lt1" tx1="dk1" bg2="lt2" tx2="dk2" accent1="accent1" accent2="accent2" accent3="accent3" accent4="accent4" accent5="accent5" accent6="accent6" hlink="hlink" folHlink="folHlink"/>
   <p:sldLayoutIdLst>
-    <p:sldLayoutId id="2147483649" r:id="rId2"/>
-    <p:sldLayoutId id="2147483650" r:id="rId3"/>
-    <p:sldLayoutId id="2147483651" r:id="rId4"/>
-    <p:sldLayoutId id="2147483652" r:id="rId5"/>
-    <p:sldLayoutId id="2147483653" r:id="rId6"/>
-    <p:sldLayoutId id="2147483654" r:id="rId7"/>
-    <p:sldLayoutId id="2147483655" r:id="rId8"/>
-    <p:sldLayoutId id="2147483656" r:id="rId9"/>
-    <p:sldLayoutId id="2147483657" r:id="rId10"/>
-    <p:sldLayoutId id="2147483658" r:id="rId11"/>
-    <p:sldLayoutId id="2147483659" r:id="rId12"/>
-    <p:sldLayoutId id="2147483660" r:id="rId13"/>
+    <p:sldLayoutId id="2147483649" r:id="rId1"/>
+    <p:sldLayoutId id="2147483650" r:id="rId2"/>
+    <p:sldLayoutId id="2147483651" r:id="rId3"/>
+    <p:sldLayoutId id="2147483652" r:id="rId4"/>
+    <p:sldLayoutId id="2147483653" r:id="rId5"/>
+    <p:sldLayoutId id="2147483654" r:id="rId6"/>
+    <p:sldLayoutId id="2147483655" r:id="rId7"/>
+    <p:sldLayoutId id="2147483656" r:id="rId8"/>
+    <p:sldLayoutId id="2147483657" r:id="rId9"/>
+    <p:sldLayoutId id="2147483658" r:id="rId10"/>
+    <p:sldLayoutId id="2147483659" r:id="rId11"/>
+    <p:sldLayoutId id="2147483660" r:id="rId12"/>
   </p:sldLayoutIdLst>
-  <p:transition xmlns:p14="http://schemas.microsoft.com/office/powerpoint/2010/main" spd="med" advClick="1"/>
+  <p:transition spd="med"/>
   <p:txStyles>
     <p:titleStyle>
       <a:lvl1pPr marL="0" marR="0" indent="0" algn="ctr" defTabSz="584200" rtl="0" latinLnBrk="0">
@@ -2194,7 +2284,7 @@
         <a:buFontTx/>
         <a:buNone/>
         <a:tabLst/>
-        <a:defRPr b="0" baseline="0" cap="none" i="0" spc="0" strike="noStrike" sz="8000" u="none">
+        <a:defRPr sz="8000" b="0" i="0" u="none" strike="noStrike" cap="none" spc="0" baseline="0">
           <a:ln>
             <a:noFill/>
           </a:ln>
@@ -2223,7 +2313,7 @@
         <a:buFontTx/>
         <a:buNone/>
         <a:tabLst/>
-        <a:defRPr b="0" baseline="0" cap="none" i="0" spc="0" strike="noStrike" sz="8000" u="none">
+        <a:defRPr sz="8000" b="0" i="0" u="none" strike="noStrike" cap="none" spc="0" baseline="0">
           <a:ln>
             <a:noFill/>
           </a:ln>
@@ -2252,7 +2342,7 @@
         <a:buFontTx/>
         <a:buNone/>
         <a:tabLst/>
-        <a:defRPr b="0" baseline="0" cap="none" i="0" spc="0" strike="noStrike" sz="8000" u="none">
+        <a:defRPr sz="8000" b="0" i="0" u="none" strike="noStrike" cap="none" spc="0" baseline="0">
           <a:ln>
             <a:noFill/>
           </a:ln>
@@ -2281,7 +2371,7 @@
         <a:buFontTx/>
         <a:buNone/>
         <a:tabLst/>
-        <a:defRPr b="0" baseline="0" cap="none" i="0" spc="0" strike="noStrike" sz="8000" u="none">
+        <a:defRPr sz="8000" b="0" i="0" u="none" strike="noStrike" cap="none" spc="0" baseline="0">
           <a:ln>
             <a:noFill/>
           </a:ln>
@@ -2310,7 +2400,7 @@
         <a:buFontTx/>
         <a:buNone/>
         <a:tabLst/>
-        <a:defRPr b="0" baseline="0" cap="none" i="0" spc="0" strike="noStrike" sz="8000" u="none">
+        <a:defRPr sz="8000" b="0" i="0" u="none" strike="noStrike" cap="none" spc="0" baseline="0">
           <a:ln>
             <a:noFill/>
           </a:ln>
@@ -2339,7 +2429,7 @@
         <a:buFontTx/>
         <a:buNone/>
         <a:tabLst/>
-        <a:defRPr b="0" baseline="0" cap="none" i="0" spc="0" strike="noStrike" sz="8000" u="none">
+        <a:defRPr sz="8000" b="0" i="0" u="none" strike="noStrike" cap="none" spc="0" baseline="0">
           <a:ln>
             <a:noFill/>
           </a:ln>
@@ -2368,7 +2458,7 @@
         <a:buFontTx/>
         <a:buNone/>
         <a:tabLst/>
-        <a:defRPr b="0" baseline="0" cap="none" i="0" spc="0" strike="noStrike" sz="8000" u="none">
+        <a:defRPr sz="8000" b="0" i="0" u="none" strike="noStrike" cap="none" spc="0" baseline="0">
           <a:ln>
             <a:noFill/>
           </a:ln>
@@ -2397,7 +2487,7 @@
         <a:buFontTx/>
         <a:buNone/>
         <a:tabLst/>
-        <a:defRPr b="0" baseline="0" cap="none" i="0" spc="0" strike="noStrike" sz="8000" u="none">
+        <a:defRPr sz="8000" b="0" i="0" u="none" strike="noStrike" cap="none" spc="0" baseline="0">
           <a:ln>
             <a:noFill/>
           </a:ln>
@@ -2426,7 +2516,7 @@
         <a:buFontTx/>
         <a:buNone/>
         <a:tabLst/>
-        <a:defRPr b="0" baseline="0" cap="none" i="0" spc="0" strike="noStrike" sz="8000" u="none">
+        <a:defRPr sz="8000" b="0" i="0" u="none" strike="noStrike" cap="none" spc="0" baseline="0">
           <a:ln>
             <a:noFill/>
           </a:ln>
@@ -2457,7 +2547,7 @@
         <a:buFontTx/>
         <a:buChar char="•"/>
         <a:tabLst/>
-        <a:defRPr b="0" baseline="0" cap="none" i="0" spc="0" strike="noStrike" sz="3600" u="none">
+        <a:defRPr sz="3600" b="0" i="0" u="none" strike="noStrike" cap="none" spc="0" baseline="0">
           <a:ln>
             <a:noFill/>
           </a:ln>
@@ -2486,7 +2576,7 @@
         <a:buFontTx/>
         <a:buChar char="•"/>
         <a:tabLst/>
-        <a:defRPr b="0" baseline="0" cap="none" i="0" spc="0" strike="noStrike" sz="3600" u="none">
+        <a:defRPr sz="3600" b="0" i="0" u="none" strike="noStrike" cap="none" spc="0" baseline="0">
           <a:ln>
             <a:noFill/>
           </a:ln>
@@ -2515,7 +2605,7 @@
         <a:buFontTx/>
         <a:buChar char="•"/>
         <a:tabLst/>
-        <a:defRPr b="0" baseline="0" cap="none" i="0" spc="0" strike="noStrike" sz="3600" u="none">
+        <a:defRPr sz="3600" b="0" i="0" u="none" strike="noStrike" cap="none" spc="0" baseline="0">
           <a:ln>
             <a:noFill/>
           </a:ln>
@@ -2544,7 +2634,7 @@
         <a:buFontTx/>
         <a:buChar char="•"/>
         <a:tabLst/>
-        <a:defRPr b="0" baseline="0" cap="none" i="0" spc="0" strike="noStrike" sz="3600" u="none">
+        <a:defRPr sz="3600" b="0" i="0" u="none" strike="noStrike" cap="none" spc="0" baseline="0">
           <a:ln>
             <a:noFill/>
           </a:ln>
@@ -2573,7 +2663,7 @@
         <a:buFontTx/>
         <a:buChar char="•"/>
         <a:tabLst/>
-        <a:defRPr b="0" baseline="0" cap="none" i="0" spc="0" strike="noStrike" sz="3600" u="none">
+        <a:defRPr sz="3600" b="0" i="0" u="none" strike="noStrike" cap="none" spc="0" baseline="0">
           <a:ln>
             <a:noFill/>
           </a:ln>
@@ -2602,7 +2692,7 @@
         <a:buFontTx/>
         <a:buChar char="•"/>
         <a:tabLst/>
-        <a:defRPr b="0" baseline="0" cap="none" i="0" spc="0" strike="noStrike" sz="3600" u="none">
+        <a:defRPr sz="3600" b="0" i="0" u="none" strike="noStrike" cap="none" spc="0" baseline="0">
           <a:ln>
             <a:noFill/>
           </a:ln>
@@ -2631,7 +2721,7 @@
         <a:buFontTx/>
         <a:buChar char="•"/>
         <a:tabLst/>
-        <a:defRPr b="0" baseline="0" cap="none" i="0" spc="0" strike="noStrike" sz="3600" u="none">
+        <a:defRPr sz="3600" b="0" i="0" u="none" strike="noStrike" cap="none" spc="0" baseline="0">
           <a:ln>
             <a:noFill/>
           </a:ln>
@@ -2660,7 +2750,7 @@
         <a:buFontTx/>
         <a:buChar char="•"/>
         <a:tabLst/>
-        <a:defRPr b="0" baseline="0" cap="none" i="0" spc="0" strike="noStrike" sz="3600" u="none">
+        <a:defRPr sz="3600" b="0" i="0" u="none" strike="noStrike" cap="none" spc="0" baseline="0">
           <a:ln>
             <a:noFill/>
           </a:ln>
@@ -2689,7 +2779,7 @@
         <a:buFontTx/>
         <a:buChar char="•"/>
         <a:tabLst/>
-        <a:defRPr b="0" baseline="0" cap="none" i="0" spc="0" strike="noStrike" sz="3600" u="none">
+        <a:defRPr sz="3600" b="0" i="0" u="none" strike="noStrike" cap="none" spc="0" baseline="0">
           <a:ln>
             <a:noFill/>
           </a:ln>
@@ -2720,7 +2810,7 @@
         <a:buFontTx/>
         <a:buNone/>
         <a:tabLst/>
-        <a:defRPr b="0" baseline="0" cap="none" i="0" spc="0" strike="noStrike" sz="1800" u="none">
+        <a:defRPr sz="1800" b="0" i="0" u="none" strike="noStrike" cap="none" spc="0" baseline="0">
           <a:ln>
             <a:noFill/>
           </a:ln>
@@ -2749,7 +2839,7 @@
         <a:buFontTx/>
         <a:buNone/>
         <a:tabLst/>
-        <a:defRPr b="0" baseline="0" cap="none" i="0" spc="0" strike="noStrike" sz="1800" u="none">
+        <a:defRPr sz="1800" b="0" i="0" u="none" strike="noStrike" cap="none" spc="0" baseline="0">
           <a:ln>
             <a:noFill/>
           </a:ln>
@@ -2778,7 +2868,7 @@
         <a:buFontTx/>
         <a:buNone/>
         <a:tabLst/>
-        <a:defRPr b="0" baseline="0" cap="none" i="0" spc="0" strike="noStrike" sz="1800" u="none">
+        <a:defRPr sz="1800" b="0" i="0" u="none" strike="noStrike" cap="none" spc="0" baseline="0">
           <a:ln>
             <a:noFill/>
           </a:ln>
@@ -2807,7 +2897,7 @@
         <a:buFontTx/>
         <a:buNone/>
         <a:tabLst/>
-        <a:defRPr b="0" baseline="0" cap="none" i="0" spc="0" strike="noStrike" sz="1800" u="none">
+        <a:defRPr sz="1800" b="0" i="0" u="none" strike="noStrike" cap="none" spc="0" baseline="0">
           <a:ln>
             <a:noFill/>
           </a:ln>
@@ -2836,7 +2926,7 @@
         <a:buFontTx/>
         <a:buNone/>
         <a:tabLst/>
-        <a:defRPr b="0" baseline="0" cap="none" i="0" spc="0" strike="noStrike" sz="1800" u="none">
+        <a:defRPr sz="1800" b="0" i="0" u="none" strike="noStrike" cap="none" spc="0" baseline="0">
           <a:ln>
             <a:noFill/>
           </a:ln>
@@ -2865,7 +2955,7 @@
         <a:buFontTx/>
         <a:buNone/>
         <a:tabLst/>
-        <a:defRPr b="0" baseline="0" cap="none" i="0" spc="0" strike="noStrike" sz="1800" u="none">
+        <a:defRPr sz="1800" b="0" i="0" u="none" strike="noStrike" cap="none" spc="0" baseline="0">
           <a:ln>
             <a:noFill/>
           </a:ln>
@@ -2894,7 +2984,7 @@
         <a:buFontTx/>
         <a:buNone/>
         <a:tabLst/>
-        <a:defRPr b="0" baseline="0" cap="none" i="0" spc="0" strike="noStrike" sz="1800" u="none">
+        <a:defRPr sz="1800" b="0" i="0" u="none" strike="noStrike" cap="none" spc="0" baseline="0">
           <a:ln>
             <a:noFill/>
           </a:ln>
@@ -2923,7 +3013,7 @@
         <a:buFontTx/>
         <a:buNone/>
         <a:tabLst/>
-        <a:defRPr b="0" baseline="0" cap="none" i="0" spc="0" strike="noStrike" sz="1800" u="none">
+        <a:defRPr sz="1800" b="0" i="0" u="none" strike="noStrike" cap="none" spc="0" baseline="0">
           <a:ln>
             <a:noFill/>
           </a:ln>
@@ -2952,7 +3042,7 @@
         <a:buFontTx/>
         <a:buNone/>
         <a:tabLst/>
-        <a:defRPr b="0" baseline="0" cap="none" i="0" spc="0" strike="noStrike" sz="1800" u="none">
+        <a:defRPr sz="1800" b="0" i="0" u="none" strike="noStrike" cap="none" spc="0" baseline="0">
           <a:ln>
             <a:noFill/>
           </a:ln>
@@ -2972,7 +3062,7 @@
 </file>
 
 <file path=ppt/slides/slide1.xml><?xml version="1.0" encoding="utf-8"?>
-<p:sld xmlns:a="http://schemas.openxmlformats.org/drawingml/2006/main" xmlns:r="http://schemas.openxmlformats.org/officeDocument/2006/relationships" xmlns:p="http://schemas.openxmlformats.org/presentationml/2006/main" showMasterSp="1" showMasterPhAnim="1">
+<p:sld xmlns:a="http://schemas.openxmlformats.org/drawingml/2006/main" xmlns:r="http://schemas.openxmlformats.org/officeDocument/2006/relationships" xmlns:p="http://schemas.openxmlformats.org/presentationml/2006/main">
   <p:cSld>
     <p:spTree>
       <p:nvGrpSpPr>
@@ -2991,7 +3081,9 @@
       <p:sp>
         <p:nvSpPr>
           <p:cNvPr id="119" name="Shape 119"/>
-          <p:cNvSpPr/>
+          <p:cNvSpPr>
+            <a:spLocks noGrp="1"/>
+          </p:cNvSpPr>
           <p:nvPr>
             <p:ph type="ctrTitle"/>
           </p:nvPr>
@@ -3005,13 +3097,11 @@
           <a:bodyPr/>
           <a:lstStyle/>
           <a:p>
-            <a:pPr/>
             <a:r>
               <a:t>Projeto RST</a:t>
             </a:r>
           </a:p>
           <a:p>
-            <a:pPr/>
             <a:r>
               <a:t>Rede Social Tagarelas</a:t>
             </a:r>
@@ -3021,7 +3111,9 @@
       <p:sp>
         <p:nvSpPr>
           <p:cNvPr id="120" name="Shape 120"/>
-          <p:cNvSpPr/>
+          <p:cNvSpPr>
+            <a:spLocks noGrp="1"/>
+          </p:cNvSpPr>
           <p:nvPr>
             <p:ph type="subTitle" sz="quarter" idx="1"/>
           </p:nvPr>
@@ -3035,7 +3127,6 @@
           <a:bodyPr/>
           <a:lstStyle/>
           <a:p>
-            <a:pPr/>
             <a:r>
               <a:t>Equipe Comunicatec</a:t>
             </a:r>
@@ -3066,7 +3157,7 @@
           </a:bodyPr>
           <a:lstStyle/>
           <a:p>
-            <a:pPr/>
+            <a:endParaRPr/>
           </a:p>
         </p:txBody>
       </p:sp>
@@ -3075,12 +3166,12 @@
   <p:clrMapOvr>
     <a:masterClrMapping/>
   </p:clrMapOvr>
-  <p:transition xmlns:p14="http://schemas.microsoft.com/office/powerpoint/2010/main" spd="med" advClick="1"/>
+  <p:transition spd="med"/>
 </p:sld>
 </file>
 
 <file path=ppt/slides/slide2.xml><?xml version="1.0" encoding="utf-8"?>
-<p:sld xmlns:a="http://schemas.openxmlformats.org/drawingml/2006/main" xmlns:r="http://schemas.openxmlformats.org/officeDocument/2006/relationships" xmlns:p="http://schemas.openxmlformats.org/presentationml/2006/main" showMasterSp="1" showMasterPhAnim="1">
+<p:sld xmlns:a="http://schemas.openxmlformats.org/drawingml/2006/main" xmlns:r="http://schemas.openxmlformats.org/officeDocument/2006/relationships" xmlns:p="http://schemas.openxmlformats.org/presentationml/2006/main">
   <p:cSld>
     <p:spTree>
       <p:nvGrpSpPr>
@@ -3146,6 +3237,7 @@
                   </a:solidFill>
                 </a:defRPr>
               </a:pPr>
+              <a:endParaRPr/>
             </a:p>
           </p:txBody>
         </p:sp>
@@ -3185,6 +3277,7 @@
                   </a:solidFill>
                 </a:defRPr>
               </a:pPr>
+              <a:endParaRPr/>
             </a:p>
           </p:txBody>
         </p:sp>
@@ -3224,6 +3317,7 @@
                   </a:solidFill>
                 </a:defRPr>
               </a:pPr>
+              <a:endParaRPr/>
             </a:p>
           </p:txBody>
         </p:sp>
@@ -3263,6 +3357,7 @@
                   </a:solidFill>
                 </a:defRPr>
               </a:pPr>
+              <a:endParaRPr/>
             </a:p>
           </p:txBody>
         </p:sp>
@@ -3302,6 +3397,7 @@
                   </a:solidFill>
                 </a:defRPr>
               </a:pPr>
+              <a:endParaRPr/>
             </a:p>
           </p:txBody>
         </p:sp>
@@ -3341,6 +3437,7 @@
                   </a:solidFill>
                 </a:defRPr>
               </a:pPr>
+              <a:endParaRPr/>
             </a:p>
           </p:txBody>
         </p:sp>
@@ -3380,6 +3477,7 @@
                   </a:solidFill>
                 </a:defRPr>
               </a:pPr>
+              <a:endParaRPr/>
             </a:p>
           </p:txBody>
         </p:sp>
@@ -3419,6 +3517,7 @@
                   </a:solidFill>
                 </a:defRPr>
               </a:pPr>
+              <a:endParaRPr/>
             </a:p>
           </p:txBody>
         </p:sp>
@@ -3458,6 +3557,7 @@
                   </a:solidFill>
                 </a:defRPr>
               </a:pPr>
+              <a:endParaRPr/>
             </a:p>
           </p:txBody>
         </p:sp>
@@ -3497,6 +3597,7 @@
                   </a:solidFill>
                 </a:defRPr>
               </a:pPr>
+              <a:endParaRPr/>
             </a:p>
           </p:txBody>
         </p:sp>
@@ -3536,6 +3637,7 @@
                   </a:solidFill>
                 </a:defRPr>
               </a:pPr>
+              <a:endParaRPr/>
             </a:p>
           </p:txBody>
         </p:sp>
@@ -3575,6 +3677,7 @@
                   </a:solidFill>
                 </a:defRPr>
               </a:pPr>
+              <a:endParaRPr/>
             </a:p>
           </p:txBody>
         </p:sp>
@@ -3614,6 +3717,7 @@
                   </a:solidFill>
                 </a:defRPr>
               </a:pPr>
+              <a:endParaRPr/>
             </a:p>
           </p:txBody>
         </p:sp>
@@ -3647,7 +3751,7 @@
           </a:bodyPr>
           <a:lstStyle>
             <a:lvl1pPr defTabSz="587022">
-              <a:defRPr b="1" sz="2000">
+              <a:defRPr sz="2000" b="1">
                 <a:solidFill>
                   <a:srgbClr val="A6AAA9"/>
                 </a:solidFill>
@@ -3659,7 +3763,6 @@
             </a:lvl1pPr>
           </a:lstStyle>
           <a:p>
-            <a:pPr/>
             <a:r>
               <a:t>Mai/17</a:t>
             </a:r>
@@ -3695,7 +3798,7 @@
           </a:bodyPr>
           <a:lstStyle>
             <a:lvl1pPr defTabSz="587022">
-              <a:defRPr b="1" sz="2000">
+              <a:defRPr sz="2000" b="1">
                 <a:solidFill>
                   <a:srgbClr val="A6AAA9"/>
                 </a:solidFill>
@@ -3707,7 +3810,6 @@
             </a:lvl1pPr>
           </a:lstStyle>
           <a:p>
-            <a:pPr/>
             <a:r>
               <a:t>Ago/17</a:t>
             </a:r>
@@ -3743,7 +3845,7 @@
           </a:bodyPr>
           <a:lstStyle>
             <a:lvl1pPr defTabSz="587022">
-              <a:defRPr b="1" sz="2000">
+              <a:defRPr sz="2000" b="1">
                 <a:solidFill>
                   <a:srgbClr val="A6AAA9"/>
                 </a:solidFill>
@@ -3755,7 +3857,6 @@
             </a:lvl1pPr>
           </a:lstStyle>
           <a:p>
-            <a:pPr/>
             <a:r>
               <a:t>Out/17</a:t>
             </a:r>
@@ -3791,7 +3892,7 @@
           </a:bodyPr>
           <a:lstStyle>
             <a:lvl1pPr defTabSz="587022">
-              <a:defRPr b="1" sz="2000">
+              <a:defRPr sz="2000" b="1">
                 <a:solidFill>
                   <a:srgbClr val="A6AAA9"/>
                 </a:solidFill>
@@ -3803,7 +3904,6 @@
             </a:lvl1pPr>
           </a:lstStyle>
           <a:p>
-            <a:pPr/>
             <a:r>
               <a:t>Dez/17</a:t>
             </a:r>
@@ -3839,7 +3939,7 @@
           </a:bodyPr>
           <a:lstStyle>
             <a:lvl1pPr defTabSz="587022">
-              <a:defRPr b="1" sz="2000">
+              <a:defRPr sz="2000" b="1">
                 <a:solidFill>
                   <a:srgbClr val="A6AAA9"/>
                 </a:solidFill>
@@ -3851,7 +3951,6 @@
             </a:lvl1pPr>
           </a:lstStyle>
           <a:p>
-            <a:pPr/>
             <a:r>
               <a:t>Fev/18</a:t>
             </a:r>
@@ -3887,7 +3986,7 @@
           </a:bodyPr>
           <a:lstStyle>
             <a:lvl1pPr defTabSz="587022">
-              <a:defRPr b="1" sz="2000">
+              <a:defRPr sz="2000" b="1">
                 <a:solidFill>
                   <a:srgbClr val="A6AAA9"/>
                 </a:solidFill>
@@ -3899,7 +3998,6 @@
             </a:lvl1pPr>
           </a:lstStyle>
           <a:p>
-            <a:pPr/>
             <a:r>
               <a:t>Abr/18</a:t>
             </a:r>
@@ -3935,7 +4033,7 @@
           </a:bodyPr>
           <a:lstStyle>
             <a:lvl1pPr defTabSz="587022">
-              <a:defRPr b="1" sz="2000">
+              <a:defRPr sz="2000" b="1">
                 <a:solidFill>
                   <a:srgbClr val="A6AAA9"/>
                 </a:solidFill>
@@ -3947,7 +4045,6 @@
             </a:lvl1pPr>
           </a:lstStyle>
           <a:p>
-            <a:pPr/>
             <a:r>
               <a:t>Jun/18</a:t>
             </a:r>
@@ -3983,7 +4080,7 @@
           </a:bodyPr>
           <a:lstStyle>
             <a:lvl1pPr defTabSz="587022">
-              <a:defRPr b="1" sz="2000">
+              <a:defRPr sz="2000" b="1">
                 <a:solidFill>
                   <a:srgbClr val="A6AAA9"/>
                 </a:solidFill>
@@ -3995,7 +4092,6 @@
             </a:lvl1pPr>
           </a:lstStyle>
           <a:p>
-            <a:pPr/>
             <a:r>
               <a:t>Dez/18</a:t>
             </a:r>
@@ -4031,7 +4127,7 @@
           </a:bodyPr>
           <a:lstStyle>
             <a:lvl1pPr defTabSz="587022">
-              <a:defRPr b="1" sz="2000">
+              <a:defRPr sz="2000" b="1">
                 <a:solidFill>
                   <a:srgbClr val="A6AAA9"/>
                 </a:solidFill>
@@ -4043,7 +4139,6 @@
             </a:lvl1pPr>
           </a:lstStyle>
           <a:p>
-            <a:pPr/>
             <a:r>
               <a:t>Mar/19</a:t>
             </a:r>
@@ -4109,7 +4204,7 @@
                 </a:cxnLst>
                 <a:rect l="0" t="0" r="r" b="b"/>
                 <a:pathLst>
-                  <a:path w="21600" h="21600" fill="norm" stroke="1" extrusionOk="0">
+                  <a:path w="21600" h="21600" extrusionOk="0">
                     <a:moveTo>
                       <a:pt x="21600" y="0"/>
                     </a:moveTo>
@@ -4145,6 +4240,7 @@
                     </a:solidFill>
                   </a:defRPr>
                 </a:pPr>
+                <a:endParaRPr/>
               </a:p>
             </p:txBody>
           </p:sp>
@@ -4184,6 +4280,7 @@
                     </a:solidFill>
                   </a:defRPr>
                 </a:pPr>
+                <a:endParaRPr/>
               </a:p>
             </p:txBody>
           </p:sp>
@@ -4221,7 +4318,7 @@
             <a:lstStyle/>
             <a:p>
               <a:pPr algn="l" defTabSz="587022">
-                <a:defRPr b="1" sz="1400">
+                <a:defRPr sz="1400" b="1">
                   <a:solidFill>
                     <a:srgbClr val="404040"/>
                   </a:solidFill>
@@ -4309,7 +4406,7 @@
                 </a:cxnLst>
                 <a:rect l="0" t="0" r="r" b="b"/>
                 <a:pathLst>
-                  <a:path w="21600" h="21600" fill="norm" stroke="1" extrusionOk="0">
+                  <a:path w="21600" h="21600" extrusionOk="0">
                     <a:moveTo>
                       <a:pt x="21600" y="0"/>
                     </a:moveTo>
@@ -4345,6 +4442,7 @@
                     </a:solidFill>
                   </a:defRPr>
                 </a:pPr>
+                <a:endParaRPr/>
               </a:p>
             </p:txBody>
           </p:sp>
@@ -4384,6 +4482,7 @@
                     </a:solidFill>
                   </a:defRPr>
                 </a:pPr>
+                <a:endParaRPr/>
               </a:p>
             </p:txBody>
           </p:sp>
@@ -4421,7 +4520,7 @@
             <a:lstStyle/>
             <a:p>
               <a:pPr algn="l" defTabSz="587022">
-                <a:defRPr b="1" sz="1400">
+                <a:defRPr sz="1400" b="1">
                   <a:solidFill>
                     <a:srgbClr val="404040"/>
                   </a:solidFill>
@@ -4518,7 +4617,7 @@
                 </a:cxnLst>
                 <a:rect l="0" t="0" r="r" b="b"/>
                 <a:pathLst>
-                  <a:path w="21600" h="21600" fill="norm" stroke="1" extrusionOk="0">
+                  <a:path w="21600" h="21600" extrusionOk="0">
                     <a:moveTo>
                       <a:pt x="21600" y="0"/>
                     </a:moveTo>
@@ -4554,6 +4653,7 @@
                     </a:solidFill>
                   </a:defRPr>
                 </a:pPr>
+                <a:endParaRPr/>
               </a:p>
             </p:txBody>
           </p:sp>
@@ -4593,6 +4693,7 @@
                     </a:solidFill>
                   </a:defRPr>
                 </a:pPr>
+                <a:endParaRPr/>
               </a:p>
             </p:txBody>
           </p:sp>
@@ -4630,7 +4731,7 @@
             <a:lstStyle/>
             <a:p>
               <a:pPr algn="l" defTabSz="587022">
-                <a:defRPr b="1" sz="1400">
+                <a:defRPr sz="1400" b="1">
                   <a:solidFill>
                     <a:srgbClr val="404040"/>
                   </a:solidFill>
@@ -4718,7 +4819,7 @@
                 </a:cxnLst>
                 <a:rect l="0" t="0" r="r" b="b"/>
                 <a:pathLst>
-                  <a:path w="21600" h="21600" fill="norm" stroke="1" extrusionOk="0">
+                  <a:path w="21600" h="21600" extrusionOk="0">
                     <a:moveTo>
                       <a:pt x="21600" y="0"/>
                     </a:moveTo>
@@ -4754,6 +4855,7 @@
                     </a:solidFill>
                   </a:defRPr>
                 </a:pPr>
+                <a:endParaRPr/>
               </a:p>
             </p:txBody>
           </p:sp>
@@ -4793,6 +4895,7 @@
                     </a:solidFill>
                   </a:defRPr>
                 </a:pPr>
+                <a:endParaRPr/>
               </a:p>
             </p:txBody>
           </p:sp>
@@ -4830,7 +4933,7 @@
             <a:lstStyle/>
             <a:p>
               <a:pPr algn="l" defTabSz="587022">
-                <a:defRPr b="1" sz="1400">
+                <a:defRPr sz="1400" b="1">
                   <a:solidFill>
                     <a:srgbClr val="404040"/>
                   </a:solidFill>
@@ -4904,7 +5007,7 @@
               </a:cxnLst>
               <a:rect l="0" t="0" r="r" b="b"/>
               <a:pathLst>
-                <a:path w="21600" h="21600" fill="norm" stroke="1" extrusionOk="0">
+                <a:path w="21600" h="21600" extrusionOk="0">
                   <a:moveTo>
                     <a:pt x="21600" y="0"/>
                   </a:moveTo>
@@ -4940,6 +5043,7 @@
                   </a:solidFill>
                 </a:defRPr>
               </a:pPr>
+              <a:endParaRPr/>
             </a:p>
           </p:txBody>
         </p:sp>
@@ -4979,6 +5083,7 @@
                   </a:solidFill>
                 </a:defRPr>
               </a:pPr>
+              <a:endParaRPr/>
             </a:p>
           </p:txBody>
         </p:sp>
@@ -5015,7 +5120,7 @@
             <a:lstStyle/>
             <a:p>
               <a:pPr algn="l" defTabSz="587022">
-                <a:defRPr b="1" sz="1400">
+                <a:defRPr sz="1400" b="1">
                   <a:solidFill>
                     <a:srgbClr val="404040"/>
                   </a:solidFill>
@@ -5089,7 +5194,7 @@
               </a:cxnLst>
               <a:rect l="0" t="0" r="r" b="b"/>
               <a:pathLst>
-                <a:path w="21600" h="21600" fill="norm" stroke="1" extrusionOk="0">
+                <a:path w="21600" h="21600" extrusionOk="0">
                   <a:moveTo>
                     <a:pt x="21600" y="0"/>
                   </a:moveTo>
@@ -5125,6 +5230,7 @@
                   </a:solidFill>
                 </a:defRPr>
               </a:pPr>
+              <a:endParaRPr/>
             </a:p>
           </p:txBody>
         </p:sp>
@@ -5164,6 +5270,7 @@
                   </a:solidFill>
                 </a:defRPr>
               </a:pPr>
+              <a:endParaRPr/>
             </a:p>
           </p:txBody>
         </p:sp>
@@ -5200,7 +5307,7 @@
             <a:lstStyle/>
             <a:p>
               <a:pPr algn="l" defTabSz="587022">
-                <a:defRPr b="1" sz="1400">
+                <a:defRPr sz="1400" b="1">
                   <a:solidFill>
                     <a:srgbClr val="404040"/>
                   </a:solidFill>
@@ -5262,7 +5369,6 @@
             </a:lvl1pPr>
           </a:lstStyle>
           <a:p>
-            <a:pPr/>
             <a:r>
               <a:t>ROADMAP  Tagarelas Proposta</a:t>
             </a:r>
@@ -5274,12 +5380,12 @@
   <p:clrMapOvr>
     <a:masterClrMapping/>
   </p:clrMapOvr>
-  <p:transition xmlns:p14="http://schemas.microsoft.com/office/powerpoint/2010/main" spd="med" advClick="1"/>
+  <p:transition spd="med"/>
 </p:sld>
 </file>
 
 <file path=ppt/slides/slide3.xml><?xml version="1.0" encoding="utf-8"?>
-<p:sld xmlns:a="http://schemas.openxmlformats.org/drawingml/2006/main" xmlns:r="http://schemas.openxmlformats.org/officeDocument/2006/relationships" xmlns:p="http://schemas.openxmlformats.org/presentationml/2006/main" showMasterSp="1" showMasterPhAnim="1">
+<p:sld xmlns:a="http://schemas.openxmlformats.org/drawingml/2006/main" xmlns:r="http://schemas.openxmlformats.org/officeDocument/2006/relationships" xmlns:p="http://schemas.openxmlformats.org/presentationml/2006/main">
   <p:cSld>
     <p:spTree>
       <p:nvGrpSpPr>
@@ -5298,7 +5404,9 @@
       <p:sp>
         <p:nvSpPr>
           <p:cNvPr id="176" name="Shape 176"/>
-          <p:cNvSpPr/>
+          <p:cNvSpPr>
+            <a:spLocks noGrp="1"/>
+          </p:cNvSpPr>
           <p:nvPr>
             <p:ph type="title"/>
           </p:nvPr>
@@ -5316,7 +5424,6 @@
             </a:lvl1pPr>
           </a:lstStyle>
           <a:p>
-            <a:pPr/>
             <a:r>
               <a:t>XMMP - Sala de aula Virtual</a:t>
             </a:r>
@@ -5326,7 +5433,9 @@
       <p:sp>
         <p:nvSpPr>
           <p:cNvPr id="177" name="Shape 177"/>
-          <p:cNvSpPr/>
+          <p:cNvSpPr>
+            <a:spLocks noGrp="1"/>
+          </p:cNvSpPr>
           <p:nvPr>
             <p:ph type="body" idx="1"/>
           </p:nvPr>
@@ -5392,7 +5501,7 @@
               <a:spcBef>
                 <a:spcPts val="2900"/>
               </a:spcBef>
-              <a:defRPr b="1" sz="2576">
+              <a:defRPr sz="2576" b="1">
                 <a:latin typeface="Helvetica"/>
                 <a:ea typeface="Helvetica"/>
                 <a:cs typeface="Helvetica"/>
@@ -5518,243 +5627,12 @@
   <p:clrMapOvr>
     <a:masterClrMapping/>
   </p:clrMapOvr>
-  <p:transition xmlns:p14="http://schemas.microsoft.com/office/powerpoint/2010/main" spd="med" advClick="1"/>
+  <p:transition spd="med"/>
 </p:sld>
 </file>
 
 <file path=ppt/slides/slide4.xml><?xml version="1.0" encoding="utf-8"?>
-<p:sld xmlns:a="http://schemas.openxmlformats.org/drawingml/2006/main" xmlns:r="http://schemas.openxmlformats.org/officeDocument/2006/relationships" xmlns:p="http://schemas.openxmlformats.org/presentationml/2006/main" showMasterSp="1" showMasterPhAnim="1">
-  <p:cSld>
-    <p:spTree>
-      <p:nvGrpSpPr>
-        <p:cNvPr id="1" name=""/>
-        <p:cNvGrpSpPr/>
-        <p:nvPr/>
-      </p:nvGrpSpPr>
-      <p:grpSpPr>
-        <a:xfrm>
-          <a:off x="0" y="0"/>
-          <a:ext cx="0" cy="0"/>
-          <a:chOff x="0" y="0"/>
-          <a:chExt cx="0" cy="0"/>
-        </a:xfrm>
-      </p:grpSpPr>
-      <p:sp>
-        <p:nvSpPr>
-          <p:cNvPr id="180" name="Shape 180"/>
-          <p:cNvSpPr/>
-          <p:nvPr>
-            <p:ph type="title"/>
-          </p:nvPr>
-        </p:nvSpPr>
-        <p:spPr>
-          <a:prstGeom prst="rect">
-            <a:avLst/>
-          </a:prstGeom>
-        </p:spPr>
-        <p:txBody>
-          <a:bodyPr/>
-          <a:lstStyle>
-            <a:lvl1pPr defTabSz="508254">
-              <a:defRPr sz="6960"/>
-            </a:lvl1pPr>
-          </a:lstStyle>
-          <a:p>
-            <a:pPr/>
-            <a:r>
-              <a:t>XMMP - Sala de aula Virtual</a:t>
-            </a:r>
-          </a:p>
-        </p:txBody>
-      </p:sp>
-      <p:sp>
-        <p:nvSpPr>
-          <p:cNvPr id="181" name="Shape 181"/>
-          <p:cNvSpPr/>
-          <p:nvPr/>
-        </p:nvSpPr>
-        <p:spPr>
-          <a:xfrm>
-            <a:off x="6106566" y="1924049"/>
-            <a:ext cx="1299668" cy="469901"/>
-          </a:xfrm>
-          <a:prstGeom prst="rect">
-            <a:avLst/>
-          </a:prstGeom>
-          <a:ln w="12700">
-            <a:miter lim="400000"/>
-          </a:ln>
-          <a:extLst>
-            <a:ext uri="{C572A759-6A51-4108-AA02-DFA0A04FC94B}">
-              <ma14:wrappingTextBoxFlag xmlns:ma14="http://schemas.microsoft.com/office/mac/drawingml/2011/main" val="1"/>
-            </a:ext>
-          </a:extLst>
-        </p:spPr>
-        <p:txBody>
-          <a:bodyPr wrap="none" lIns="50800" tIns="50800" rIns="50800" bIns="50800" anchor="ctr">
-            <a:spAutoFit/>
-          </a:bodyPr>
-          <a:lstStyle>
-            <a:lvl1pPr>
-              <a:defRPr sz="2400"/>
-            </a:lvl1pPr>
-          </a:lstStyle>
-          <a:p>
-            <a:pPr/>
-            <a:r>
-              <a:t>Exemplo</a:t>
-            </a:r>
-          </a:p>
-        </p:txBody>
-      </p:sp>
-      <p:sp>
-        <p:nvSpPr>
-          <p:cNvPr id="182" name="Shape 182"/>
-          <p:cNvSpPr/>
-          <p:nvPr/>
-        </p:nvSpPr>
-        <p:spPr>
-          <a:xfrm>
-            <a:off x="1607775" y="2730499"/>
-            <a:ext cx="10297251" cy="2006601"/>
-          </a:xfrm>
-          <a:prstGeom prst="rect">
-            <a:avLst/>
-          </a:prstGeom>
-          <a:ln w="12700">
-            <a:miter lim="400000"/>
-          </a:ln>
-          <a:extLst>
-            <a:ext uri="{C572A759-6A51-4108-AA02-DFA0A04FC94B}">
-              <ma14:wrappingTextBoxFlag xmlns:ma14="http://schemas.microsoft.com/office/mac/drawingml/2011/main" val="1"/>
-            </a:ext>
-          </a:extLst>
-        </p:spPr>
-        <p:txBody>
-          <a:bodyPr lIns="50800" tIns="50800" rIns="50800" bIns="50800" anchor="ctr">
-            <a:spAutoFit/>
-          </a:bodyPr>
-          <a:lstStyle/>
-          <a:p>
-            <a:pPr algn="l" defTabSz="457200">
-              <a:lnSpc>
-                <a:spcPts val="3900"/>
-              </a:lnSpc>
-              <a:spcBef>
-                <a:spcPts val="1200"/>
-              </a:spcBef>
-              <a:defRPr sz="2166">
-                <a:latin typeface="Times"/>
-                <a:ea typeface="Times"/>
-                <a:cs typeface="Times"/>
-                <a:sym typeface="Times"/>
-              </a:defRPr>
-            </a:pPr>
-            <a:r>
-              <a:t>&lt;message to=’elizabeth@longbourn.lit’ from=’darcy@pemberley.lit/dance’ </a:t>
-            </a:r>
-          </a:p>
-          <a:p>
-            <a:pPr algn="l" defTabSz="457200">
-              <a:lnSpc>
-                <a:spcPts val="3900"/>
-              </a:lnSpc>
-              <a:spcBef>
-                <a:spcPts val="1200"/>
-              </a:spcBef>
-              <a:defRPr sz="2166">
-                <a:latin typeface="Times"/>
-                <a:ea typeface="Times"/>
-                <a:cs typeface="Times"/>
-                <a:sym typeface="Times"/>
-              </a:defRPr>
-            </a:pPr>
-            <a:r>
-              <a:t>type=’chat’&gt;</a:t>
-            </a:r>
-            <a:br/>
-            <a:r>
-              <a:t>&lt;body&gt;What think you of books?&lt;/body&gt; </a:t>
-            </a:r>
-          </a:p>
-          <a:p>
-            <a:pPr algn="l" defTabSz="457200">
-              <a:lnSpc>
-                <a:spcPts val="3900"/>
-              </a:lnSpc>
-              <a:spcBef>
-                <a:spcPts val="1200"/>
-              </a:spcBef>
-              <a:defRPr sz="2166">
-                <a:latin typeface="Times"/>
-                <a:ea typeface="Times"/>
-                <a:cs typeface="Times"/>
-                <a:sym typeface="Times"/>
-              </a:defRPr>
-            </a:pPr>
-            <a:r>
-              <a:t>&lt;/message&gt; </a:t>
-            </a:r>
-            <a:endParaRPr sz="1200"/>
-          </a:p>
-        </p:txBody>
-      </p:sp>
-      <p:sp>
-        <p:nvSpPr>
-          <p:cNvPr id="183" name="Shape 183"/>
-          <p:cNvSpPr/>
-          <p:nvPr/>
-        </p:nvSpPr>
-        <p:spPr>
-          <a:xfrm>
-            <a:off x="389204" y="5905500"/>
-            <a:ext cx="12505792" cy="1193801"/>
-          </a:xfrm>
-          <a:prstGeom prst="rect">
-            <a:avLst/>
-          </a:prstGeom>
-          <a:ln w="12700">
-            <a:miter lim="400000"/>
-          </a:ln>
-          <a:extLst>
-            <a:ext uri="{C572A759-6A51-4108-AA02-DFA0A04FC94B}">
-              <ma14:wrappingTextBoxFlag xmlns:ma14="http://schemas.microsoft.com/office/mac/drawingml/2011/main" val="1"/>
-            </a:ext>
-          </a:extLst>
-        </p:spPr>
-        <p:txBody>
-          <a:bodyPr wrap="none" lIns="50800" tIns="50800" rIns="50800" bIns="50800" anchor="ctr">
-            <a:spAutoFit/>
-          </a:bodyPr>
-          <a:lstStyle/>
-          <a:p>
-            <a:pPr/>
-            <a:r>
-              <a:t>No caso da versão inicial do Tagarelas o tipo de mensagem deverá ser </a:t>
-            </a:r>
-            <a:r>
-              <a:rPr i="1">
-                <a:latin typeface="Helvetica"/>
-                <a:ea typeface="Helvetica"/>
-                <a:cs typeface="Helvetica"/>
-                <a:sym typeface="Helvetica"/>
-              </a:rPr>
-              <a:t>groupchat</a:t>
-            </a:r>
-          </a:p>
-        </p:txBody>
-      </p:sp>
-    </p:spTree>
-  </p:cSld>
-  <p:clrMapOvr>
-    <a:masterClrMapping/>
-  </p:clrMapOvr>
-  <p:transition xmlns:p14="http://schemas.microsoft.com/office/powerpoint/2010/main" spd="med" advClick="1"/>
-</p:sld>
-</file>
-
-<file path=ppt/slides/slide5.xml><?xml version="1.0" encoding="utf-8"?>
-<p:sld xmlns:a="http://schemas.openxmlformats.org/drawingml/2006/main" xmlns:r="http://schemas.openxmlformats.org/officeDocument/2006/relationships" xmlns:p="http://schemas.openxmlformats.org/presentationml/2006/main" showMasterSp="1" showMasterPhAnim="1">
+<p:sld xmlns:a="http://schemas.openxmlformats.org/drawingml/2006/main" xmlns:r="http://schemas.openxmlformats.org/officeDocument/2006/relationships" xmlns:p="http://schemas.openxmlformats.org/presentationml/2006/main">
   <p:cSld>
     <p:spTree>
       <p:nvGrpSpPr>
@@ -5773,7 +5651,9 @@
       <p:sp>
         <p:nvSpPr>
           <p:cNvPr id="185" name="Shape 185"/>
-          <p:cNvSpPr/>
+          <p:cNvSpPr>
+            <a:spLocks noGrp="1"/>
+          </p:cNvSpPr>
           <p:nvPr>
             <p:ph type="title"/>
           </p:nvPr>
@@ -5788,12 +5668,15 @@
           </a:prstGeom>
         </p:spPr>
         <p:txBody>
-          <a:bodyPr/>
+          <a:bodyPr>
+            <a:normAutofit fontScale="90000"/>
+          </a:bodyPr>
           <a:lstStyle/>
           <a:p>
             <a:pPr defTabSz="332993">
               <a:defRPr sz="4560"/>
             </a:pPr>
+            <a:endParaRPr/>
           </a:p>
           <a:p>
             <a:pPr defTabSz="332993">
@@ -5873,8 +5756,8 @@
             </a:lvl1pPr>
           </a:lstStyle>
           <a:p>
-            <a:pPr/>
-            <a:r>
+            <a:r>
+              <a:rPr dirty="0"/>
               <a:t>PHP</a:t>
             </a:r>
           </a:p>
@@ -5919,7 +5802,6 @@
             </a:lvl1pPr>
           </a:lstStyle>
           <a:p>
-            <a:pPr/>
             <a:r>
               <a:t>Doctrine</a:t>
             </a:r>
@@ -5959,6 +5841,7 @@
                 <a:sym typeface="Arial"/>
               </a:defRPr>
             </a:pPr>
+            <a:endParaRPr/>
           </a:p>
         </p:txBody>
       </p:sp>
@@ -6005,7 +5888,6 @@
             </a:lvl1pPr>
           </a:lstStyle>
           <a:p>
-            <a:pPr/>
             <a:r>
               <a:t>Cadastros</a:t>
             </a:r>
@@ -6020,8 +5902,8 @@
         </p:nvSpPr>
         <p:spPr>
           <a:xfrm>
-            <a:off x="4755728" y="5886450"/>
-            <a:ext cx="2604344" cy="647701"/>
+            <a:off x="4710940" y="7840206"/>
+            <a:ext cx="2616101" cy="1210588"/>
           </a:xfrm>
           <a:prstGeom prst="rect">
             <a:avLst/>
@@ -6057,10 +5939,18 @@
             </a:lvl1pPr>
           </a:lstStyle>
           <a:p>
-            <a:pPr/>
-            <a:r>
+            <a:r>
+              <a:rPr dirty="0" smtClean="0"/>
               <a:t>Mensagens</a:t>
             </a:r>
+            <a:endParaRPr lang="en-US" dirty="0" smtClean="0"/>
+          </a:p>
+          <a:p>
+            <a:r>
+              <a:rPr lang="en-US" dirty="0" err="1" smtClean="0"/>
+              <a:t>Mídia</a:t>
+            </a:r>
+            <a:endParaRPr dirty="0"/>
           </a:p>
         </p:txBody>
       </p:sp>
@@ -6069,12 +5959,12 @@
   <p:clrMapOvr>
     <a:masterClrMapping/>
   </p:clrMapOvr>
-  <p:transition xmlns:p14="http://schemas.microsoft.com/office/powerpoint/2010/main" spd="med" advClick="1"/>
+  <p:transition spd="med"/>
 </p:sld>
 </file>
 
-<file path=ppt/slides/slide6.xml><?xml version="1.0" encoding="utf-8"?>
-<p:sld xmlns:a="http://schemas.openxmlformats.org/drawingml/2006/main" xmlns:r="http://schemas.openxmlformats.org/officeDocument/2006/relationships" xmlns:p="http://schemas.openxmlformats.org/presentationml/2006/main" showMasterSp="1" showMasterPhAnim="1">
+<file path=ppt/slides/slide5.xml><?xml version="1.0" encoding="utf-8"?>
+<p:sld xmlns:a="http://schemas.openxmlformats.org/drawingml/2006/main" xmlns:r="http://schemas.openxmlformats.org/officeDocument/2006/relationships" xmlns:p="http://schemas.openxmlformats.org/presentationml/2006/main">
   <p:cSld>
     <p:spTree>
       <p:nvGrpSpPr>
@@ -6093,7 +5983,9 @@
       <p:sp>
         <p:nvSpPr>
           <p:cNvPr id="193" name="Shape 193"/>
-          <p:cNvSpPr/>
+          <p:cNvSpPr>
+            <a:spLocks noGrp="1"/>
+          </p:cNvSpPr>
           <p:nvPr>
             <p:ph type="title"/>
           </p:nvPr>
@@ -6114,6 +6006,7 @@
             <a:pPr defTabSz="490727">
               <a:defRPr sz="6719"/>
             </a:pPr>
+            <a:endParaRPr/>
           </a:p>
           <a:p>
             <a:pPr defTabSz="490727">
@@ -6146,7 +6039,7 @@
             <a:miter lim="400000"/>
           </a:ln>
           <a:effectLst>
-            <a:outerShdw sx="100000" sy="100000" kx="0" ky="0" algn="b" rotWithShape="0" blurRad="38100" dist="25400" dir="5400000">
+            <a:outerShdw blurRad="38100" dist="25400" dir="5400000" rotWithShape="0">
               <a:srgbClr val="000000">
                 <a:alpha val="50000"/>
               </a:srgbClr>
@@ -6170,7 +6063,6 @@
             </a:lvl1pPr>
           </a:lstStyle>
           <a:p>
-            <a:pPr/>
             <a:r>
               <a:t>Banco de dados</a:t>
             </a:r>
@@ -6198,7 +6090,7 @@
             <a:miter lim="400000"/>
           </a:ln>
           <a:effectLst>
-            <a:outerShdw sx="100000" sy="100000" kx="0" ky="0" algn="b" rotWithShape="0" blurRad="50800" dist="12700" dir="0">
+            <a:outerShdw blurRad="50800" dist="12700" rotWithShape="0">
               <a:srgbClr val="000000">
                 <a:alpha val="50000"/>
               </a:srgbClr>
@@ -6222,7 +6114,6 @@
             </a:lvl1pPr>
           </a:lstStyle>
           <a:p>
-            <a:pPr/>
             <a:r>
               <a:t>Doctrine</a:t>
             </a:r>
@@ -6254,7 +6145,7 @@
             <a:miter lim="400000"/>
           </a:ln>
           <a:effectLst>
-            <a:outerShdw sx="100000" sy="100000" kx="0" ky="0" algn="b" rotWithShape="0" blurRad="38100" dist="25400" dir="5400000">
+            <a:outerShdw blurRad="38100" dist="25400" dir="5400000" rotWithShape="0">
               <a:srgbClr val="000000">
                 <a:alpha val="50000"/>
               </a:srgbClr>
@@ -6278,7 +6169,6 @@
             </a:lvl1pPr>
           </a:lstStyle>
           <a:p>
-            <a:pPr/>
             <a:r>
               <a:t>config.yml</a:t>
             </a:r>
@@ -6310,7 +6200,7 @@
             <a:miter lim="400000"/>
           </a:ln>
           <a:effectLst>
-            <a:outerShdw sx="100000" sy="100000" kx="0" ky="0" algn="b" rotWithShape="0" blurRad="38100" dist="25400" dir="5400000">
+            <a:outerShdw blurRad="38100" dist="25400" dir="5400000" rotWithShape="0">
               <a:srgbClr val="000000">
                 <a:alpha val="50000"/>
               </a:srgbClr>
@@ -6334,7 +6224,6 @@
             </a:lvl1pPr>
           </a:lstStyle>
           <a:p>
-            <a:pPr/>
             <a:r>
               <a:t>EntityManager</a:t>
             </a:r>
@@ -6366,7 +6255,7 @@
             <a:miter lim="400000"/>
           </a:ln>
           <a:effectLst>
-            <a:outerShdw sx="100000" sy="100000" kx="0" ky="0" algn="b" rotWithShape="0" blurRad="38100" dist="25400" dir="5400000">
+            <a:outerShdw blurRad="38100" dist="25400" dir="5400000" rotWithShape="0">
               <a:srgbClr val="000000">
                 <a:alpha val="50000"/>
               </a:srgbClr>
@@ -6390,7 +6279,6 @@
             </a:lvl1pPr>
           </a:lstStyle>
           <a:p>
-            <a:pPr/>
             <a:r>
               <a:t>QueryBuilder</a:t>
             </a:r>
@@ -6422,7 +6310,7 @@
             <a:miter lim="400000"/>
           </a:ln>
           <a:effectLst>
-            <a:outerShdw sx="100000" sy="100000" kx="0" ky="0" algn="b" rotWithShape="0" blurRad="38100" dist="25400" dir="5400000">
+            <a:outerShdw blurRad="38100" dist="25400" dir="5400000" rotWithShape="0">
               <a:srgbClr val="000000">
                 <a:alpha val="50000"/>
               </a:srgbClr>
@@ -6446,7 +6334,6 @@
             </a:lvl1pPr>
           </a:lstStyle>
           <a:p>
-            <a:pPr/>
             <a:r>
               <a:t>Transaction</a:t>
             </a:r>
@@ -6478,7 +6365,7 @@
             <a:miter lim="400000"/>
           </a:ln>
           <a:effectLst>
-            <a:outerShdw sx="100000" sy="100000" kx="0" ky="0" algn="b" rotWithShape="0" blurRad="38100" dist="25400" dir="5400000">
+            <a:outerShdw blurRad="38100" dist="25400" dir="5400000" rotWithShape="0">
               <a:srgbClr val="000000">
                 <a:alpha val="50000"/>
               </a:srgbClr>
@@ -6502,7 +6389,6 @@
             </a:lvl1pPr>
           </a:lstStyle>
           <a:p>
-            <a:pPr/>
             <a:r>
               <a:t>Entity</a:t>
             </a:r>
@@ -6530,7 +6416,7 @@
             <a:miter lim="400000"/>
           </a:ln>
           <a:effectLst>
-            <a:outerShdw sx="100000" sy="100000" kx="0" ky="0" algn="b" rotWithShape="0" blurRad="38100" dist="25400" dir="5400000">
+            <a:outerShdw blurRad="38100" dist="25400" dir="5400000" rotWithShape="0">
               <a:srgbClr val="000000">
                 <a:alpha val="50000"/>
               </a:srgbClr>
@@ -6554,7 +6440,6 @@
             </a:lvl1pPr>
           </a:lstStyle>
           <a:p>
-            <a:pPr/>
             <a:r>
               <a:t>Service</a:t>
             </a:r>
@@ -6586,7 +6471,7 @@
             <a:miter lim="400000"/>
           </a:ln>
           <a:effectLst>
-            <a:outerShdw sx="100000" sy="100000" kx="0" ky="0" algn="b" rotWithShape="0" blurRad="38100" dist="25400" dir="5400000">
+            <a:outerShdw blurRad="38100" dist="25400" dir="5400000" rotWithShape="0">
               <a:srgbClr val="000000">
                 <a:alpha val="50000"/>
               </a:srgbClr>
@@ -6610,7 +6495,6 @@
             </a:lvl1pPr>
           </a:lstStyle>
           <a:p>
-            <a:pPr/>
             <a:r>
               <a:t>Controller</a:t>
             </a:r>
@@ -6641,7 +6525,7 @@
             <a:miter lim="400000"/>
           </a:ln>
           <a:effectLst>
-            <a:outerShdw sx="100000" sy="100000" kx="0" ky="0" algn="b" rotWithShape="0" blurRad="38100" dist="25400" dir="5400000">
+            <a:outerShdw blurRad="38100" dist="25400" dir="5400000" rotWithShape="0">
               <a:srgbClr val="000000">
                 <a:alpha val="50000"/>
               </a:srgbClr>
@@ -6665,7 +6549,6 @@
             </a:lvl1pPr>
           </a:lstStyle>
           <a:p>
-            <a:pPr/>
             <a:r>
               <a:t>View</a:t>
             </a:r>
@@ -6693,7 +6576,7 @@
             <a:miter lim="400000"/>
           </a:ln>
           <a:effectLst>
-            <a:outerShdw sx="100000" sy="100000" kx="0" ky="0" algn="b" rotWithShape="0" blurRad="38100" dist="25400" dir="5400000">
+            <a:outerShdw blurRad="38100" dist="25400" dir="5400000" rotWithShape="0">
               <a:srgbClr val="000000">
                 <a:alpha val="50000"/>
               </a:srgbClr>
@@ -6713,7 +6596,6 @@
             </a:lvl1pPr>
           </a:lstStyle>
           <a:p>
-            <a:pPr/>
             <a:r>
               <a:t>Ajax</a:t>
             </a:r>
@@ -6745,7 +6627,7 @@
             <a:miter lim="400000"/>
           </a:ln>
           <a:effectLst>
-            <a:outerShdw sx="100000" sy="100000" kx="0" ky="0" algn="b" rotWithShape="0" blurRad="38100" dist="25400" dir="5400000">
+            <a:outerShdw blurRad="38100" dist="25400" dir="5400000" rotWithShape="0">
               <a:srgbClr val="000000">
                 <a:alpha val="50000"/>
               </a:srgbClr>
@@ -6769,7 +6651,6 @@
             </a:lvl1pPr>
           </a:lstStyle>
           <a:p>
-            <a:pPr/>
             <a:r>
               <a:t>html.twig</a:t>
             </a:r>
@@ -6801,7 +6682,7 @@
             <a:miter lim="400000"/>
           </a:ln>
           <a:effectLst>
-            <a:outerShdw sx="100000" sy="100000" kx="0" ky="0" algn="b" rotWithShape="0" blurRad="38100" dist="25400" dir="5400000">
+            <a:outerShdw blurRad="38100" dist="25400" dir="5400000" rotWithShape="0">
               <a:srgbClr val="000000">
                 <a:alpha val="50000"/>
               </a:srgbClr>
@@ -6825,7 +6706,6 @@
             </a:lvl1pPr>
           </a:lstStyle>
           <a:p>
-            <a:pPr/>
             <a:r>
               <a:t>JQuery</a:t>
             </a:r>
@@ -6857,7 +6737,7 @@
             <a:miter lim="400000"/>
           </a:ln>
           <a:effectLst>
-            <a:outerShdw sx="100000" sy="100000" kx="0" ky="0" algn="b" rotWithShape="0" blurRad="38100" dist="25400" dir="5400000">
+            <a:outerShdw blurRad="38100" dist="25400" dir="5400000" rotWithShape="0">
               <a:srgbClr val="000000">
                 <a:alpha val="50000"/>
               </a:srgbClr>
@@ -6881,7 +6761,6 @@
             </a:lvl1pPr>
           </a:lstStyle>
           <a:p>
-            <a:pPr/>
             <a:r>
               <a:t>Vendor</a:t>
             </a:r>
@@ -6913,7 +6792,7 @@
             <a:miter lim="400000"/>
           </a:ln>
           <a:effectLst>
-            <a:outerShdw sx="100000" sy="100000" kx="0" ky="0" algn="b" rotWithShape="0" blurRad="38100" dist="25400" dir="5400000">
+            <a:outerShdw blurRad="38100" dist="25400" dir="5400000" rotWithShape="0">
               <a:srgbClr val="000000">
                 <a:alpha val="50000"/>
               </a:srgbClr>
@@ -6937,7 +6816,6 @@
             </a:lvl1pPr>
           </a:lstStyle>
           <a:p>
-            <a:pPr/>
             <a:r>
               <a:t>Templates</a:t>
             </a:r>
@@ -6965,7 +6843,7 @@
             <a:miter lim="400000"/>
           </a:ln>
           <a:effectLst>
-            <a:outerShdw sx="100000" sy="100000" kx="0" ky="0" algn="b" rotWithShape="0" blurRad="25400" dist="25400" dir="2388334">
+            <a:outerShdw blurRad="25400" dist="25400" dir="2388334" rotWithShape="0">
               <a:srgbClr val="000000">
                 <a:alpha val="79310"/>
               </a:srgbClr>
@@ -6981,7 +6859,7 @@
           <a:bodyPr lIns="50800" tIns="50800" rIns="50800" bIns="50800" anchor="ctr"/>
           <a:lstStyle>
             <a:lvl1pPr>
-              <a:defRPr b="1" sz="4300">
+              <a:defRPr sz="4300" b="1">
                 <a:solidFill>
                   <a:srgbClr val="FFFFFF"/>
                 </a:solidFill>
@@ -6993,7 +6871,6 @@
             </a:lvl1pPr>
           </a:lstStyle>
           <a:p>
-            <a:pPr/>
             <a:r>
               <a:t>EXCEPTION</a:t>
             </a:r>
@@ -7008,7 +6885,7 @@
         </p:nvSpPr>
         <p:spPr>
           <a:xfrm>
-            <a:off x="1323454" y="1976090"/>
+            <a:off x="743522" y="1975109"/>
             <a:ext cx="544662" cy="7466708"/>
           </a:xfrm>
           <a:prstGeom prst="rect">
@@ -7025,7 +6902,7 @@
             <a:miter lim="400000"/>
           </a:ln>
           <a:effectLst>
-            <a:outerShdw sx="100000" sy="100000" kx="0" ky="0" algn="b" rotWithShape="0" blurRad="38100" dist="25400" dir="5400000">
+            <a:outerShdw blurRad="38100" dist="25400" dir="5400000" rotWithShape="0">
               <a:srgbClr val="000000">
                 <a:alpha val="50000"/>
               </a:srgbClr>
@@ -7041,7 +6918,7 @@
           <a:bodyPr lIns="50800" tIns="50800" rIns="50800" bIns="50800" anchor="ctr"/>
           <a:lstStyle>
             <a:lvl1pPr>
-              <a:defRPr b="1" sz="4300">
+              <a:defRPr sz="4300" b="1">
                 <a:solidFill>
                   <a:srgbClr val="FFFFFF"/>
                 </a:solidFill>
@@ -7053,10 +6930,70 @@
             </a:lvl1pPr>
           </a:lstStyle>
           <a:p>
-            <a:pPr/>
             <a:r>
               <a:t>XMPP</a:t>
             </a:r>
+          </a:p>
+        </p:txBody>
+      </p:sp>
+      <p:sp>
+        <p:nvSpPr>
+          <p:cNvPr id="20" name="Shape 210"/>
+          <p:cNvSpPr/>
+          <p:nvPr/>
+        </p:nvSpPr>
+        <p:spPr>
+          <a:xfrm>
+            <a:off x="1316807" y="1975109"/>
+            <a:ext cx="544662" cy="7466708"/>
+          </a:xfrm>
+          <a:prstGeom prst="rect">
+            <a:avLst/>
+          </a:prstGeom>
+          <a:solidFill>
+            <a:schemeClr val="accent1">
+              <a:hueOff val="47394"/>
+              <a:satOff val="-25753"/>
+              <a:lumOff val="-7544"/>
+            </a:schemeClr>
+          </a:solidFill>
+          <a:ln w="12700">
+            <a:miter lim="400000"/>
+          </a:ln>
+          <a:effectLst>
+            <a:outerShdw blurRad="38100" dist="25400" dir="5400000" rotWithShape="0">
+              <a:srgbClr val="000000">
+                <a:alpha val="50000"/>
+              </a:srgbClr>
+            </a:outerShdw>
+          </a:effectLst>
+          <a:extLst>
+            <a:ext uri="{C572A759-6A51-4108-AA02-DFA0A04FC94B}">
+              <ma14:wrappingTextBoxFlag xmlns:ma14="http://schemas.microsoft.com/office/mac/drawingml/2011/main" val="1"/>
+            </a:ext>
+          </a:extLst>
+        </p:spPr>
+        <p:txBody>
+          <a:bodyPr lIns="50800" tIns="50800" rIns="50800" bIns="50800" anchor="ctr"/>
+          <a:lstStyle>
+            <a:lvl1pPr>
+              <a:defRPr sz="4300" b="1">
+                <a:solidFill>
+                  <a:srgbClr val="FFFFFF"/>
+                </a:solidFill>
+                <a:latin typeface="Helvetica"/>
+                <a:ea typeface="Helvetica"/>
+                <a:cs typeface="Helvetica"/>
+                <a:sym typeface="Helvetica"/>
+              </a:defRPr>
+            </a:lvl1pPr>
+          </a:lstStyle>
+          <a:p>
+            <a:r>
+              <a:rPr lang="en-US" dirty="0" smtClean="0"/>
+              <a:t>REST-API</a:t>
+            </a:r>
+            <a:endParaRPr dirty="0"/>
           </a:p>
         </p:txBody>
       </p:sp>
@@ -7065,12 +7002,244 @@
   <p:clrMapOvr>
     <a:masterClrMapping/>
   </p:clrMapOvr>
-  <p:transition xmlns:p14="http://schemas.microsoft.com/office/powerpoint/2010/main" spd="med" advClick="1"/>
+  <p:transition spd="med"/>
+</p:sld>
+</file>
+
+<file path=ppt/slides/slide6.xml><?xml version="1.0" encoding="utf-8"?>
+<p:sld xmlns:a="http://schemas.openxmlformats.org/drawingml/2006/main" xmlns:r="http://schemas.openxmlformats.org/officeDocument/2006/relationships" xmlns:p="http://schemas.openxmlformats.org/presentationml/2006/main">
+  <p:cSld>
+    <p:spTree>
+      <p:nvGrpSpPr>
+        <p:cNvPr id="1" name=""/>
+        <p:cNvGrpSpPr/>
+        <p:nvPr/>
+      </p:nvGrpSpPr>
+      <p:grpSpPr>
+        <a:xfrm>
+          <a:off x="0" y="0"/>
+          <a:ext cx="0" cy="0"/>
+          <a:chOff x="0" y="0"/>
+          <a:chExt cx="0" cy="0"/>
+        </a:xfrm>
+      </p:grpSpPr>
+      <p:sp>
+        <p:nvSpPr>
+          <p:cNvPr id="180" name="Shape 180"/>
+          <p:cNvSpPr>
+            <a:spLocks noGrp="1"/>
+          </p:cNvSpPr>
+          <p:nvPr>
+            <p:ph type="title"/>
+          </p:nvPr>
+        </p:nvSpPr>
+        <p:spPr>
+          <a:xfrm>
+            <a:off x="955063" y="582982"/>
+            <a:ext cx="11099800" cy="2159000"/>
+          </a:xfrm>
+          <a:prstGeom prst="rect">
+            <a:avLst/>
+          </a:prstGeom>
+        </p:spPr>
+        <p:txBody>
+          <a:bodyPr/>
+          <a:lstStyle>
+            <a:lvl1pPr defTabSz="508254">
+              <a:defRPr sz="6960"/>
+            </a:lvl1pPr>
+          </a:lstStyle>
+          <a:p>
+            <a:r>
+              <a:rPr lang="en-US" dirty="0" smtClean="0"/>
+              <a:t>REST</a:t>
+            </a:r>
+            <a:endParaRPr dirty="0"/>
+          </a:p>
+        </p:txBody>
+      </p:sp>
+      <p:sp>
+        <p:nvSpPr>
+          <p:cNvPr id="2" name="CaixaDeTexto 1"/>
+          <p:cNvSpPr txBox="1"/>
+          <p:nvPr/>
+        </p:nvSpPr>
+        <p:spPr>
+          <a:xfrm>
+            <a:off x="955063" y="2741982"/>
+            <a:ext cx="11399474" cy="1579920"/>
+          </a:xfrm>
+          <a:prstGeom prst="rect">
+            <a:avLst/>
+          </a:prstGeom>
+          <a:noFill/>
+          <a:ln w="12700" cap="flat">
+            <a:noFill/>
+            <a:miter lim="400000"/>
+          </a:ln>
+          <a:effectLst/>
+          <a:sp3d/>
+        </p:spPr>
+        <p:style>
+          <a:lnRef idx="0">
+            <a:scrgbClr r="0" g="0" b="0"/>
+          </a:lnRef>
+          <a:fillRef idx="0">
+            <a:scrgbClr r="0" g="0" b="0"/>
+          </a:fillRef>
+          <a:effectRef idx="0">
+            <a:scrgbClr r="0" g="0" b="0"/>
+          </a:effectRef>
+          <a:fontRef idx="none"/>
+        </p:style>
+        <p:txBody>
+          <a:bodyPr rot="0" spcFirstLastPara="1" vertOverflow="overflow" horzOverflow="overflow" vert="horz" wrap="square" lIns="50800" tIns="50800" rIns="50800" bIns="50800" numCol="1" spcCol="38100" rtlCol="0" anchor="ctr">
+            <a:spAutoFit/>
+          </a:bodyPr>
+          <a:lstStyle/>
+          <a:p>
+            <a:r>
+              <a:rPr lang="pt-BR" sz="2400" dirty="0"/>
+              <a:t>A </a:t>
+            </a:r>
+            <a:r>
+              <a:rPr lang="pt-BR" sz="2400" b="1" dirty="0" err="1"/>
+              <a:t>Representational</a:t>
+            </a:r>
+            <a:r>
+              <a:rPr lang="pt-BR" sz="2400" b="1" dirty="0"/>
+              <a:t> </a:t>
+            </a:r>
+            <a:r>
+              <a:rPr lang="pt-BR" sz="2400" b="1" dirty="0" err="1"/>
+              <a:t>State</a:t>
+            </a:r>
+            <a:r>
+              <a:rPr lang="pt-BR" sz="2400" b="1" dirty="0"/>
+              <a:t> </a:t>
+            </a:r>
+            <a:r>
+              <a:rPr lang="pt-BR" sz="2400" b="1" dirty="0" err="1"/>
+              <a:t>Transfer</a:t>
+            </a:r>
+            <a:r>
+              <a:rPr lang="pt-BR" sz="2400" dirty="0"/>
+              <a:t> (</a:t>
+            </a:r>
+            <a:r>
+              <a:rPr lang="pt-BR" sz="2400" b="1" dirty="0"/>
+              <a:t>REST</a:t>
+            </a:r>
+            <a:r>
+              <a:rPr lang="pt-BR" sz="2400" dirty="0"/>
+              <a:t>), </a:t>
+            </a:r>
+            <a:r>
+              <a:rPr lang="pt-BR" sz="2400" dirty="0" smtClean="0"/>
+              <a:t> é </a:t>
+            </a:r>
+            <a:r>
+              <a:rPr lang="pt-BR" sz="2400" dirty="0"/>
+              <a:t>uma abstração da arquitetura da </a:t>
+            </a:r>
+            <a:r>
+              <a:rPr lang="pt-BR" sz="2400" i="1" dirty="0" smtClean="0"/>
+              <a:t>Web</a:t>
+            </a:r>
+            <a:r>
+              <a:rPr lang="pt-BR" sz="2400" dirty="0" smtClean="0"/>
+              <a:t> , </a:t>
+            </a:r>
+            <a:r>
+              <a:rPr lang="pt-BR" sz="2400" dirty="0"/>
+              <a:t>um estilo arquitetural que consiste de um conjunto coordenado de restrições arquiteturais aplicadas a componentes, conectores e elementos de dados dentro de um sistema de </a:t>
+            </a:r>
+            <a:r>
+              <a:rPr lang="pt-BR" sz="2400" dirty="0">
+                <a:hlinkClick r:id="rId2" tooltip="Hipermídia"/>
+              </a:rPr>
+              <a:t>hipermídia</a:t>
+            </a:r>
+            <a:r>
+              <a:rPr lang="pt-BR" sz="2400" dirty="0"/>
+              <a:t> </a:t>
+            </a:r>
+            <a:r>
+              <a:rPr lang="pt-BR" sz="2400" dirty="0">
+                <a:hlinkClick r:id="rId3" tooltip="Sistemas distribuídos"/>
+              </a:rPr>
+              <a:t>distribuído</a:t>
+            </a:r>
+            <a:r>
+              <a:rPr lang="pt-BR" sz="2400" dirty="0"/>
+              <a:t>. </a:t>
+            </a:r>
+            <a:endParaRPr kumimoji="0" lang="pt-BR" sz="2400" b="0" i="0" u="none" strike="noStrike" cap="none" spc="0" normalizeH="0" baseline="0" dirty="0">
+              <a:ln>
+                <a:noFill/>
+              </a:ln>
+              <a:solidFill>
+                <a:srgbClr val="000000"/>
+              </a:solidFill>
+              <a:effectLst/>
+              <a:uFillTx/>
+              <a:sym typeface="Helvetica Light"/>
+            </a:endParaRPr>
+          </a:p>
+        </p:txBody>
+      </p:sp>
+      <p:pic>
+        <p:nvPicPr>
+          <p:cNvPr id="1026" name="Picture 2" descr="esultado de imagem para rest api"/>
+          <p:cNvPicPr>
+            <a:picLocks noChangeAspect="1" noChangeArrowheads="1"/>
+          </p:cNvPicPr>
+          <p:nvPr/>
+        </p:nvPicPr>
+        <p:blipFill>
+          <a:blip r:embed="rId4">
+            <a:extLst>
+              <a:ext uri="{28A0092B-C50C-407E-A947-70E740481C1C}">
+                <a14:useLocalDpi xmlns:a14="http://schemas.microsoft.com/office/drawing/2010/main" val="0"/>
+              </a:ext>
+            </a:extLst>
+          </a:blip>
+          <a:srcRect/>
+          <a:stretch>
+            <a:fillRect/>
+          </a:stretch>
+        </p:blipFill>
+        <p:spPr bwMode="auto">
+          <a:xfrm>
+            <a:off x="955063" y="4226906"/>
+            <a:ext cx="12049737" cy="5252937"/>
+          </a:xfrm>
+          <a:prstGeom prst="rect">
+            <a:avLst/>
+          </a:prstGeom>
+          <a:noFill/>
+          <a:extLst>
+            <a:ext uri="{909E8E84-426E-40DD-AFC4-6F175D3DCCD1}">
+              <a14:hiddenFill xmlns:a14="http://schemas.microsoft.com/office/drawing/2010/main">
+                <a:solidFill>
+                  <a:srgbClr val="FFFFFF"/>
+                </a:solidFill>
+              </a14:hiddenFill>
+            </a:ext>
+          </a:extLst>
+        </p:spPr>
+      </p:pic>
+    </p:spTree>
+  </p:cSld>
+  <p:clrMapOvr>
+    <a:masterClrMapping/>
+  </p:clrMapOvr>
+  <p:transition spd="med"/>
 </p:sld>
 </file>
 
 <file path=ppt/slides/slide7.xml><?xml version="1.0" encoding="utf-8"?>
-<p:sld xmlns:a="http://schemas.openxmlformats.org/drawingml/2006/main" xmlns:r="http://schemas.openxmlformats.org/officeDocument/2006/relationships" xmlns:p="http://schemas.openxmlformats.org/presentationml/2006/main" showMasterSp="1" showMasterPhAnim="1">
+<p:sld xmlns:a="http://schemas.openxmlformats.org/drawingml/2006/main" xmlns:r="http://schemas.openxmlformats.org/officeDocument/2006/relationships" xmlns:p="http://schemas.openxmlformats.org/presentationml/2006/main">
   <p:cSld>
     <p:spTree>
       <p:nvGrpSpPr>
@@ -7089,7 +7258,9 @@
       <p:sp>
         <p:nvSpPr>
           <p:cNvPr id="212" name="Shape 212"/>
-          <p:cNvSpPr/>
+          <p:cNvSpPr>
+            <a:spLocks noGrp="1"/>
+          </p:cNvSpPr>
           <p:nvPr>
             <p:ph type="title"/>
           </p:nvPr>
@@ -7103,7 +7274,6 @@
           <a:bodyPr/>
           <a:lstStyle/>
           <a:p>
-            <a:pPr/>
             <a:r>
               <a:t>Pacotes</a:t>
             </a:r>
@@ -7113,7 +7283,9 @@
       <p:sp>
         <p:nvSpPr>
           <p:cNvPr id="213" name="Shape 213"/>
-          <p:cNvSpPr/>
+          <p:cNvSpPr>
+            <a:spLocks noGrp="1"/>
+          </p:cNvSpPr>
           <p:nvPr>
             <p:ph type="body" sz="half" idx="1"/>
           </p:nvPr>
@@ -7257,12 +7429,12 @@
   <p:clrMapOvr>
     <a:masterClrMapping/>
   </p:clrMapOvr>
-  <p:transition xmlns:p14="http://schemas.microsoft.com/office/powerpoint/2010/main" spd="med" advClick="1"/>
+  <p:transition spd="med"/>
 </p:sld>
 </file>
 
 <file path=ppt/slides/slide8.xml><?xml version="1.0" encoding="utf-8"?>
-<p:sld xmlns:a="http://schemas.openxmlformats.org/drawingml/2006/main" xmlns:r="http://schemas.openxmlformats.org/officeDocument/2006/relationships" xmlns:p="http://schemas.openxmlformats.org/presentationml/2006/main" showMasterSp="1" showMasterPhAnim="1">
+<p:sld xmlns:a="http://schemas.openxmlformats.org/drawingml/2006/main" xmlns:r="http://schemas.openxmlformats.org/officeDocument/2006/relationships" xmlns:p="http://schemas.openxmlformats.org/presentationml/2006/main">
   <p:cSld>
     <p:spTree>
       <p:nvGrpSpPr>
@@ -7281,7 +7453,9 @@
       <p:sp>
         <p:nvSpPr>
           <p:cNvPr id="216" name="Shape 216"/>
-          <p:cNvSpPr/>
+          <p:cNvSpPr>
+            <a:spLocks noGrp="1"/>
+          </p:cNvSpPr>
           <p:nvPr>
             <p:ph type="title"/>
           </p:nvPr>
@@ -7295,7 +7469,6 @@
           <a:bodyPr/>
           <a:lstStyle/>
           <a:p>
-            <a:pPr/>
             <a:r>
               <a:t>Diretório Web</a:t>
             </a:r>
@@ -7305,7 +7478,9 @@
       <p:sp>
         <p:nvSpPr>
           <p:cNvPr id="217" name="Shape 217"/>
-          <p:cNvSpPr/>
+          <p:cNvSpPr>
+            <a:spLocks noGrp="1"/>
+          </p:cNvSpPr>
           <p:nvPr>
             <p:ph type="body" sz="half" idx="1"/>
           </p:nvPr>
@@ -7319,7 +7494,6 @@
           <a:bodyPr/>
           <a:lstStyle/>
           <a:p>
-            <a:pPr/>
             <a:r>
               <a:t>Contém a estrutura de apoio para a camada view do sistema.</a:t>
             </a:r>
@@ -7360,12 +7534,249 @@
   <p:clrMapOvr>
     <a:masterClrMapping/>
   </p:clrMapOvr>
-  <p:transition xmlns:p14="http://schemas.microsoft.com/office/powerpoint/2010/main" spd="med" advClick="1"/>
+  <p:transition spd="med"/>
+</p:sld>
+</file>
+
+<file path=ppt/slides/slide9.xml><?xml version="1.0" encoding="utf-8"?>
+<p:sld xmlns:a="http://schemas.openxmlformats.org/drawingml/2006/main" xmlns:r="http://schemas.openxmlformats.org/officeDocument/2006/relationships" xmlns:p="http://schemas.openxmlformats.org/presentationml/2006/main">
+  <p:cSld>
+    <p:spTree>
+      <p:nvGrpSpPr>
+        <p:cNvPr id="1" name=""/>
+        <p:cNvGrpSpPr/>
+        <p:nvPr/>
+      </p:nvGrpSpPr>
+      <p:grpSpPr>
+        <a:xfrm>
+          <a:off x="0" y="0"/>
+          <a:ext cx="0" cy="0"/>
+          <a:chOff x="0" y="0"/>
+          <a:chExt cx="0" cy="0"/>
+        </a:xfrm>
+      </p:grpSpPr>
+      <p:sp>
+        <p:nvSpPr>
+          <p:cNvPr id="216" name="Shape 216"/>
+          <p:cNvSpPr>
+            <a:spLocks noGrp="1"/>
+          </p:cNvSpPr>
+          <p:nvPr>
+            <p:ph type="title"/>
+          </p:nvPr>
+        </p:nvSpPr>
+        <p:spPr>
+          <a:prstGeom prst="rect">
+            <a:avLst/>
+          </a:prstGeom>
+        </p:spPr>
+        <p:txBody>
+          <a:bodyPr/>
+          <a:lstStyle/>
+          <a:p>
+            <a:r>
+              <a:rPr lang="en-US" dirty="0" err="1" smtClean="0"/>
+              <a:t>Próximos</a:t>
+            </a:r>
+            <a:r>
+              <a:rPr lang="en-US" dirty="0" smtClean="0"/>
+              <a:t> </a:t>
+            </a:r>
+            <a:r>
+              <a:rPr lang="en-US" dirty="0" err="1" smtClean="0"/>
+              <a:t>passos</a:t>
+            </a:r>
+            <a:endParaRPr dirty="0"/>
+          </a:p>
+        </p:txBody>
+      </p:sp>
+      <p:sp>
+        <p:nvSpPr>
+          <p:cNvPr id="217" name="Shape 217"/>
+          <p:cNvSpPr>
+            <a:spLocks noGrp="1"/>
+          </p:cNvSpPr>
+          <p:nvPr>
+            <p:ph type="body" sz="half" idx="1"/>
+          </p:nvPr>
+        </p:nvSpPr>
+        <p:spPr>
+          <a:xfrm>
+            <a:off x="952500" y="2603500"/>
+            <a:ext cx="11557270" cy="6286500"/>
+          </a:xfrm>
+          <a:prstGeom prst="rect">
+            <a:avLst/>
+          </a:prstGeom>
+        </p:spPr>
+        <p:txBody>
+          <a:bodyPr/>
+          <a:lstStyle/>
+          <a:p>
+            <a:r>
+              <a:rPr lang="en-US" dirty="0" err="1" smtClean="0"/>
+              <a:t>Apresentação</a:t>
+            </a:r>
+            <a:r>
+              <a:rPr lang="en-US" dirty="0" smtClean="0"/>
+              <a:t> do </a:t>
+            </a:r>
+            <a:r>
+              <a:rPr lang="en-US" dirty="0" err="1" smtClean="0"/>
+              <a:t>estado</a:t>
+            </a:r>
+            <a:r>
+              <a:rPr lang="en-US" dirty="0" smtClean="0"/>
+              <a:t> </a:t>
+            </a:r>
+            <a:r>
+              <a:rPr lang="en-US" dirty="0" err="1" smtClean="0"/>
+              <a:t>atual</a:t>
+            </a:r>
+            <a:r>
+              <a:rPr lang="en-US" dirty="0" smtClean="0"/>
+              <a:t> da RST</a:t>
+            </a:r>
+          </a:p>
+          <a:p>
+            <a:r>
+              <a:rPr lang="en-US" dirty="0" err="1" smtClean="0"/>
+              <a:t>Treinamento</a:t>
+            </a:r>
+            <a:r>
+              <a:rPr lang="en-US" dirty="0" smtClean="0"/>
+              <a:t> - </a:t>
+            </a:r>
+            <a:r>
+              <a:rPr lang="en-US" dirty="0" err="1" smtClean="0"/>
+              <a:t>Symfony</a:t>
+            </a:r>
+            <a:endParaRPr lang="en-US" dirty="0" smtClean="0"/>
+          </a:p>
+          <a:p>
+            <a:r>
+              <a:rPr lang="en-US" dirty="0" err="1" smtClean="0"/>
+              <a:t>Treinamento</a:t>
+            </a:r>
+            <a:r>
+              <a:rPr lang="en-US" dirty="0" smtClean="0"/>
+              <a:t> - Openfire</a:t>
+            </a:r>
+          </a:p>
+          <a:p>
+            <a:r>
+              <a:rPr lang="en-US" dirty="0" err="1" smtClean="0"/>
+              <a:t>Treinamento</a:t>
+            </a:r>
+            <a:r>
+              <a:rPr lang="en-US" dirty="0" smtClean="0"/>
+              <a:t> </a:t>
+            </a:r>
+            <a:r>
+              <a:rPr lang="mr-IN" dirty="0" smtClean="0"/>
+              <a:t>–</a:t>
+            </a:r>
+            <a:r>
+              <a:rPr lang="en-US" dirty="0" smtClean="0"/>
+              <a:t> REST (</a:t>
+            </a:r>
+            <a:r>
+              <a:rPr lang="pt-BR" b="1" dirty="0" err="1" smtClean="0"/>
+              <a:t>RE</a:t>
+            </a:r>
+            <a:r>
+              <a:rPr lang="pt-BR" dirty="0" err="1" smtClean="0"/>
+              <a:t>presentational</a:t>
+            </a:r>
+            <a:r>
+              <a:rPr lang="pt-BR" dirty="0" smtClean="0"/>
+              <a:t> </a:t>
+            </a:r>
+            <a:r>
+              <a:rPr lang="pt-BR" b="1" dirty="0" err="1"/>
+              <a:t>S</a:t>
+            </a:r>
+            <a:r>
+              <a:rPr lang="pt-BR" dirty="0" err="1"/>
+              <a:t>tate</a:t>
+            </a:r>
+            <a:r>
+              <a:rPr lang="pt-BR" dirty="0"/>
+              <a:t> </a:t>
+            </a:r>
+            <a:r>
+              <a:rPr lang="pt-BR" b="1" dirty="0" err="1" smtClean="0"/>
+              <a:t>T</a:t>
+            </a:r>
+            <a:r>
+              <a:rPr lang="pt-BR" dirty="0" err="1" smtClean="0"/>
+              <a:t>ransfer</a:t>
+            </a:r>
+            <a:r>
+              <a:rPr lang="pt-BR" dirty="0" smtClean="0"/>
+              <a:t>)</a:t>
+            </a:r>
+            <a:endParaRPr lang="en-US" dirty="0" smtClean="0"/>
+          </a:p>
+          <a:p>
+            <a:r>
+              <a:rPr lang="en-US" dirty="0" err="1" smtClean="0"/>
+              <a:t>Treinamento</a:t>
+            </a:r>
+            <a:r>
+              <a:rPr lang="en-US" dirty="0" smtClean="0"/>
+              <a:t> </a:t>
+            </a:r>
+            <a:r>
+              <a:rPr lang="en-US" dirty="0" err="1" smtClean="0"/>
+              <a:t>na</a:t>
+            </a:r>
+            <a:r>
+              <a:rPr lang="en-US" dirty="0" smtClean="0"/>
+              <a:t> </a:t>
+            </a:r>
+            <a:r>
+              <a:rPr lang="en-US" dirty="0" err="1" smtClean="0"/>
+              <a:t>arquitetura</a:t>
+            </a:r>
+            <a:r>
+              <a:rPr lang="en-US" dirty="0" smtClean="0"/>
+              <a:t> da RST / Openfire</a:t>
+            </a:r>
+          </a:p>
+          <a:p>
+            <a:r>
+              <a:rPr lang="en-US" dirty="0" err="1" smtClean="0"/>
+              <a:t>Distribuição</a:t>
+            </a:r>
+            <a:r>
+              <a:rPr lang="en-US" dirty="0" smtClean="0"/>
+              <a:t> de </a:t>
+            </a:r>
+            <a:r>
+              <a:rPr lang="en-US" dirty="0" err="1" smtClean="0"/>
+              <a:t>tarefas</a:t>
+            </a:r>
+            <a:endParaRPr dirty="0"/>
+          </a:p>
+        </p:txBody>
+      </p:sp>
+    </p:spTree>
+    <p:extLst>
+      <p:ext uri="{BB962C8B-B14F-4D97-AF65-F5344CB8AC3E}">
+        <p14:creationId xmlns:p14="http://schemas.microsoft.com/office/powerpoint/2010/main" val="266831960"/>
+      </p:ext>
+    </p:extLst>
+  </p:cSld>
+  <p:clrMapOvr>
+    <a:masterClrMapping/>
+  </p:clrMapOvr>
+  <p:transition spd="med"/>
 </p:sld>
 </file>
 
 <file path=ppt/theme/theme1.xml><?xml version="1.0" encoding="utf-8"?>
-<a:theme xmlns:a="http://schemas.openxmlformats.org/drawingml/2006/main" xmlns:r="http://schemas.openxmlformats.org/officeDocument/2006/relationships" name="White">
+<a:theme xmlns:a="http://schemas.openxmlformats.org/drawingml/2006/main" name="White">
   <a:themeElements>
     <a:clrScheme name="White">
       <a:dk1>
@@ -7491,7 +7902,7 @@
       <a:effectStyleLst>
         <a:effectStyle>
           <a:effectLst>
-            <a:outerShdw sx="100000" sy="100000" kx="0" ky="0" algn="b" rotWithShape="0" blurRad="38100" dist="25400" dir="5400000">
+            <a:outerShdw blurRad="38100" dist="25400" dir="5400000" rotWithShape="0">
               <a:srgbClr val="000000">
                 <a:alpha val="50000"/>
               </a:srgbClr>
@@ -7500,7 +7911,7 @@
         </a:effectStyle>
         <a:effectStyle>
           <a:effectLst>
-            <a:outerShdw sx="100000" sy="100000" kx="0" ky="0" algn="b" rotWithShape="0" blurRad="50800" dist="12700" dir="0">
+            <a:outerShdw blurRad="50800" dist="12700" rotWithShape="0">
               <a:srgbClr val="000000">
                 <a:alpha val="50000"/>
               </a:srgbClr>
@@ -7509,7 +7920,7 @@
         </a:effectStyle>
         <a:effectStyle>
           <a:effectLst>
-            <a:outerShdw sx="100000" sy="100000" kx="0" ky="0" algn="b" rotWithShape="0" blurRad="38100" dist="25400" dir="5400000">
+            <a:outerShdw blurRad="38100" dist="25400" dir="5400000" rotWithShape="0">
               <a:srgbClr val="000000">
                 <a:alpha val="50000"/>
               </a:srgbClr>
@@ -7573,8 +7984,8 @@
     <a:spDef>
       <a:spPr>
         <a:blipFill rotWithShape="1">
-          <a:blip r:embed="rId1"/>
-          <a:srcRect l="0" t="0" r="0" b="0"/>
+          <a:blip xmlns:r="http://schemas.openxmlformats.org/officeDocument/2006/relationships" r:embed="rId1"/>
+          <a:srcRect/>
           <a:tile tx="0" ty="0" sx="100000" sy="100000" flip="none" algn="tl"/>
         </a:blipFill>
         <a:ln w="12700" cap="flat">
@@ -7582,7 +7993,7 @@
           <a:miter lim="400000"/>
         </a:ln>
         <a:effectLst>
-          <a:outerShdw sx="100000" sy="100000" kx="0" ky="0" algn="b" rotWithShape="0" blurRad="38100" dist="25400" dir="5400000">
+          <a:outerShdw blurRad="38100" dist="25400" dir="5400000" rotWithShape="0">
             <a:srgbClr val="000000">
               <a:alpha val="50000"/>
             </a:srgbClr>
@@ -7590,7 +8001,7 @@
         </a:effectLst>
         <a:sp3d/>
       </a:spPr>
-      <a:bodyPr rot="0" spcFirstLastPara="1" vertOverflow="overflow" horzOverflow="overflow" vert="horz" wrap="square" lIns="50800" tIns="50800" rIns="50800" bIns="50800" numCol="1" spcCol="38100" rtlCol="0" anchor="ctr" upright="0">
+      <a:bodyPr rot="0" spcFirstLastPara="1" vertOverflow="overflow" horzOverflow="overflow" vert="horz" wrap="square" lIns="50800" tIns="50800" rIns="50800" bIns="50800" numCol="1" spcCol="38100" rtlCol="0" anchor="ctr">
         <a:spAutoFit/>
       </a:bodyPr>
       <a:lstStyle>
@@ -7609,7 +8020,7 @@
           <a:buFontTx/>
           <a:buNone/>
           <a:tabLst/>
-          <a:defRPr b="0" baseline="0" cap="none" i="0" spc="0" strike="noStrike" sz="2400" u="none" kumimoji="0" normalizeH="0">
+          <a:defRPr kumimoji="0" sz="2400" b="0" i="0" u="none" strike="noStrike" cap="none" spc="0" normalizeH="0" baseline="0">
             <a:ln>
               <a:noFill/>
             </a:ln>
@@ -7639,7 +8050,7 @@
           <a:buFontTx/>
           <a:buNone/>
           <a:tabLst/>
-          <a:defRPr b="0" baseline="0" cap="none" i="0" spc="0" strike="noStrike" sz="1800" u="none" kumimoji="0" normalizeH="0">
+          <a:defRPr kumimoji="0" sz="1800" b="0" i="0" u="none" strike="noStrike" cap="none" spc="0" normalizeH="0" baseline="0">
             <a:ln>
               <a:noFill/>
             </a:ln>
@@ -7665,7 +8076,7 @@
           <a:buFontTx/>
           <a:buNone/>
           <a:tabLst/>
-          <a:defRPr b="0" baseline="0" cap="none" i="0" spc="0" strike="noStrike" sz="1800" u="none" kumimoji="0" normalizeH="0">
+          <a:defRPr kumimoji="0" sz="1800" b="0" i="0" u="none" strike="noStrike" cap="none" spc="0" normalizeH="0" baseline="0">
             <a:ln>
               <a:noFill/>
             </a:ln>
@@ -7691,7 +8102,7 @@
           <a:buFontTx/>
           <a:buNone/>
           <a:tabLst/>
-          <a:defRPr b="0" baseline="0" cap="none" i="0" spc="0" strike="noStrike" sz="1800" u="none" kumimoji="0" normalizeH="0">
+          <a:defRPr kumimoji="0" sz="1800" b="0" i="0" u="none" strike="noStrike" cap="none" spc="0" normalizeH="0" baseline="0">
             <a:ln>
               <a:noFill/>
             </a:ln>
@@ -7717,7 +8128,7 @@
           <a:buFontTx/>
           <a:buNone/>
           <a:tabLst/>
-          <a:defRPr b="0" baseline="0" cap="none" i="0" spc="0" strike="noStrike" sz="1800" u="none" kumimoji="0" normalizeH="0">
+          <a:defRPr kumimoji="0" sz="1800" b="0" i="0" u="none" strike="noStrike" cap="none" spc="0" normalizeH="0" baseline="0">
             <a:ln>
               <a:noFill/>
             </a:ln>
@@ -7743,7 +8154,7 @@
           <a:buFontTx/>
           <a:buNone/>
           <a:tabLst/>
-          <a:defRPr b="0" baseline="0" cap="none" i="0" spc="0" strike="noStrike" sz="1800" u="none" kumimoji="0" normalizeH="0">
+          <a:defRPr kumimoji="0" sz="1800" b="0" i="0" u="none" strike="noStrike" cap="none" spc="0" normalizeH="0" baseline="0">
             <a:ln>
               <a:noFill/>
             </a:ln>
@@ -7769,7 +8180,7 @@
           <a:buFontTx/>
           <a:buNone/>
           <a:tabLst/>
-          <a:defRPr b="0" baseline="0" cap="none" i="0" spc="0" strike="noStrike" sz="1800" u="none" kumimoji="0" normalizeH="0">
+          <a:defRPr kumimoji="0" sz="1800" b="0" i="0" u="none" strike="noStrike" cap="none" spc="0" normalizeH="0" baseline="0">
             <a:ln>
               <a:noFill/>
             </a:ln>
@@ -7795,7 +8206,7 @@
           <a:buFontTx/>
           <a:buNone/>
           <a:tabLst/>
-          <a:defRPr b="0" baseline="0" cap="none" i="0" spc="0" strike="noStrike" sz="1800" u="none" kumimoji="0" normalizeH="0">
+          <a:defRPr kumimoji="0" sz="1800" b="0" i="0" u="none" strike="noStrike" cap="none" spc="0" normalizeH="0" baseline="0">
             <a:ln>
               <a:noFill/>
             </a:ln>
@@ -7821,7 +8232,7 @@
           <a:buFontTx/>
           <a:buNone/>
           <a:tabLst/>
-          <a:defRPr b="0" baseline="0" cap="none" i="0" spc="0" strike="noStrike" sz="1800" u="none" kumimoji="0" normalizeH="0">
+          <a:defRPr kumimoji="0" sz="1800" b="0" i="0" u="none" strike="noStrike" cap="none" spc="0" normalizeH="0" baseline="0">
             <a:ln>
               <a:noFill/>
             </a:ln>
@@ -7847,7 +8258,7 @@
           <a:buFontTx/>
           <a:buNone/>
           <a:tabLst/>
-          <a:defRPr b="0" baseline="0" cap="none" i="0" spc="0" strike="noStrike" sz="1800" u="none" kumimoji="0" normalizeH="0">
+          <a:defRPr kumimoji="0" sz="1800" b="0" i="0" u="none" strike="noStrike" cap="none" spc="0" normalizeH="0" baseline="0">
             <a:ln>
               <a:noFill/>
             </a:ln>
@@ -7860,9 +8271,15 @@
         </a:lvl9pPr>
       </a:lstStyle>
       <a:style>
-        <a:lnRef idx="0"/>
-        <a:fillRef idx="0"/>
-        <a:effectRef idx="0"/>
+        <a:lnRef idx="0">
+          <a:scrgbClr r="0" g="0" b="0"/>
+        </a:lnRef>
+        <a:fillRef idx="0">
+          <a:scrgbClr r="0" g="0" b="0"/>
+        </a:fillRef>
+        <a:effectRef idx="0">
+          <a:scrgbClr r="0" g="0" b="0"/>
+        </a:effectRef>
         <a:fontRef idx="none"/>
       </a:style>
     </a:spDef>
@@ -7879,7 +8296,7 @@
         <a:effectLst/>
         <a:sp3d/>
       </a:spPr>
-      <a:bodyPr rot="0" spcFirstLastPara="1" vertOverflow="overflow" horzOverflow="overflow" vert="horz" wrap="square" lIns="91439" tIns="45719" rIns="91439" bIns="45719" numCol="1" spcCol="38100" rtlCol="0" anchor="t" upright="0">
+      <a:bodyPr rot="0" spcFirstLastPara="1" vertOverflow="overflow" horzOverflow="overflow" vert="horz" wrap="square" lIns="91439" tIns="45719" rIns="91439" bIns="45719" numCol="1" spcCol="38100" rtlCol="0" anchor="t">
         <a:noAutofit/>
       </a:bodyPr>
       <a:lstStyle>
@@ -7898,7 +8315,7 @@
           <a:buFontTx/>
           <a:buNone/>
           <a:tabLst/>
-          <a:defRPr b="0" baseline="0" cap="none" i="0" spc="0" strike="noStrike" sz="1800" u="none" kumimoji="0" normalizeH="0">
+          <a:defRPr kumimoji="0" sz="1800" b="0" i="0" u="none" strike="noStrike" cap="none" spc="0" normalizeH="0" baseline="0">
             <a:ln>
               <a:noFill/>
             </a:ln>
@@ -7924,7 +8341,7 @@
           <a:buFontTx/>
           <a:buNone/>
           <a:tabLst/>
-          <a:defRPr b="0" baseline="0" cap="none" i="0" spc="0" strike="noStrike" sz="1800" u="none" kumimoji="0" normalizeH="0">
+          <a:defRPr kumimoji="0" sz="1800" b="0" i="0" u="none" strike="noStrike" cap="none" spc="0" normalizeH="0" baseline="0">
             <a:ln>
               <a:noFill/>
             </a:ln>
@@ -7950,7 +8367,7 @@
           <a:buFontTx/>
           <a:buNone/>
           <a:tabLst/>
-          <a:defRPr b="0" baseline="0" cap="none" i="0" spc="0" strike="noStrike" sz="1800" u="none" kumimoji="0" normalizeH="0">
+          <a:defRPr kumimoji="0" sz="1800" b="0" i="0" u="none" strike="noStrike" cap="none" spc="0" normalizeH="0" baseline="0">
             <a:ln>
               <a:noFill/>
             </a:ln>
@@ -7976,7 +8393,7 @@
           <a:buFontTx/>
           <a:buNone/>
           <a:tabLst/>
-          <a:defRPr b="0" baseline="0" cap="none" i="0" spc="0" strike="noStrike" sz="1800" u="none" kumimoji="0" normalizeH="0">
+          <a:defRPr kumimoji="0" sz="1800" b="0" i="0" u="none" strike="noStrike" cap="none" spc="0" normalizeH="0" baseline="0">
             <a:ln>
               <a:noFill/>
             </a:ln>
@@ -8002,7 +8419,7 @@
           <a:buFontTx/>
           <a:buNone/>
           <a:tabLst/>
-          <a:defRPr b="0" baseline="0" cap="none" i="0" spc="0" strike="noStrike" sz="1800" u="none" kumimoji="0" normalizeH="0">
+          <a:defRPr kumimoji="0" sz="1800" b="0" i="0" u="none" strike="noStrike" cap="none" spc="0" normalizeH="0" baseline="0">
             <a:ln>
               <a:noFill/>
             </a:ln>
@@ -8028,7 +8445,7 @@
           <a:buFontTx/>
           <a:buNone/>
           <a:tabLst/>
-          <a:defRPr b="0" baseline="0" cap="none" i="0" spc="0" strike="noStrike" sz="1800" u="none" kumimoji="0" normalizeH="0">
+          <a:defRPr kumimoji="0" sz="1800" b="0" i="0" u="none" strike="noStrike" cap="none" spc="0" normalizeH="0" baseline="0">
             <a:ln>
               <a:noFill/>
             </a:ln>
@@ -8054,7 +8471,7 @@
           <a:buFontTx/>
           <a:buNone/>
           <a:tabLst/>
-          <a:defRPr b="0" baseline="0" cap="none" i="0" spc="0" strike="noStrike" sz="1800" u="none" kumimoji="0" normalizeH="0">
+          <a:defRPr kumimoji="0" sz="1800" b="0" i="0" u="none" strike="noStrike" cap="none" spc="0" normalizeH="0" baseline="0">
             <a:ln>
               <a:noFill/>
             </a:ln>
@@ -8080,7 +8497,7 @@
           <a:buFontTx/>
           <a:buNone/>
           <a:tabLst/>
-          <a:defRPr b="0" baseline="0" cap="none" i="0" spc="0" strike="noStrike" sz="1800" u="none" kumimoji="0" normalizeH="0">
+          <a:defRPr kumimoji="0" sz="1800" b="0" i="0" u="none" strike="noStrike" cap="none" spc="0" normalizeH="0" baseline="0">
             <a:ln>
               <a:noFill/>
             </a:ln>
@@ -8106,7 +8523,7 @@
           <a:buFontTx/>
           <a:buNone/>
           <a:tabLst/>
-          <a:defRPr b="0" baseline="0" cap="none" i="0" spc="0" strike="noStrike" sz="1800" u="none" kumimoji="0" normalizeH="0">
+          <a:defRPr kumimoji="0" sz="1800" b="0" i="0" u="none" strike="noStrike" cap="none" spc="0" normalizeH="0" baseline="0">
             <a:ln>
               <a:noFill/>
             </a:ln>
@@ -8132,7 +8549,7 @@
           <a:buFontTx/>
           <a:buNone/>
           <a:tabLst/>
-          <a:defRPr b="0" baseline="0" cap="none" i="0" spc="0" strike="noStrike" sz="1800" u="none" kumimoji="0" normalizeH="0">
+          <a:defRPr kumimoji="0" sz="1800" b="0" i="0" u="none" strike="noStrike" cap="none" spc="0" normalizeH="0" baseline="0">
             <a:ln>
               <a:noFill/>
             </a:ln>
@@ -8145,9 +8562,15 @@
         </a:lvl9pPr>
       </a:lstStyle>
       <a:style>
-        <a:lnRef idx="0"/>
-        <a:fillRef idx="0"/>
-        <a:effectRef idx="0"/>
+        <a:lnRef idx="0">
+          <a:scrgbClr r="0" g="0" b="0"/>
+        </a:lnRef>
+        <a:fillRef idx="0">
+          <a:scrgbClr r="0" g="0" b="0"/>
+        </a:fillRef>
+        <a:effectRef idx="0">
+          <a:scrgbClr r="0" g="0" b="0"/>
+        </a:effectRef>
         <a:fontRef idx="none"/>
       </a:style>
     </a:lnDef>
@@ -8161,7 +8584,7 @@
         <a:effectLst/>
         <a:sp3d/>
       </a:spPr>
-      <a:bodyPr rot="0" spcFirstLastPara="1" vertOverflow="overflow" horzOverflow="overflow" vert="horz" wrap="square" lIns="50800" tIns="50800" rIns="50800" bIns="50800" numCol="1" spcCol="38100" rtlCol="0" anchor="ctr" upright="0">
+      <a:bodyPr rot="0" spcFirstLastPara="1" vertOverflow="overflow" horzOverflow="overflow" vert="horz" wrap="square" lIns="50800" tIns="50800" rIns="50800" bIns="50800" numCol="1" spcCol="38100" rtlCol="0" anchor="ctr">
         <a:spAutoFit/>
       </a:bodyPr>
       <a:lstStyle>
@@ -8180,7 +8603,7 @@
           <a:buFontTx/>
           <a:buNone/>
           <a:tabLst/>
-          <a:defRPr b="0" baseline="0" cap="none" i="0" spc="0" strike="noStrike" sz="3600" u="none" kumimoji="0" normalizeH="0">
+          <a:defRPr kumimoji="0" sz="3600" b="0" i="0" u="none" strike="noStrike" cap="none" spc="0" normalizeH="0" baseline="0">
             <a:ln>
               <a:noFill/>
             </a:ln>
@@ -8210,7 +8633,7 @@
           <a:buFontTx/>
           <a:buNone/>
           <a:tabLst/>
-          <a:defRPr b="0" baseline="0" cap="none" i="0" spc="0" strike="noStrike" sz="1800" u="none" kumimoji="0" normalizeH="0">
+          <a:defRPr kumimoji="0" sz="1800" b="0" i="0" u="none" strike="noStrike" cap="none" spc="0" normalizeH="0" baseline="0">
             <a:ln>
               <a:noFill/>
             </a:ln>
@@ -8236,7 +8659,7 @@
           <a:buFontTx/>
           <a:buNone/>
           <a:tabLst/>
-          <a:defRPr b="0" baseline="0" cap="none" i="0" spc="0" strike="noStrike" sz="1800" u="none" kumimoji="0" normalizeH="0">
+          <a:defRPr kumimoji="0" sz="1800" b="0" i="0" u="none" strike="noStrike" cap="none" spc="0" normalizeH="0" baseline="0">
             <a:ln>
               <a:noFill/>
             </a:ln>
@@ -8262,7 +8685,7 @@
           <a:buFontTx/>
           <a:buNone/>
           <a:tabLst/>
-          <a:defRPr b="0" baseline="0" cap="none" i="0" spc="0" strike="noStrike" sz="1800" u="none" kumimoji="0" normalizeH="0">
+          <a:defRPr kumimoji="0" sz="1800" b="0" i="0" u="none" strike="noStrike" cap="none" spc="0" normalizeH="0" baseline="0">
             <a:ln>
               <a:noFill/>
             </a:ln>
@@ -8288,7 +8711,7 @@
           <a:buFontTx/>
           <a:buNone/>
           <a:tabLst/>
-          <a:defRPr b="0" baseline="0" cap="none" i="0" spc="0" strike="noStrike" sz="1800" u="none" kumimoji="0" normalizeH="0">
+          <a:defRPr kumimoji="0" sz="1800" b="0" i="0" u="none" strike="noStrike" cap="none" spc="0" normalizeH="0" baseline="0">
             <a:ln>
               <a:noFill/>
             </a:ln>
@@ -8314,7 +8737,7 @@
           <a:buFontTx/>
           <a:buNone/>
           <a:tabLst/>
-          <a:defRPr b="0" baseline="0" cap="none" i="0" spc="0" strike="noStrike" sz="1800" u="none" kumimoji="0" normalizeH="0">
+          <a:defRPr kumimoji="0" sz="1800" b="0" i="0" u="none" strike="noStrike" cap="none" spc="0" normalizeH="0" baseline="0">
             <a:ln>
               <a:noFill/>
             </a:ln>
@@ -8340,7 +8763,7 @@
           <a:buFontTx/>
           <a:buNone/>
           <a:tabLst/>
-          <a:defRPr b="0" baseline="0" cap="none" i="0" spc="0" strike="noStrike" sz="1800" u="none" kumimoji="0" normalizeH="0">
+          <a:defRPr kumimoji="0" sz="1800" b="0" i="0" u="none" strike="noStrike" cap="none" spc="0" normalizeH="0" baseline="0">
             <a:ln>
               <a:noFill/>
             </a:ln>
@@ -8366,7 +8789,7 @@
           <a:buFontTx/>
           <a:buNone/>
           <a:tabLst/>
-          <a:defRPr b="0" baseline="0" cap="none" i="0" spc="0" strike="noStrike" sz="1800" u="none" kumimoji="0" normalizeH="0">
+          <a:defRPr kumimoji="0" sz="1800" b="0" i="0" u="none" strike="noStrike" cap="none" spc="0" normalizeH="0" baseline="0">
             <a:ln>
               <a:noFill/>
             </a:ln>
@@ -8392,7 +8815,7 @@
           <a:buFontTx/>
           <a:buNone/>
           <a:tabLst/>
-          <a:defRPr b="0" baseline="0" cap="none" i="0" spc="0" strike="noStrike" sz="1800" u="none" kumimoji="0" normalizeH="0">
+          <a:defRPr kumimoji="0" sz="1800" b="0" i="0" u="none" strike="noStrike" cap="none" spc="0" normalizeH="0" baseline="0">
             <a:ln>
               <a:noFill/>
             </a:ln>
@@ -8418,7 +8841,7 @@
           <a:buFontTx/>
           <a:buNone/>
           <a:tabLst/>
-          <a:defRPr b="0" baseline="0" cap="none" i="0" spc="0" strike="noStrike" sz="1800" u="none" kumimoji="0" normalizeH="0">
+          <a:defRPr kumimoji="0" sz="1800" b="0" i="0" u="none" strike="noStrike" cap="none" spc="0" normalizeH="0" baseline="0">
             <a:ln>
               <a:noFill/>
             </a:ln>
@@ -8431,18 +8854,25 @@
         </a:lvl9pPr>
       </a:lstStyle>
       <a:style>
-        <a:lnRef idx="0"/>
-        <a:fillRef idx="0"/>
-        <a:effectRef idx="0"/>
+        <a:lnRef idx="0">
+          <a:scrgbClr r="0" g="0" b="0"/>
+        </a:lnRef>
+        <a:fillRef idx="0">
+          <a:scrgbClr r="0" g="0" b="0"/>
+        </a:fillRef>
+        <a:effectRef idx="0">
+          <a:scrgbClr r="0" g="0" b="0"/>
+        </a:effectRef>
         <a:fontRef idx="none"/>
       </a:style>
     </a:txDef>
   </a:objectDefaults>
+  <a:extraClrSchemeLst/>
 </a:theme>
 </file>
 
 <file path=ppt/theme/theme2.xml><?xml version="1.0" encoding="utf-8"?>
-<a:theme xmlns:a="http://schemas.openxmlformats.org/drawingml/2006/main" xmlns:r="http://schemas.openxmlformats.org/officeDocument/2006/relationships" name="White">
+<a:theme xmlns:a="http://schemas.openxmlformats.org/drawingml/2006/main" name="White">
   <a:themeElements>
     <a:clrScheme name="White">
       <a:dk1>
@@ -8568,7 +8998,7 @@
       <a:effectStyleLst>
         <a:effectStyle>
           <a:effectLst>
-            <a:outerShdw sx="100000" sy="100000" kx="0" ky="0" algn="b" rotWithShape="0" blurRad="38100" dist="25400" dir="5400000">
+            <a:outerShdw blurRad="38100" dist="25400" dir="5400000" rotWithShape="0">
               <a:srgbClr val="000000">
                 <a:alpha val="50000"/>
               </a:srgbClr>
@@ -8577,7 +9007,7 @@
         </a:effectStyle>
         <a:effectStyle>
           <a:effectLst>
-            <a:outerShdw sx="100000" sy="100000" kx="0" ky="0" algn="b" rotWithShape="0" blurRad="50800" dist="12700" dir="0">
+            <a:outerShdw blurRad="50800" dist="12700" rotWithShape="0">
               <a:srgbClr val="000000">
                 <a:alpha val="50000"/>
               </a:srgbClr>
@@ -8586,7 +9016,7 @@
         </a:effectStyle>
         <a:effectStyle>
           <a:effectLst>
-            <a:outerShdw sx="100000" sy="100000" kx="0" ky="0" algn="b" rotWithShape="0" blurRad="38100" dist="25400" dir="5400000">
+            <a:outerShdw blurRad="38100" dist="25400" dir="5400000" rotWithShape="0">
               <a:srgbClr val="000000">
                 <a:alpha val="50000"/>
               </a:srgbClr>
@@ -8650,8 +9080,8 @@
     <a:spDef>
       <a:spPr>
         <a:blipFill rotWithShape="1">
-          <a:blip r:embed="rId1"/>
-          <a:srcRect l="0" t="0" r="0" b="0"/>
+          <a:blip xmlns:r="http://schemas.openxmlformats.org/officeDocument/2006/relationships" r:embed="rId1"/>
+          <a:srcRect/>
           <a:tile tx="0" ty="0" sx="100000" sy="100000" flip="none" algn="tl"/>
         </a:blipFill>
         <a:ln w="12700" cap="flat">
@@ -8659,7 +9089,7 @@
           <a:miter lim="400000"/>
         </a:ln>
         <a:effectLst>
-          <a:outerShdw sx="100000" sy="100000" kx="0" ky="0" algn="b" rotWithShape="0" blurRad="38100" dist="25400" dir="5400000">
+          <a:outerShdw blurRad="38100" dist="25400" dir="5400000" rotWithShape="0">
             <a:srgbClr val="000000">
               <a:alpha val="50000"/>
             </a:srgbClr>
@@ -8667,7 +9097,7 @@
         </a:effectLst>
         <a:sp3d/>
       </a:spPr>
-      <a:bodyPr rot="0" spcFirstLastPara="1" vertOverflow="overflow" horzOverflow="overflow" vert="horz" wrap="square" lIns="50800" tIns="50800" rIns="50800" bIns="50800" numCol="1" spcCol="38100" rtlCol="0" anchor="ctr" upright="0">
+      <a:bodyPr rot="0" spcFirstLastPara="1" vertOverflow="overflow" horzOverflow="overflow" vert="horz" wrap="square" lIns="50800" tIns="50800" rIns="50800" bIns="50800" numCol="1" spcCol="38100" rtlCol="0" anchor="ctr">
         <a:spAutoFit/>
       </a:bodyPr>
       <a:lstStyle>
@@ -8686,7 +9116,7 @@
           <a:buFontTx/>
           <a:buNone/>
           <a:tabLst/>
-          <a:defRPr b="0" baseline="0" cap="none" i="0" spc="0" strike="noStrike" sz="2400" u="none" kumimoji="0" normalizeH="0">
+          <a:defRPr kumimoji="0" sz="2400" b="0" i="0" u="none" strike="noStrike" cap="none" spc="0" normalizeH="0" baseline="0">
             <a:ln>
               <a:noFill/>
             </a:ln>
@@ -8716,7 +9146,7 @@
           <a:buFontTx/>
           <a:buNone/>
           <a:tabLst/>
-          <a:defRPr b="0" baseline="0" cap="none" i="0" spc="0" strike="noStrike" sz="1800" u="none" kumimoji="0" normalizeH="0">
+          <a:defRPr kumimoji="0" sz="1800" b="0" i="0" u="none" strike="noStrike" cap="none" spc="0" normalizeH="0" baseline="0">
             <a:ln>
               <a:noFill/>
             </a:ln>
@@ -8742,7 +9172,7 @@
           <a:buFontTx/>
           <a:buNone/>
           <a:tabLst/>
-          <a:defRPr b="0" baseline="0" cap="none" i="0" spc="0" strike="noStrike" sz="1800" u="none" kumimoji="0" normalizeH="0">
+          <a:defRPr kumimoji="0" sz="1800" b="0" i="0" u="none" strike="noStrike" cap="none" spc="0" normalizeH="0" baseline="0">
             <a:ln>
               <a:noFill/>
             </a:ln>
@@ -8768,7 +9198,7 @@
           <a:buFontTx/>
           <a:buNone/>
           <a:tabLst/>
-          <a:defRPr b="0" baseline="0" cap="none" i="0" spc="0" strike="noStrike" sz="1800" u="none" kumimoji="0" normalizeH="0">
+          <a:defRPr kumimoji="0" sz="1800" b="0" i="0" u="none" strike="noStrike" cap="none" spc="0" normalizeH="0" baseline="0">
             <a:ln>
               <a:noFill/>
             </a:ln>
@@ -8794,7 +9224,7 @@
           <a:buFontTx/>
           <a:buNone/>
           <a:tabLst/>
-          <a:defRPr b="0" baseline="0" cap="none" i="0" spc="0" strike="noStrike" sz="1800" u="none" kumimoji="0" normalizeH="0">
+          <a:defRPr kumimoji="0" sz="1800" b="0" i="0" u="none" strike="noStrike" cap="none" spc="0" normalizeH="0" baseline="0">
             <a:ln>
               <a:noFill/>
             </a:ln>
@@ -8820,7 +9250,7 @@
           <a:buFontTx/>
           <a:buNone/>
           <a:tabLst/>
-          <a:defRPr b="0" baseline="0" cap="none" i="0" spc="0" strike="noStrike" sz="1800" u="none" kumimoji="0" normalizeH="0">
+          <a:defRPr kumimoji="0" sz="1800" b="0" i="0" u="none" strike="noStrike" cap="none" spc="0" normalizeH="0" baseline="0">
             <a:ln>
               <a:noFill/>
             </a:ln>
@@ -8846,7 +9276,7 @@
           <a:buFontTx/>
           <a:buNone/>
           <a:tabLst/>
-          <a:defRPr b="0" baseline="0" cap="none" i="0" spc="0" strike="noStrike" sz="1800" u="none" kumimoji="0" normalizeH="0">
+          <a:defRPr kumimoji="0" sz="1800" b="0" i="0" u="none" strike="noStrike" cap="none" spc="0" normalizeH="0" baseline="0">
             <a:ln>
               <a:noFill/>
             </a:ln>
@@ -8872,7 +9302,7 @@
           <a:buFontTx/>
           <a:buNone/>
           <a:tabLst/>
-          <a:defRPr b="0" baseline="0" cap="none" i="0" spc="0" strike="noStrike" sz="1800" u="none" kumimoji="0" normalizeH="0">
+          <a:defRPr kumimoji="0" sz="1800" b="0" i="0" u="none" strike="noStrike" cap="none" spc="0" normalizeH="0" baseline="0">
             <a:ln>
               <a:noFill/>
             </a:ln>
@@ -8898,7 +9328,7 @@
           <a:buFontTx/>
           <a:buNone/>
           <a:tabLst/>
-          <a:defRPr b="0" baseline="0" cap="none" i="0" spc="0" strike="noStrike" sz="1800" u="none" kumimoji="0" normalizeH="0">
+          <a:defRPr kumimoji="0" sz="1800" b="0" i="0" u="none" strike="noStrike" cap="none" spc="0" normalizeH="0" baseline="0">
             <a:ln>
               <a:noFill/>
             </a:ln>
@@ -8924,7 +9354,7 @@
           <a:buFontTx/>
           <a:buNone/>
           <a:tabLst/>
-          <a:defRPr b="0" baseline="0" cap="none" i="0" spc="0" strike="noStrike" sz="1800" u="none" kumimoji="0" normalizeH="0">
+          <a:defRPr kumimoji="0" sz="1800" b="0" i="0" u="none" strike="noStrike" cap="none" spc="0" normalizeH="0" baseline="0">
             <a:ln>
               <a:noFill/>
             </a:ln>
@@ -8937,9 +9367,15 @@
         </a:lvl9pPr>
       </a:lstStyle>
       <a:style>
-        <a:lnRef idx="0"/>
-        <a:fillRef idx="0"/>
-        <a:effectRef idx="0"/>
+        <a:lnRef idx="0">
+          <a:scrgbClr r="0" g="0" b="0"/>
+        </a:lnRef>
+        <a:fillRef idx="0">
+          <a:scrgbClr r="0" g="0" b="0"/>
+        </a:fillRef>
+        <a:effectRef idx="0">
+          <a:scrgbClr r="0" g="0" b="0"/>
+        </a:effectRef>
         <a:fontRef idx="none"/>
       </a:style>
     </a:spDef>
@@ -8956,7 +9392,7 @@
         <a:effectLst/>
         <a:sp3d/>
       </a:spPr>
-      <a:bodyPr rot="0" spcFirstLastPara="1" vertOverflow="overflow" horzOverflow="overflow" vert="horz" wrap="square" lIns="91439" tIns="45719" rIns="91439" bIns="45719" numCol="1" spcCol="38100" rtlCol="0" anchor="t" upright="0">
+      <a:bodyPr rot="0" spcFirstLastPara="1" vertOverflow="overflow" horzOverflow="overflow" vert="horz" wrap="square" lIns="91439" tIns="45719" rIns="91439" bIns="45719" numCol="1" spcCol="38100" rtlCol="0" anchor="t">
         <a:noAutofit/>
       </a:bodyPr>
       <a:lstStyle>
@@ -8975,7 +9411,7 @@
           <a:buFontTx/>
           <a:buNone/>
           <a:tabLst/>
-          <a:defRPr b="0" baseline="0" cap="none" i="0" spc="0" strike="noStrike" sz="1800" u="none" kumimoji="0" normalizeH="0">
+          <a:defRPr kumimoji="0" sz="1800" b="0" i="0" u="none" strike="noStrike" cap="none" spc="0" normalizeH="0" baseline="0">
             <a:ln>
               <a:noFill/>
             </a:ln>
@@ -9001,7 +9437,7 @@
           <a:buFontTx/>
           <a:buNone/>
           <a:tabLst/>
-          <a:defRPr b="0" baseline="0" cap="none" i="0" spc="0" strike="noStrike" sz="1800" u="none" kumimoji="0" normalizeH="0">
+          <a:defRPr kumimoji="0" sz="1800" b="0" i="0" u="none" strike="noStrike" cap="none" spc="0" normalizeH="0" baseline="0">
             <a:ln>
               <a:noFill/>
             </a:ln>
@@ -9027,7 +9463,7 @@
           <a:buFontTx/>
           <a:buNone/>
           <a:tabLst/>
-          <a:defRPr b="0" baseline="0" cap="none" i="0" spc="0" strike="noStrike" sz="1800" u="none" kumimoji="0" normalizeH="0">
+          <a:defRPr kumimoji="0" sz="1800" b="0" i="0" u="none" strike="noStrike" cap="none" spc="0" normalizeH="0" baseline="0">
             <a:ln>
               <a:noFill/>
             </a:ln>
@@ -9053,7 +9489,7 @@
           <a:buFontTx/>
           <a:buNone/>
           <a:tabLst/>
-          <a:defRPr b="0" baseline="0" cap="none" i="0" spc="0" strike="noStrike" sz="1800" u="none" kumimoji="0" normalizeH="0">
+          <a:defRPr kumimoji="0" sz="1800" b="0" i="0" u="none" strike="noStrike" cap="none" spc="0" normalizeH="0" baseline="0">
             <a:ln>
               <a:noFill/>
             </a:ln>
@@ -9079,7 +9515,7 @@
           <a:buFontTx/>
           <a:buNone/>
           <a:tabLst/>
-          <a:defRPr b="0" baseline="0" cap="none" i="0" spc="0" strike="noStrike" sz="1800" u="none" kumimoji="0" normalizeH="0">
+          <a:defRPr kumimoji="0" sz="1800" b="0" i="0" u="none" strike="noStrike" cap="none" spc="0" normalizeH="0" baseline="0">
             <a:ln>
               <a:noFill/>
             </a:ln>
@@ -9105,7 +9541,7 @@
           <a:buFontTx/>
           <a:buNone/>
           <a:tabLst/>
-          <a:defRPr b="0" baseline="0" cap="none" i="0" spc="0" strike="noStrike" sz="1800" u="none" kumimoji="0" normalizeH="0">
+          <a:defRPr kumimoji="0" sz="1800" b="0" i="0" u="none" strike="noStrike" cap="none" spc="0" normalizeH="0" baseline="0">
             <a:ln>
               <a:noFill/>
             </a:ln>
@@ -9131,7 +9567,7 @@
           <a:buFontTx/>
           <a:buNone/>
           <a:tabLst/>
-          <a:defRPr b="0" baseline="0" cap="none" i="0" spc="0" strike="noStrike" sz="1800" u="none" kumimoji="0" normalizeH="0">
+          <a:defRPr kumimoji="0" sz="1800" b="0" i="0" u="none" strike="noStrike" cap="none" spc="0" normalizeH="0" baseline="0">
             <a:ln>
               <a:noFill/>
             </a:ln>
@@ -9157,7 +9593,7 @@
           <a:buFontTx/>
           <a:buNone/>
           <a:tabLst/>
-          <a:defRPr b="0" baseline="0" cap="none" i="0" spc="0" strike="noStrike" sz="1800" u="none" kumimoji="0" normalizeH="0">
+          <a:defRPr kumimoji="0" sz="1800" b="0" i="0" u="none" strike="noStrike" cap="none" spc="0" normalizeH="0" baseline="0">
             <a:ln>
               <a:noFill/>
             </a:ln>
@@ -9183,7 +9619,7 @@
           <a:buFontTx/>
           <a:buNone/>
           <a:tabLst/>
-          <a:defRPr b="0" baseline="0" cap="none" i="0" spc="0" strike="noStrike" sz="1800" u="none" kumimoji="0" normalizeH="0">
+          <a:defRPr kumimoji="0" sz="1800" b="0" i="0" u="none" strike="noStrike" cap="none" spc="0" normalizeH="0" baseline="0">
             <a:ln>
               <a:noFill/>
             </a:ln>
@@ -9209,7 +9645,7 @@
           <a:buFontTx/>
           <a:buNone/>
           <a:tabLst/>
-          <a:defRPr b="0" baseline="0" cap="none" i="0" spc="0" strike="noStrike" sz="1800" u="none" kumimoji="0" normalizeH="0">
+          <a:defRPr kumimoji="0" sz="1800" b="0" i="0" u="none" strike="noStrike" cap="none" spc="0" normalizeH="0" baseline="0">
             <a:ln>
               <a:noFill/>
             </a:ln>
@@ -9222,9 +9658,15 @@
         </a:lvl9pPr>
       </a:lstStyle>
       <a:style>
-        <a:lnRef idx="0"/>
-        <a:fillRef idx="0"/>
-        <a:effectRef idx="0"/>
+        <a:lnRef idx="0">
+          <a:scrgbClr r="0" g="0" b="0"/>
+        </a:lnRef>
+        <a:fillRef idx="0">
+          <a:scrgbClr r="0" g="0" b="0"/>
+        </a:fillRef>
+        <a:effectRef idx="0">
+          <a:scrgbClr r="0" g="0" b="0"/>
+        </a:effectRef>
         <a:fontRef idx="none"/>
       </a:style>
     </a:lnDef>
@@ -9238,7 +9680,7 @@
         <a:effectLst/>
         <a:sp3d/>
       </a:spPr>
-      <a:bodyPr rot="0" spcFirstLastPara="1" vertOverflow="overflow" horzOverflow="overflow" vert="horz" wrap="square" lIns="50800" tIns="50800" rIns="50800" bIns="50800" numCol="1" spcCol="38100" rtlCol="0" anchor="ctr" upright="0">
+      <a:bodyPr rot="0" spcFirstLastPara="1" vertOverflow="overflow" horzOverflow="overflow" vert="horz" wrap="square" lIns="50800" tIns="50800" rIns="50800" bIns="50800" numCol="1" spcCol="38100" rtlCol="0" anchor="ctr">
         <a:spAutoFit/>
       </a:bodyPr>
       <a:lstStyle>
@@ -9257,7 +9699,7 @@
           <a:buFontTx/>
           <a:buNone/>
           <a:tabLst/>
-          <a:defRPr b="0" baseline="0" cap="none" i="0" spc="0" strike="noStrike" sz="3600" u="none" kumimoji="0" normalizeH="0">
+          <a:defRPr kumimoji="0" sz="3600" b="0" i="0" u="none" strike="noStrike" cap="none" spc="0" normalizeH="0" baseline="0">
             <a:ln>
               <a:noFill/>
             </a:ln>
@@ -9287,7 +9729,7 @@
           <a:buFontTx/>
           <a:buNone/>
           <a:tabLst/>
-          <a:defRPr b="0" baseline="0" cap="none" i="0" spc="0" strike="noStrike" sz="1800" u="none" kumimoji="0" normalizeH="0">
+          <a:defRPr kumimoji="0" sz="1800" b="0" i="0" u="none" strike="noStrike" cap="none" spc="0" normalizeH="0" baseline="0">
             <a:ln>
               <a:noFill/>
             </a:ln>
@@ -9313,7 +9755,7 @@
           <a:buFontTx/>
           <a:buNone/>
           <a:tabLst/>
-          <a:defRPr b="0" baseline="0" cap="none" i="0" spc="0" strike="noStrike" sz="1800" u="none" kumimoji="0" normalizeH="0">
+          <a:defRPr kumimoji="0" sz="1800" b="0" i="0" u="none" strike="noStrike" cap="none" spc="0" normalizeH="0" baseline="0">
             <a:ln>
               <a:noFill/>
             </a:ln>
@@ -9339,7 +9781,7 @@
           <a:buFontTx/>
           <a:buNone/>
           <a:tabLst/>
-          <a:defRPr b="0" baseline="0" cap="none" i="0" spc="0" strike="noStrike" sz="1800" u="none" kumimoji="0" normalizeH="0">
+          <a:defRPr kumimoji="0" sz="1800" b="0" i="0" u="none" strike="noStrike" cap="none" spc="0" normalizeH="0" baseline="0">
             <a:ln>
               <a:noFill/>
             </a:ln>
@@ -9365,7 +9807,7 @@
           <a:buFontTx/>
           <a:buNone/>
           <a:tabLst/>
-          <a:defRPr b="0" baseline="0" cap="none" i="0" spc="0" strike="noStrike" sz="1800" u="none" kumimoji="0" normalizeH="0">
+          <a:defRPr kumimoji="0" sz="1800" b="0" i="0" u="none" strike="noStrike" cap="none" spc="0" normalizeH="0" baseline="0">
             <a:ln>
               <a:noFill/>
             </a:ln>
@@ -9391,7 +9833,7 @@
           <a:buFontTx/>
           <a:buNone/>
           <a:tabLst/>
-          <a:defRPr b="0" baseline="0" cap="none" i="0" spc="0" strike="noStrike" sz="1800" u="none" kumimoji="0" normalizeH="0">
+          <a:defRPr kumimoji="0" sz="1800" b="0" i="0" u="none" strike="noStrike" cap="none" spc="0" normalizeH="0" baseline="0">
             <a:ln>
               <a:noFill/>
             </a:ln>
@@ -9417,7 +9859,7 @@
           <a:buFontTx/>
           <a:buNone/>
           <a:tabLst/>
-          <a:defRPr b="0" baseline="0" cap="none" i="0" spc="0" strike="noStrike" sz="1800" u="none" kumimoji="0" normalizeH="0">
+          <a:defRPr kumimoji="0" sz="1800" b="0" i="0" u="none" strike="noStrike" cap="none" spc="0" normalizeH="0" baseline="0">
             <a:ln>
               <a:noFill/>
             </a:ln>
@@ -9443,7 +9885,7 @@
           <a:buFontTx/>
           <a:buNone/>
           <a:tabLst/>
-          <a:defRPr b="0" baseline="0" cap="none" i="0" spc="0" strike="noStrike" sz="1800" u="none" kumimoji="0" normalizeH="0">
+          <a:defRPr kumimoji="0" sz="1800" b="0" i="0" u="none" strike="noStrike" cap="none" spc="0" normalizeH="0" baseline="0">
             <a:ln>
               <a:noFill/>
             </a:ln>
@@ -9469,7 +9911,7 @@
           <a:buFontTx/>
           <a:buNone/>
           <a:tabLst/>
-          <a:defRPr b="0" baseline="0" cap="none" i="0" spc="0" strike="noStrike" sz="1800" u="none" kumimoji="0" normalizeH="0">
+          <a:defRPr kumimoji="0" sz="1800" b="0" i="0" u="none" strike="noStrike" cap="none" spc="0" normalizeH="0" baseline="0">
             <a:ln>
               <a:noFill/>
             </a:ln>
@@ -9495,7 +9937,7 @@
           <a:buFontTx/>
           <a:buNone/>
           <a:tabLst/>
-          <a:defRPr b="0" baseline="0" cap="none" i="0" spc="0" strike="noStrike" sz="1800" u="none" kumimoji="0" normalizeH="0">
+          <a:defRPr kumimoji="0" sz="1800" b="0" i="0" u="none" strike="noStrike" cap="none" spc="0" normalizeH="0" baseline="0">
             <a:ln>
               <a:noFill/>
             </a:ln>
@@ -9508,12 +9950,19 @@
         </a:lvl9pPr>
       </a:lstStyle>
       <a:style>
-        <a:lnRef idx="0"/>
-        <a:fillRef idx="0"/>
-        <a:effectRef idx="0"/>
+        <a:lnRef idx="0">
+          <a:scrgbClr r="0" g="0" b="0"/>
+        </a:lnRef>
+        <a:fillRef idx="0">
+          <a:scrgbClr r="0" g="0" b="0"/>
+        </a:fillRef>
+        <a:effectRef idx="0">
+          <a:scrgbClr r="0" g="0" b="0"/>
+        </a:effectRef>
         <a:fontRef idx="none"/>
       </a:style>
     </a:txDef>
   </a:objectDefaults>
+  <a:extraClrSchemeLst/>
 </a:theme>
 </file>
</xml_diff>

<commit_message>
Criando o processo de enviar emails.
</commit_message>
<xml_diff>
--- a/docs/Portal Tagarelas - PPT.pptx
+++ b/docs/Portal Tagarelas - PPT.pptx
@@ -318,7 +318,16 @@
       </a:defRPr>
     </a:lvl9pPr>
   </p:defaultTextStyle>
+  <p:extLst>
+    <p:ext uri="{EFAFB233-063F-42B5-8137-9DF3F51BA10A}">
+      <p15:sldGuideLst xmlns:p15="http://schemas.microsoft.com/office/powerpoint/2012/main"/>
+    </p:ext>
+  </p:extLst>
 </p:presentation>
+</file>
+
+<file path=ppt/revisionInfo.xml><?xml version="1.0" encoding="utf-8"?>
+<p1510:revInfo xmlns:a="http://schemas.openxmlformats.org/drawingml/2006/main" xmlns:r="http://schemas.openxmlformats.org/officeDocument/2006/relationships" xmlns:p1510="http://schemas.microsoft.com/office/powerpoint/2015/10/main"/>
 </file>
 
 <file path=ppt/notesMasters/notesMaster1.xml><?xml version="1.0" encoding="utf-8"?>
@@ -664,7 +673,7 @@
           <a:lstStyle/>
           <a:p>
             <a:fld id="{86CB4B4D-7CA3-9044-876B-883B54F8677D}" type="slidenum">
-              <a:t>‹n.º›</a:t>
+              <a:t>‹nº›</a:t>
             </a:fld>
             <a:endParaRPr/>
           </a:p>
@@ -801,7 +810,7 @@
           <a:lstStyle/>
           <a:p>
             <a:fld id="{86CB4B4D-7CA3-9044-876B-883B54F8677D}" type="slidenum">
-              <a:t>‹n.º›</a:t>
+              <a:t>‹nº›</a:t>
             </a:fld>
             <a:endParaRPr/>
           </a:p>
@@ -882,7 +891,7 @@
           <a:lstStyle/>
           <a:p>
             <a:fld id="{86CB4B4D-7CA3-9044-876B-883B54F8677D}" type="slidenum">
-              <a:t>‹n.º›</a:t>
+              <a:t>‹nº›</a:t>
             </a:fld>
             <a:endParaRPr/>
           </a:p>
@@ -934,7 +943,7 @@
           <a:lstStyle/>
           <a:p>
             <a:fld id="{86CB4B4D-7CA3-9044-876B-883B54F8677D}" type="slidenum">
-              <a:t>‹n.º›</a:t>
+              <a:t>‹nº›</a:t>
             </a:fld>
             <a:endParaRPr/>
           </a:p>
@@ -1142,7 +1151,7 @@
           <a:lstStyle/>
           <a:p>
             <a:fld id="{86CB4B4D-7CA3-9044-876B-883B54F8677D}" type="slidenum">
-              <a:t>‹n.º›</a:t>
+              <a:t>‹nº›</a:t>
             </a:fld>
             <a:endParaRPr/>
           </a:p>
@@ -1223,7 +1232,7 @@
           <a:lstStyle/>
           <a:p>
             <a:fld id="{86CB4B4D-7CA3-9044-876B-883B54F8677D}" type="slidenum">
-              <a:t>‹n.º›</a:t>
+              <a:t>‹nº›</a:t>
             </a:fld>
             <a:endParaRPr/>
           </a:p>
@@ -1431,7 +1440,7 @@
           <a:lstStyle/>
           <a:p>
             <a:fld id="{86CB4B4D-7CA3-9044-876B-883B54F8677D}" type="slidenum">
-              <a:t>‹n.º›</a:t>
+              <a:t>‹nº›</a:t>
             </a:fld>
             <a:endParaRPr/>
           </a:p>
@@ -1508,7 +1517,7 @@
           <a:lstStyle/>
           <a:p>
             <a:fld id="{86CB4B4D-7CA3-9044-876B-883B54F8677D}" type="slidenum">
-              <a:t>‹n.º›</a:t>
+              <a:t>‹nº›</a:t>
             </a:fld>
             <a:endParaRPr/>
           </a:p>
@@ -1634,7 +1643,7 @@
           <a:lstStyle/>
           <a:p>
             <a:fld id="{86CB4B4D-7CA3-9044-876B-883B54F8677D}" type="slidenum">
-              <a:t>‹n.º›</a:t>
+              <a:t>‹nº›</a:t>
             </a:fld>
             <a:endParaRPr/>
           </a:p>
@@ -1824,7 +1833,7 @@
           <a:lstStyle/>
           <a:p>
             <a:fld id="{86CB4B4D-7CA3-9044-876B-883B54F8677D}" type="slidenum">
-              <a:t>‹n.º›</a:t>
+              <a:t>‹nº›</a:t>
             </a:fld>
             <a:endParaRPr/>
           </a:p>
@@ -1929,7 +1938,7 @@
           <a:lstStyle/>
           <a:p>
             <a:fld id="{86CB4B4D-7CA3-9044-876B-883B54F8677D}" type="slidenum">
-              <a:t>‹n.º›</a:t>
+              <a:t>‹nº›</a:t>
             </a:fld>
             <a:endParaRPr/>
           </a:p>
@@ -2068,7 +2077,7 @@
           <a:lstStyle/>
           <a:p>
             <a:fld id="{86CB4B4D-7CA3-9044-876B-883B54F8677D}" type="slidenum">
-              <a:t>‹n.º›</a:t>
+              <a:t>‹nº›</a:t>
             </a:fld>
             <a:endParaRPr/>
           </a:p>
@@ -2131,7 +2140,7 @@
           </a:ln>
           <a:extLst>
             <a:ext uri="{C572A759-6A51-4108-AA02-DFA0A04FC94B}">
-              <ma14:wrappingTextBoxFlag xmlns:ma14="http://schemas.microsoft.com/office/mac/drawingml/2011/main" val="1"/>
+              <ma14:wrappingTextBoxFlag xmlns:ma14="http://schemas.microsoft.com/office/mac/drawingml/2011/main" xmlns="" val="1"/>
             </a:ext>
           </a:extLst>
         </p:spPr>
@@ -2170,7 +2179,7 @@
           </a:ln>
           <a:extLst>
             <a:ext uri="{C572A759-6A51-4108-AA02-DFA0A04FC94B}">
-              <ma14:wrappingTextBoxFlag xmlns:ma14="http://schemas.microsoft.com/office/mac/drawingml/2011/main" val="1"/>
+              <ma14:wrappingTextBoxFlag xmlns:ma14="http://schemas.microsoft.com/office/mac/drawingml/2011/main" xmlns="" val="1"/>
             </a:ext>
           </a:extLst>
         </p:spPr>
@@ -2243,7 +2252,7 @@
           </a:lstStyle>
           <a:p>
             <a:fld id="{86CB4B4D-7CA3-9044-876B-883B54F8677D}" type="slidenum">
-              <a:t>‹n.º›</a:t>
+              <a:t>‹nº›</a:t>
             </a:fld>
             <a:endParaRPr/>
           </a:p>
@@ -3741,7 +3750,7 @@
           </a:ln>
           <a:extLst>
             <a:ext uri="{C572A759-6A51-4108-AA02-DFA0A04FC94B}">
-              <ma14:wrappingTextBoxFlag xmlns:ma14="http://schemas.microsoft.com/office/mac/drawingml/2011/main" val="1"/>
+              <ma14:wrappingTextBoxFlag xmlns:ma14="http://schemas.microsoft.com/office/mac/drawingml/2011/main" xmlns="" val="1"/>
             </a:ext>
           </a:extLst>
         </p:spPr>
@@ -3788,7 +3797,7 @@
           </a:ln>
           <a:extLst>
             <a:ext uri="{C572A759-6A51-4108-AA02-DFA0A04FC94B}">
-              <ma14:wrappingTextBoxFlag xmlns:ma14="http://schemas.microsoft.com/office/mac/drawingml/2011/main" val="1"/>
+              <ma14:wrappingTextBoxFlag xmlns:ma14="http://schemas.microsoft.com/office/mac/drawingml/2011/main" xmlns="" val="1"/>
             </a:ext>
           </a:extLst>
         </p:spPr>
@@ -3835,7 +3844,7 @@
           </a:ln>
           <a:extLst>
             <a:ext uri="{C572A759-6A51-4108-AA02-DFA0A04FC94B}">
-              <ma14:wrappingTextBoxFlag xmlns:ma14="http://schemas.microsoft.com/office/mac/drawingml/2011/main" val="1"/>
+              <ma14:wrappingTextBoxFlag xmlns:ma14="http://schemas.microsoft.com/office/mac/drawingml/2011/main" xmlns="" val="1"/>
             </a:ext>
           </a:extLst>
         </p:spPr>
@@ -3882,7 +3891,7 @@
           </a:ln>
           <a:extLst>
             <a:ext uri="{C572A759-6A51-4108-AA02-DFA0A04FC94B}">
-              <ma14:wrappingTextBoxFlag xmlns:ma14="http://schemas.microsoft.com/office/mac/drawingml/2011/main" val="1"/>
+              <ma14:wrappingTextBoxFlag xmlns:ma14="http://schemas.microsoft.com/office/mac/drawingml/2011/main" xmlns="" val="1"/>
             </a:ext>
           </a:extLst>
         </p:spPr>
@@ -3929,7 +3938,7 @@
           </a:ln>
           <a:extLst>
             <a:ext uri="{C572A759-6A51-4108-AA02-DFA0A04FC94B}">
-              <ma14:wrappingTextBoxFlag xmlns:ma14="http://schemas.microsoft.com/office/mac/drawingml/2011/main" val="1"/>
+              <ma14:wrappingTextBoxFlag xmlns:ma14="http://schemas.microsoft.com/office/mac/drawingml/2011/main" xmlns="" val="1"/>
             </a:ext>
           </a:extLst>
         </p:spPr>
@@ -3976,7 +3985,7 @@
           </a:ln>
           <a:extLst>
             <a:ext uri="{C572A759-6A51-4108-AA02-DFA0A04FC94B}">
-              <ma14:wrappingTextBoxFlag xmlns:ma14="http://schemas.microsoft.com/office/mac/drawingml/2011/main" val="1"/>
+              <ma14:wrappingTextBoxFlag xmlns:ma14="http://schemas.microsoft.com/office/mac/drawingml/2011/main" xmlns="" val="1"/>
             </a:ext>
           </a:extLst>
         </p:spPr>
@@ -4023,7 +4032,7 @@
           </a:ln>
           <a:extLst>
             <a:ext uri="{C572A759-6A51-4108-AA02-DFA0A04FC94B}">
-              <ma14:wrappingTextBoxFlag xmlns:ma14="http://schemas.microsoft.com/office/mac/drawingml/2011/main" val="1"/>
+              <ma14:wrappingTextBoxFlag xmlns:ma14="http://schemas.microsoft.com/office/mac/drawingml/2011/main" xmlns="" val="1"/>
             </a:ext>
           </a:extLst>
         </p:spPr>
@@ -4070,7 +4079,7 @@
           </a:ln>
           <a:extLst>
             <a:ext uri="{C572A759-6A51-4108-AA02-DFA0A04FC94B}">
-              <ma14:wrappingTextBoxFlag xmlns:ma14="http://schemas.microsoft.com/office/mac/drawingml/2011/main" val="1"/>
+              <ma14:wrappingTextBoxFlag xmlns:ma14="http://schemas.microsoft.com/office/mac/drawingml/2011/main" xmlns="" val="1"/>
             </a:ext>
           </a:extLst>
         </p:spPr>
@@ -4117,7 +4126,7 @@
           </a:ln>
           <a:extLst>
             <a:ext uri="{C572A759-6A51-4108-AA02-DFA0A04FC94B}">
-              <ma14:wrappingTextBoxFlag xmlns:ma14="http://schemas.microsoft.com/office/mac/drawingml/2011/main" val="1"/>
+              <ma14:wrappingTextBoxFlag xmlns:ma14="http://schemas.microsoft.com/office/mac/drawingml/2011/main" xmlns="" val="1"/>
             </a:ext>
           </a:extLst>
         </p:spPr>
@@ -4307,7 +4316,7 @@
             <a:effectLst/>
             <a:extLst>
               <a:ext uri="{C572A759-6A51-4108-AA02-DFA0A04FC94B}">
-                <ma14:wrappingTextBoxFlag xmlns:ma14="http://schemas.microsoft.com/office/mac/drawingml/2011/main" val="1"/>
+                <ma14:wrappingTextBoxFlag xmlns:ma14="http://schemas.microsoft.com/office/mac/drawingml/2011/main" xmlns="" val="1"/>
               </a:ext>
             </a:extLst>
           </p:spPr>
@@ -4509,7 +4518,7 @@
             <a:effectLst/>
             <a:extLst>
               <a:ext uri="{C572A759-6A51-4108-AA02-DFA0A04FC94B}">
-                <ma14:wrappingTextBoxFlag xmlns:ma14="http://schemas.microsoft.com/office/mac/drawingml/2011/main" val="1"/>
+                <ma14:wrappingTextBoxFlag xmlns:ma14="http://schemas.microsoft.com/office/mac/drawingml/2011/main" xmlns="" val="1"/>
               </a:ext>
             </a:extLst>
           </p:spPr>
@@ -4720,7 +4729,7 @@
             <a:effectLst/>
             <a:extLst>
               <a:ext uri="{C572A759-6A51-4108-AA02-DFA0A04FC94B}">
-                <ma14:wrappingTextBoxFlag xmlns:ma14="http://schemas.microsoft.com/office/mac/drawingml/2011/main" val="1"/>
+                <ma14:wrappingTextBoxFlag xmlns:ma14="http://schemas.microsoft.com/office/mac/drawingml/2011/main" xmlns="" val="1"/>
               </a:ext>
             </a:extLst>
           </p:spPr>
@@ -4922,7 +4931,7 @@
             <a:effectLst/>
             <a:extLst>
               <a:ext uri="{C572A759-6A51-4108-AA02-DFA0A04FC94B}">
-                <ma14:wrappingTextBoxFlag xmlns:ma14="http://schemas.microsoft.com/office/mac/drawingml/2011/main" val="1"/>
+                <ma14:wrappingTextBoxFlag xmlns:ma14="http://schemas.microsoft.com/office/mac/drawingml/2011/main" xmlns="" val="1"/>
               </a:ext>
             </a:extLst>
           </p:spPr>
@@ -5109,7 +5118,7 @@
             <a:effectLst/>
             <a:extLst>
               <a:ext uri="{C572A759-6A51-4108-AA02-DFA0A04FC94B}">
-                <ma14:wrappingTextBoxFlag xmlns:ma14="http://schemas.microsoft.com/office/mac/drawingml/2011/main" val="1"/>
+                <ma14:wrappingTextBoxFlag xmlns:ma14="http://schemas.microsoft.com/office/mac/drawingml/2011/main" xmlns="" val="1"/>
               </a:ext>
             </a:extLst>
           </p:spPr>
@@ -5296,7 +5305,7 @@
             <a:effectLst/>
             <a:extLst>
               <a:ext uri="{C572A759-6A51-4108-AA02-DFA0A04FC94B}">
-                <ma14:wrappingTextBoxFlag xmlns:ma14="http://schemas.microsoft.com/office/mac/drawingml/2011/main" val="1"/>
+                <ma14:wrappingTextBoxFlag xmlns:ma14="http://schemas.microsoft.com/office/mac/drawingml/2011/main" xmlns="" val="1"/>
               </a:ext>
             </a:extLst>
           </p:spPr>
@@ -5355,7 +5364,7 @@
           </a:ln>
           <a:extLst>
             <a:ext uri="{C572A759-6A51-4108-AA02-DFA0A04FC94B}">
-              <ma14:wrappingTextBoxFlag xmlns:ma14="http://schemas.microsoft.com/office/mac/drawingml/2011/main" val="1"/>
+              <ma14:wrappingTextBoxFlag xmlns:ma14="http://schemas.microsoft.com/office/mac/drawingml/2011/main" xmlns="" val="1"/>
             </a:ext>
           </a:extLst>
         </p:spPr>
@@ -5555,7 +5564,7 @@
           </a:ln>
           <a:extLst>
             <a:ext uri="{C572A759-6A51-4108-AA02-DFA0A04FC94B}">
-              <ma14:wrappingTextBoxFlag xmlns:ma14="http://schemas.microsoft.com/office/mac/drawingml/2011/main" val="1"/>
+              <ma14:wrappingTextBoxFlag xmlns:ma14="http://schemas.microsoft.com/office/mac/drawingml/2011/main" xmlns="" val="1"/>
             </a:ext>
           </a:extLst>
         </p:spPr>
@@ -5739,7 +5748,7 @@
           </a:ln>
           <a:extLst>
             <a:ext uri="{C572A759-6A51-4108-AA02-DFA0A04FC94B}">
-              <ma14:wrappingTextBoxFlag xmlns:ma14="http://schemas.microsoft.com/office/mac/drawingml/2011/main" val="1"/>
+              <ma14:wrappingTextBoxFlag xmlns:ma14="http://schemas.microsoft.com/office/mac/drawingml/2011/main" xmlns="" val="1"/>
             </a:ext>
           </a:extLst>
         </p:spPr>
@@ -5785,7 +5794,7 @@
           </a:ln>
           <a:extLst>
             <a:ext uri="{C572A759-6A51-4108-AA02-DFA0A04FC94B}">
-              <ma14:wrappingTextBoxFlag xmlns:ma14="http://schemas.microsoft.com/office/mac/drawingml/2011/main" val="1"/>
+              <ma14:wrappingTextBoxFlag xmlns:ma14="http://schemas.microsoft.com/office/mac/drawingml/2011/main" xmlns="" val="1"/>
             </a:ext>
           </a:extLst>
         </p:spPr>
@@ -5864,7 +5873,7 @@
           </a:ln>
           <a:extLst>
             <a:ext uri="{C572A759-6A51-4108-AA02-DFA0A04FC94B}">
-              <ma14:wrappingTextBoxFlag xmlns:ma14="http://schemas.microsoft.com/office/mac/drawingml/2011/main" val="1"/>
+              <ma14:wrappingTextBoxFlag xmlns:ma14="http://schemas.microsoft.com/office/mac/drawingml/2011/main" xmlns="" val="1"/>
             </a:ext>
           </a:extLst>
         </p:spPr>
@@ -5913,7 +5922,7 @@
           </a:ln>
           <a:extLst>
             <a:ext uri="{C572A759-6A51-4108-AA02-DFA0A04FC94B}">
-              <ma14:wrappingTextBoxFlag xmlns:ma14="http://schemas.microsoft.com/office/mac/drawingml/2011/main" val="1"/>
+              <ma14:wrappingTextBoxFlag xmlns:ma14="http://schemas.microsoft.com/office/mac/drawingml/2011/main" xmlns="" val="1"/>
             </a:ext>
           </a:extLst>
         </p:spPr>
@@ -5940,14 +5949,14 @@
           </a:lstStyle>
           <a:p>
             <a:r>
-              <a:rPr dirty="0" smtClean="0"/>
+              <a:rPr dirty="0"/>
               <a:t>Mensagens</a:t>
             </a:r>
-            <a:endParaRPr lang="en-US" dirty="0" smtClean="0"/>
-          </a:p>
-          <a:p>
-            <a:r>
-              <a:rPr lang="en-US" dirty="0" err="1" smtClean="0"/>
+            <a:endParaRPr lang="en-US" dirty="0"/>
+          </a:p>
+          <a:p>
+            <a:r>
+              <a:rPr lang="en-US" dirty="0" err="1"/>
               <a:t>Mídia</a:t>
             </a:r>
             <a:endParaRPr dirty="0"/>
@@ -6006,15 +6015,17 @@
             <a:pPr defTabSz="490727">
               <a:defRPr sz="6719"/>
             </a:pPr>
-            <a:endParaRPr/>
+            <a:endParaRPr dirty="0"/>
           </a:p>
           <a:p>
             <a:pPr defTabSz="490727">
               <a:defRPr sz="6719"/>
             </a:pPr>
             <a:r>
-              <a:t>Estrutura em Camadas</a:t>
-            </a:r>
+              <a:rPr lang="pt-BR" dirty="0"/>
+              <a:t>Arquitetura Tagarelas</a:t>
+            </a:r>
+            <a:endParaRPr dirty="0"/>
           </a:p>
         </p:txBody>
       </p:sp>
@@ -6047,7 +6058,7 @@
           </a:effectLst>
           <a:extLst>
             <a:ext uri="{C572A759-6A51-4108-AA02-DFA0A04FC94B}">
-              <ma14:wrappingTextBoxFlag xmlns:ma14="http://schemas.microsoft.com/office/mac/drawingml/2011/main" val="1"/>
+              <ma14:wrappingTextBoxFlag xmlns:ma14="http://schemas.microsoft.com/office/mac/drawingml/2011/main" xmlns="" val="1"/>
             </a:ext>
           </a:extLst>
         </p:spPr>
@@ -6098,7 +6109,7 @@
           </a:effectLst>
           <a:extLst>
             <a:ext uri="{C572A759-6A51-4108-AA02-DFA0A04FC94B}">
-              <ma14:wrappingTextBoxFlag xmlns:ma14="http://schemas.microsoft.com/office/mac/drawingml/2011/main" val="1"/>
+              <ma14:wrappingTextBoxFlag xmlns:ma14="http://schemas.microsoft.com/office/mac/drawingml/2011/main" xmlns="" val="1"/>
             </a:ext>
           </a:extLst>
         </p:spPr>
@@ -6153,7 +6164,7 @@
           </a:effectLst>
           <a:extLst>
             <a:ext uri="{C572A759-6A51-4108-AA02-DFA0A04FC94B}">
-              <ma14:wrappingTextBoxFlag xmlns:ma14="http://schemas.microsoft.com/office/mac/drawingml/2011/main" val="1"/>
+              <ma14:wrappingTextBoxFlag xmlns:ma14="http://schemas.microsoft.com/office/mac/drawingml/2011/main" xmlns="" val="1"/>
             </a:ext>
           </a:extLst>
         </p:spPr>
@@ -6208,7 +6219,7 @@
           </a:effectLst>
           <a:extLst>
             <a:ext uri="{C572A759-6A51-4108-AA02-DFA0A04FC94B}">
-              <ma14:wrappingTextBoxFlag xmlns:ma14="http://schemas.microsoft.com/office/mac/drawingml/2011/main" val="1"/>
+              <ma14:wrappingTextBoxFlag xmlns:ma14="http://schemas.microsoft.com/office/mac/drawingml/2011/main" xmlns="" val="1"/>
             </a:ext>
           </a:extLst>
         </p:spPr>
@@ -6263,7 +6274,7 @@
           </a:effectLst>
           <a:extLst>
             <a:ext uri="{C572A759-6A51-4108-AA02-DFA0A04FC94B}">
-              <ma14:wrappingTextBoxFlag xmlns:ma14="http://schemas.microsoft.com/office/mac/drawingml/2011/main" val="1"/>
+              <ma14:wrappingTextBoxFlag xmlns:ma14="http://schemas.microsoft.com/office/mac/drawingml/2011/main" xmlns="" val="1"/>
             </a:ext>
           </a:extLst>
         </p:spPr>
@@ -6318,7 +6329,7 @@
           </a:effectLst>
           <a:extLst>
             <a:ext uri="{C572A759-6A51-4108-AA02-DFA0A04FC94B}">
-              <ma14:wrappingTextBoxFlag xmlns:ma14="http://schemas.microsoft.com/office/mac/drawingml/2011/main" val="1"/>
+              <ma14:wrappingTextBoxFlag xmlns:ma14="http://schemas.microsoft.com/office/mac/drawingml/2011/main" xmlns="" val="1"/>
             </a:ext>
           </a:extLst>
         </p:spPr>
@@ -6373,7 +6384,7 @@
           </a:effectLst>
           <a:extLst>
             <a:ext uri="{C572A759-6A51-4108-AA02-DFA0A04FC94B}">
-              <ma14:wrappingTextBoxFlag xmlns:ma14="http://schemas.microsoft.com/office/mac/drawingml/2011/main" val="1"/>
+              <ma14:wrappingTextBoxFlag xmlns:ma14="http://schemas.microsoft.com/office/mac/drawingml/2011/main" xmlns="" val="1"/>
             </a:ext>
           </a:extLst>
         </p:spPr>
@@ -6424,7 +6435,7 @@
           </a:effectLst>
           <a:extLst>
             <a:ext uri="{C572A759-6A51-4108-AA02-DFA0A04FC94B}">
-              <ma14:wrappingTextBoxFlag xmlns:ma14="http://schemas.microsoft.com/office/mac/drawingml/2011/main" val="1"/>
+              <ma14:wrappingTextBoxFlag xmlns:ma14="http://schemas.microsoft.com/office/mac/drawingml/2011/main" xmlns="" val="1"/>
             </a:ext>
           </a:extLst>
         </p:spPr>
@@ -6479,7 +6490,7 @@
           </a:effectLst>
           <a:extLst>
             <a:ext uri="{C572A759-6A51-4108-AA02-DFA0A04FC94B}">
-              <ma14:wrappingTextBoxFlag xmlns:ma14="http://schemas.microsoft.com/office/mac/drawingml/2011/main" val="1"/>
+              <ma14:wrappingTextBoxFlag xmlns:ma14="http://schemas.microsoft.com/office/mac/drawingml/2011/main" xmlns="" val="1"/>
             </a:ext>
           </a:extLst>
         </p:spPr>
@@ -6533,7 +6544,7 @@
           </a:effectLst>
           <a:extLst>
             <a:ext uri="{C572A759-6A51-4108-AA02-DFA0A04FC94B}">
-              <ma14:wrappingTextBoxFlag xmlns:ma14="http://schemas.microsoft.com/office/mac/drawingml/2011/main" val="1"/>
+              <ma14:wrappingTextBoxFlag xmlns:ma14="http://schemas.microsoft.com/office/mac/drawingml/2011/main" xmlns="" val="1"/>
             </a:ext>
           </a:extLst>
         </p:spPr>
@@ -6584,7 +6595,7 @@
           </a:effectLst>
           <a:extLst>
             <a:ext uri="{C572A759-6A51-4108-AA02-DFA0A04FC94B}">
-              <ma14:wrappingTextBoxFlag xmlns:ma14="http://schemas.microsoft.com/office/mac/drawingml/2011/main" val="1"/>
+              <ma14:wrappingTextBoxFlag xmlns:ma14="http://schemas.microsoft.com/office/mac/drawingml/2011/main" xmlns="" val="1"/>
             </a:ext>
           </a:extLst>
         </p:spPr>
@@ -6635,7 +6646,7 @@
           </a:effectLst>
           <a:extLst>
             <a:ext uri="{C572A759-6A51-4108-AA02-DFA0A04FC94B}">
-              <ma14:wrappingTextBoxFlag xmlns:ma14="http://schemas.microsoft.com/office/mac/drawingml/2011/main" val="1"/>
+              <ma14:wrappingTextBoxFlag xmlns:ma14="http://schemas.microsoft.com/office/mac/drawingml/2011/main" xmlns="" val="1"/>
             </a:ext>
           </a:extLst>
         </p:spPr>
@@ -6690,7 +6701,7 @@
           </a:effectLst>
           <a:extLst>
             <a:ext uri="{C572A759-6A51-4108-AA02-DFA0A04FC94B}">
-              <ma14:wrappingTextBoxFlag xmlns:ma14="http://schemas.microsoft.com/office/mac/drawingml/2011/main" val="1"/>
+              <ma14:wrappingTextBoxFlag xmlns:ma14="http://schemas.microsoft.com/office/mac/drawingml/2011/main" xmlns="" val="1"/>
             </a:ext>
           </a:extLst>
         </p:spPr>
@@ -6745,7 +6756,7 @@
           </a:effectLst>
           <a:extLst>
             <a:ext uri="{C572A759-6A51-4108-AA02-DFA0A04FC94B}">
-              <ma14:wrappingTextBoxFlag xmlns:ma14="http://schemas.microsoft.com/office/mac/drawingml/2011/main" val="1"/>
+              <ma14:wrappingTextBoxFlag xmlns:ma14="http://schemas.microsoft.com/office/mac/drawingml/2011/main" xmlns="" val="1"/>
             </a:ext>
           </a:extLst>
         </p:spPr>
@@ -6800,7 +6811,7 @@
           </a:effectLst>
           <a:extLst>
             <a:ext uri="{C572A759-6A51-4108-AA02-DFA0A04FC94B}">
-              <ma14:wrappingTextBoxFlag xmlns:ma14="http://schemas.microsoft.com/office/mac/drawingml/2011/main" val="1"/>
+              <ma14:wrappingTextBoxFlag xmlns:ma14="http://schemas.microsoft.com/office/mac/drawingml/2011/main" xmlns="" val="1"/>
             </a:ext>
           </a:extLst>
         </p:spPr>
@@ -6836,9 +6847,12 @@
           <a:prstGeom prst="rect">
             <a:avLst/>
           </a:prstGeom>
-          <a:blipFill>
-            <a:blip r:embed="rId4"/>
-          </a:blipFill>
+          <a:solidFill>
+            <a:schemeClr val="accent1">
+              <a:lumMod val="20000"/>
+              <a:lumOff val="80000"/>
+            </a:schemeClr>
+          </a:solidFill>
           <a:ln w="12700">
             <a:miter lim="400000"/>
           </a:ln>
@@ -6851,7 +6865,7 @@
           </a:effectLst>
           <a:extLst>
             <a:ext uri="{C572A759-6A51-4108-AA02-DFA0A04FC94B}">
-              <ma14:wrappingTextBoxFlag xmlns:ma14="http://schemas.microsoft.com/office/mac/drawingml/2011/main" val="1"/>
+              <ma14:wrappingTextBoxFlag xmlns:ma14="http://schemas.microsoft.com/office/mac/drawingml/2011/main" xmlns="" val="1"/>
             </a:ext>
           </a:extLst>
         </p:spPr>
@@ -6872,8 +6886,18 @@
           </a:lstStyle>
           <a:p>
             <a:r>
-              <a:t>EXCEPTION</a:t>
-            </a:r>
+              <a:rPr lang="pt-BR" dirty="0">
+                <a:solidFill>
+                  <a:schemeClr val="tx1"/>
+                </a:solidFill>
+              </a:rPr>
+              <a:t>BOTS</a:t>
+            </a:r>
+            <a:endParaRPr dirty="0">
+              <a:solidFill>
+                <a:schemeClr val="tx1"/>
+              </a:solidFill>
+            </a:endParaRPr>
           </a:p>
         </p:txBody>
       </p:sp>
@@ -6910,7 +6934,7 @@
           </a:effectLst>
           <a:extLst>
             <a:ext uri="{C572A759-6A51-4108-AA02-DFA0A04FC94B}">
-              <ma14:wrappingTextBoxFlag xmlns:ma14="http://schemas.microsoft.com/office/mac/drawingml/2011/main" val="1"/>
+              <ma14:wrappingTextBoxFlag xmlns:ma14="http://schemas.microsoft.com/office/mac/drawingml/2011/main" xmlns="" val="1"/>
             </a:ext>
           </a:extLst>
         </p:spPr>
@@ -6951,10 +6975,9 @@
             <a:avLst/>
           </a:prstGeom>
           <a:solidFill>
-            <a:schemeClr val="accent1">
-              <a:hueOff val="47394"/>
-              <a:satOff val="-25753"/>
-              <a:lumOff val="-7544"/>
+            <a:schemeClr val="accent3">
+              <a:lumMod val="60000"/>
+              <a:lumOff val="40000"/>
             </a:schemeClr>
           </a:solidFill>
           <a:ln w="12700">
@@ -6969,7 +6992,7 @@
           </a:effectLst>
           <a:extLst>
             <a:ext uri="{C572A759-6A51-4108-AA02-DFA0A04FC94B}">
-              <ma14:wrappingTextBoxFlag xmlns:ma14="http://schemas.microsoft.com/office/mac/drawingml/2011/main" val="1"/>
+              <ma14:wrappingTextBoxFlag xmlns:ma14="http://schemas.microsoft.com/office/mac/drawingml/2011/main" xmlns="" val="1"/>
             </a:ext>
           </a:extLst>
         </p:spPr>
@@ -6990,10 +7013,74 @@
           </a:lstStyle>
           <a:p>
             <a:r>
-              <a:rPr lang="en-US" dirty="0" smtClean="0"/>
+              <a:rPr lang="en-US" dirty="0">
+                <a:solidFill>
+                  <a:schemeClr val="tx1"/>
+                </a:solidFill>
+              </a:rPr>
               <a:t>REST-API</a:t>
             </a:r>
-            <a:endParaRPr dirty="0"/>
+            <a:endParaRPr dirty="0">
+              <a:solidFill>
+                <a:schemeClr val="tx1"/>
+              </a:solidFill>
+            </a:endParaRPr>
+          </a:p>
+        </p:txBody>
+      </p:sp>
+      <p:sp>
+        <p:nvSpPr>
+          <p:cNvPr id="21" name="Shape 209"/>
+          <p:cNvSpPr/>
+          <p:nvPr/>
+        </p:nvSpPr>
+        <p:spPr>
+          <a:xfrm>
+            <a:off x="11729169" y="1975109"/>
+            <a:ext cx="544662" cy="7466708"/>
+          </a:xfrm>
+          <a:prstGeom prst="rect">
+            <a:avLst/>
+          </a:prstGeom>
+          <a:blipFill>
+            <a:blip r:embed="rId4"/>
+          </a:blipFill>
+          <a:ln w="12700">
+            <a:miter lim="400000"/>
+          </a:ln>
+          <a:effectLst>
+            <a:outerShdw blurRad="25400" dist="25400" dir="2388334" rotWithShape="0">
+              <a:srgbClr val="000000">
+                <a:alpha val="79310"/>
+              </a:srgbClr>
+            </a:outerShdw>
+          </a:effectLst>
+          <a:extLst>
+            <a:ext uri="{C572A759-6A51-4108-AA02-DFA0A04FC94B}">
+              <ma14:wrappingTextBoxFlag xmlns:ma14="http://schemas.microsoft.com/office/mac/drawingml/2011/main" xmlns="" val="1"/>
+            </a:ext>
+          </a:extLst>
+        </p:spPr>
+        <p:txBody>
+          <a:bodyPr lIns="50800" tIns="50800" rIns="50800" bIns="50800" anchor="ctr"/>
+          <a:lstStyle>
+            <a:lvl1pPr>
+              <a:defRPr sz="4300" b="1">
+                <a:solidFill>
+                  <a:srgbClr val="FFFFFF"/>
+                </a:solidFill>
+                <a:latin typeface="Helvetica"/>
+                <a:ea typeface="Helvetica"/>
+                <a:cs typeface="Helvetica"/>
+                <a:sym typeface="Helvetica"/>
+              </a:defRPr>
+            </a:lvl1pPr>
+          </a:lstStyle>
+          <a:p>
+            <a:r>
+              <a:rPr dirty="0"/>
+              <a:t>EXCEPTION</a:t>
+            </a:r>
           </a:p>
         </p:txBody>
       </p:sp>
@@ -7051,7 +7138,7 @@
           </a:lstStyle>
           <a:p>
             <a:r>
-              <a:rPr lang="en-US" dirty="0" smtClean="0"/>
+              <a:rPr lang="en-US" dirty="0"/>
               <a:t>REST</a:t>
             </a:r>
             <a:endParaRPr dirty="0"/>
@@ -7132,27 +7219,15 @@
             </a:r>
             <a:r>
               <a:rPr lang="pt-BR" sz="2400" dirty="0"/>
-              <a:t>), </a:t>
-            </a:r>
-            <a:r>
-              <a:rPr lang="pt-BR" sz="2400" dirty="0" smtClean="0"/>
-              <a:t> é </a:t>
+              <a:t>),  é uma abstração da arquitetura da </a:t>
+            </a:r>
+            <a:r>
+              <a:rPr lang="pt-BR" sz="2400" i="1" dirty="0"/>
+              <a:t>Web</a:t>
             </a:r>
             <a:r>
               <a:rPr lang="pt-BR" sz="2400" dirty="0"/>
-              <a:t>uma abstração da arquitetura da </a:t>
-            </a:r>
-            <a:r>
-              <a:rPr lang="pt-BR" sz="2400" i="1" dirty="0" smtClean="0"/>
-              <a:t>Web</a:t>
-            </a:r>
-            <a:r>
-              <a:rPr lang="pt-BR" sz="2400" dirty="0" smtClean="0"/>
-              <a:t> , </a:t>
-            </a:r>
-            <a:r>
-              <a:rPr lang="pt-BR" sz="2400" dirty="0"/>
-              <a:t>um estilo arquitetural que consiste de um conjunto coordenado de restrições arquiteturais aplicadas a componentes, conectores e elementos de dados dentro de um sistema de </a:t>
+              <a:t> , um estilo arquitetural que consiste de um conjunto coordenado de restrições arquiteturais aplicadas a componentes, conectores e elementos de dados dentro de um sistema de </a:t>
             </a:r>
             <a:r>
               <a:rPr lang="pt-BR" sz="2400" dirty="0">
@@ -7575,15 +7650,15 @@
           <a:lstStyle/>
           <a:p>
             <a:r>
-              <a:rPr lang="en-US" dirty="0" err="1" smtClean="0"/>
+              <a:rPr lang="en-US" dirty="0" err="1"/>
               <a:t>Próximos</a:t>
             </a:r>
             <a:r>
-              <a:rPr lang="en-US" dirty="0" smtClean="0"/>
+              <a:rPr lang="en-US" dirty="0"/>
               <a:t> </a:t>
             </a:r>
             <a:r>
-              <a:rPr lang="en-US" dirty="0" err="1" smtClean="0"/>
+              <a:rPr lang="en-US" dirty="0" err="1"/>
               <a:t>passos</a:t>
             </a:r>
             <a:endParaRPr dirty="0"/>
@@ -7614,82 +7689,82 @@
           <a:lstStyle/>
           <a:p>
             <a:r>
-              <a:rPr lang="en-US" dirty="0" err="1" smtClean="0"/>
+              <a:rPr lang="en-US" dirty="0" err="1"/>
               <a:t>Apresentação</a:t>
             </a:r>
             <a:r>
-              <a:rPr lang="en-US" dirty="0" smtClean="0"/>
+              <a:rPr lang="en-US" dirty="0"/>
               <a:t> do </a:t>
             </a:r>
             <a:r>
-              <a:rPr lang="en-US" dirty="0" err="1" smtClean="0"/>
+              <a:rPr lang="en-US" dirty="0" err="1"/>
               <a:t>estado</a:t>
             </a:r>
             <a:r>
-              <a:rPr lang="en-US" dirty="0" smtClean="0"/>
+              <a:rPr lang="en-US" dirty="0"/>
               <a:t> </a:t>
             </a:r>
             <a:r>
-              <a:rPr lang="en-US" dirty="0" err="1" smtClean="0"/>
+              <a:rPr lang="en-US" dirty="0" err="1"/>
               <a:t>atual</a:t>
             </a:r>
             <a:r>
-              <a:rPr lang="en-US" dirty="0" smtClean="0"/>
+              <a:rPr lang="en-US" dirty="0"/>
               <a:t> da RST</a:t>
             </a:r>
           </a:p>
           <a:p>
             <a:r>
-              <a:rPr lang="en-US" dirty="0" err="1" smtClean="0"/>
+              <a:rPr lang="en-US" dirty="0" err="1"/>
               <a:t>Treinamento</a:t>
             </a:r>
             <a:r>
-              <a:rPr lang="en-US" dirty="0" smtClean="0"/>
+              <a:rPr lang="en-US" dirty="0"/>
               <a:t> - </a:t>
             </a:r>
             <a:r>
-              <a:rPr lang="en-US" dirty="0" err="1" smtClean="0"/>
+              <a:rPr lang="en-US" dirty="0" err="1"/>
               <a:t>Symfony</a:t>
             </a:r>
-            <a:endParaRPr lang="en-US" dirty="0" smtClean="0"/>
-          </a:p>
-          <a:p>
-            <a:r>
-              <a:rPr lang="en-US" dirty="0" err="1" smtClean="0"/>
+            <a:endParaRPr lang="en-US" dirty="0"/>
+          </a:p>
+          <a:p>
+            <a:r>
+              <a:rPr lang="en-US" dirty="0" err="1"/>
               <a:t>Treinamento</a:t>
             </a:r>
             <a:r>
-              <a:rPr lang="en-US" dirty="0" smtClean="0"/>
+              <a:rPr lang="en-US" dirty="0"/>
               <a:t> - Openfire</a:t>
             </a:r>
           </a:p>
           <a:p>
             <a:r>
-              <a:rPr lang="en-US" dirty="0" err="1" smtClean="0"/>
+              <a:rPr lang="en-US" dirty="0" err="1"/>
               <a:t>Treinamento</a:t>
             </a:r>
             <a:r>
-              <a:rPr lang="en-US" dirty="0" smtClean="0"/>
+              <a:rPr lang="en-US" dirty="0"/>
               <a:t> </a:t>
             </a:r>
             <a:r>
-              <a:rPr lang="mr-IN" dirty="0" smtClean="0"/>
+              <a:rPr lang="mr-IN" dirty="0"/>
               <a:t>–</a:t>
             </a:r>
             <a:r>
-              <a:rPr lang="en-US" dirty="0" smtClean="0"/>
+              <a:rPr lang="en-US" dirty="0"/>
               <a:t> REST (</a:t>
             </a:r>
             <a:r>
-              <a:rPr lang="pt-BR" b="1" dirty="0" err="1" smtClean="0"/>
+              <a:rPr lang="pt-BR" b="1" dirty="0" err="1"/>
               <a:t>RE</a:t>
             </a:r>
             <a:r>
-              <a:rPr lang="pt-BR" dirty="0" err="1" smtClean="0"/>
+              <a:rPr lang="pt-BR" dirty="0" err="1"/>
               <a:t>presentational</a:t>
             </a:r>
             <a:r>
-              <a:rPr lang="pt-BR" dirty="0" smtClean="0"/>
+              <a:rPr lang="pt-BR" dirty="0"/>
               <a:t> </a:t>
             </a:r>
             <a:r>
@@ -7705,56 +7780,56 @@
               <a:t> </a:t>
             </a:r>
             <a:r>
-              <a:rPr lang="pt-BR" b="1" dirty="0" err="1" smtClean="0"/>
+              <a:rPr lang="pt-BR" b="1" dirty="0" err="1"/>
               <a:t>T</a:t>
             </a:r>
             <a:r>
-              <a:rPr lang="pt-BR" dirty="0" err="1" smtClean="0"/>
+              <a:rPr lang="pt-BR" dirty="0" err="1"/>
               <a:t>ransfer</a:t>
             </a:r>
             <a:r>
-              <a:rPr lang="pt-BR" dirty="0" smtClean="0"/>
+              <a:rPr lang="pt-BR" dirty="0"/>
               <a:t>)</a:t>
             </a:r>
-            <a:endParaRPr lang="en-US" dirty="0" smtClean="0"/>
-          </a:p>
-          <a:p>
-            <a:r>
-              <a:rPr lang="en-US" dirty="0" err="1" smtClean="0"/>
+            <a:endParaRPr lang="en-US" dirty="0"/>
+          </a:p>
+          <a:p>
+            <a:r>
+              <a:rPr lang="en-US" dirty="0" err="1"/>
               <a:t>Treinamento</a:t>
             </a:r>
             <a:r>
-              <a:rPr lang="en-US" dirty="0" smtClean="0"/>
+              <a:rPr lang="en-US" dirty="0"/>
               <a:t> </a:t>
             </a:r>
             <a:r>
-              <a:rPr lang="en-US" dirty="0" err="1" smtClean="0"/>
+              <a:rPr lang="en-US" dirty="0" err="1"/>
               <a:t>na</a:t>
             </a:r>
             <a:r>
-              <a:rPr lang="en-US" dirty="0" smtClean="0"/>
+              <a:rPr lang="en-US" dirty="0"/>
               <a:t> </a:t>
             </a:r>
             <a:r>
-              <a:rPr lang="en-US" dirty="0" err="1" smtClean="0"/>
+              <a:rPr lang="en-US" dirty="0" err="1"/>
               <a:t>arquitetura</a:t>
             </a:r>
             <a:r>
-              <a:rPr lang="en-US" dirty="0" smtClean="0"/>
+              <a:rPr lang="en-US" dirty="0"/>
               <a:t> da RST / Openfire</a:t>
             </a:r>
           </a:p>
           <a:p>
             <a:r>
-              <a:rPr lang="en-US" dirty="0" err="1" smtClean="0"/>
+              <a:rPr lang="en-US" dirty="0" err="1"/>
               <a:t>Distribuição</a:t>
             </a:r>
             <a:r>
-              <a:rPr lang="en-US" dirty="0" smtClean="0"/>
+              <a:rPr lang="en-US" dirty="0"/>
               <a:t> de </a:t>
             </a:r>
             <a:r>
-              <a:rPr lang="en-US" dirty="0" err="1" smtClean="0"/>
+              <a:rPr lang="en-US" dirty="0" err="1"/>
               <a:t>tarefas</a:t>
             </a:r>
             <a:endParaRPr dirty="0"/>

</xml_diff>

<commit_message>
Corrigido o ppt do sistema
</commit_message>
<xml_diff>
--- a/docs/Portal Tagarelas - PPT.pptx
+++ b/docs/Portal Tagarelas - PPT.pptx
@@ -2140,7 +2140,7 @@
           </a:ln>
           <a:extLst>
             <a:ext uri="{C572A759-6A51-4108-AA02-DFA0A04FC94B}">
-              <ma14:wrappingTextBoxFlag xmlns:ma14="http://schemas.microsoft.com/office/mac/drawingml/2011/main" xmlns="" val="1"/>
+              <ma14:wrappingTextBoxFlag xmlns="" xmlns:ma14="http://schemas.microsoft.com/office/mac/drawingml/2011/main" val="1"/>
             </a:ext>
           </a:extLst>
         </p:spPr>
@@ -2179,7 +2179,7 @@
           </a:ln>
           <a:extLst>
             <a:ext uri="{C572A759-6A51-4108-AA02-DFA0A04FC94B}">
-              <ma14:wrappingTextBoxFlag xmlns:ma14="http://schemas.microsoft.com/office/mac/drawingml/2011/main" xmlns="" val="1"/>
+              <ma14:wrappingTextBoxFlag xmlns="" xmlns:ma14="http://schemas.microsoft.com/office/mac/drawingml/2011/main" val="1"/>
             </a:ext>
           </a:extLst>
         </p:spPr>
@@ -3750,7 +3750,7 @@
           </a:ln>
           <a:extLst>
             <a:ext uri="{C572A759-6A51-4108-AA02-DFA0A04FC94B}">
-              <ma14:wrappingTextBoxFlag xmlns:ma14="http://schemas.microsoft.com/office/mac/drawingml/2011/main" xmlns="" val="1"/>
+              <ma14:wrappingTextBoxFlag xmlns="" xmlns:ma14="http://schemas.microsoft.com/office/mac/drawingml/2011/main" val="1"/>
             </a:ext>
           </a:extLst>
         </p:spPr>
@@ -3797,7 +3797,7 @@
           </a:ln>
           <a:extLst>
             <a:ext uri="{C572A759-6A51-4108-AA02-DFA0A04FC94B}">
-              <ma14:wrappingTextBoxFlag xmlns:ma14="http://schemas.microsoft.com/office/mac/drawingml/2011/main" xmlns="" val="1"/>
+              <ma14:wrappingTextBoxFlag xmlns="" xmlns:ma14="http://schemas.microsoft.com/office/mac/drawingml/2011/main" val="1"/>
             </a:ext>
           </a:extLst>
         </p:spPr>
@@ -3844,7 +3844,7 @@
           </a:ln>
           <a:extLst>
             <a:ext uri="{C572A759-6A51-4108-AA02-DFA0A04FC94B}">
-              <ma14:wrappingTextBoxFlag xmlns:ma14="http://schemas.microsoft.com/office/mac/drawingml/2011/main" xmlns="" val="1"/>
+              <ma14:wrappingTextBoxFlag xmlns="" xmlns:ma14="http://schemas.microsoft.com/office/mac/drawingml/2011/main" val="1"/>
             </a:ext>
           </a:extLst>
         </p:spPr>
@@ -3891,7 +3891,7 @@
           </a:ln>
           <a:extLst>
             <a:ext uri="{C572A759-6A51-4108-AA02-DFA0A04FC94B}">
-              <ma14:wrappingTextBoxFlag xmlns:ma14="http://schemas.microsoft.com/office/mac/drawingml/2011/main" xmlns="" val="1"/>
+              <ma14:wrappingTextBoxFlag xmlns="" xmlns:ma14="http://schemas.microsoft.com/office/mac/drawingml/2011/main" val="1"/>
             </a:ext>
           </a:extLst>
         </p:spPr>
@@ -3938,7 +3938,7 @@
           </a:ln>
           <a:extLst>
             <a:ext uri="{C572A759-6A51-4108-AA02-DFA0A04FC94B}">
-              <ma14:wrappingTextBoxFlag xmlns:ma14="http://schemas.microsoft.com/office/mac/drawingml/2011/main" xmlns="" val="1"/>
+              <ma14:wrappingTextBoxFlag xmlns="" xmlns:ma14="http://schemas.microsoft.com/office/mac/drawingml/2011/main" val="1"/>
             </a:ext>
           </a:extLst>
         </p:spPr>
@@ -3985,7 +3985,7 @@
           </a:ln>
           <a:extLst>
             <a:ext uri="{C572A759-6A51-4108-AA02-DFA0A04FC94B}">
-              <ma14:wrappingTextBoxFlag xmlns:ma14="http://schemas.microsoft.com/office/mac/drawingml/2011/main" xmlns="" val="1"/>
+              <ma14:wrappingTextBoxFlag xmlns="" xmlns:ma14="http://schemas.microsoft.com/office/mac/drawingml/2011/main" val="1"/>
             </a:ext>
           </a:extLst>
         </p:spPr>
@@ -4032,7 +4032,7 @@
           </a:ln>
           <a:extLst>
             <a:ext uri="{C572A759-6A51-4108-AA02-DFA0A04FC94B}">
-              <ma14:wrappingTextBoxFlag xmlns:ma14="http://schemas.microsoft.com/office/mac/drawingml/2011/main" xmlns="" val="1"/>
+              <ma14:wrappingTextBoxFlag xmlns="" xmlns:ma14="http://schemas.microsoft.com/office/mac/drawingml/2011/main" val="1"/>
             </a:ext>
           </a:extLst>
         </p:spPr>
@@ -4079,7 +4079,7 @@
           </a:ln>
           <a:extLst>
             <a:ext uri="{C572A759-6A51-4108-AA02-DFA0A04FC94B}">
-              <ma14:wrappingTextBoxFlag xmlns:ma14="http://schemas.microsoft.com/office/mac/drawingml/2011/main" xmlns="" val="1"/>
+              <ma14:wrappingTextBoxFlag xmlns="" xmlns:ma14="http://schemas.microsoft.com/office/mac/drawingml/2011/main" val="1"/>
             </a:ext>
           </a:extLst>
         </p:spPr>
@@ -4126,7 +4126,7 @@
           </a:ln>
           <a:extLst>
             <a:ext uri="{C572A759-6A51-4108-AA02-DFA0A04FC94B}">
-              <ma14:wrappingTextBoxFlag xmlns:ma14="http://schemas.microsoft.com/office/mac/drawingml/2011/main" xmlns="" val="1"/>
+              <ma14:wrappingTextBoxFlag xmlns="" xmlns:ma14="http://schemas.microsoft.com/office/mac/drawingml/2011/main" val="1"/>
             </a:ext>
           </a:extLst>
         </p:spPr>
@@ -4316,7 +4316,7 @@
             <a:effectLst/>
             <a:extLst>
               <a:ext uri="{C572A759-6A51-4108-AA02-DFA0A04FC94B}">
-                <ma14:wrappingTextBoxFlag xmlns:ma14="http://schemas.microsoft.com/office/mac/drawingml/2011/main" xmlns="" val="1"/>
+                <ma14:wrappingTextBoxFlag xmlns="" xmlns:ma14="http://schemas.microsoft.com/office/mac/drawingml/2011/main" val="1"/>
               </a:ext>
             </a:extLst>
           </p:spPr>
@@ -4518,7 +4518,7 @@
             <a:effectLst/>
             <a:extLst>
               <a:ext uri="{C572A759-6A51-4108-AA02-DFA0A04FC94B}">
-                <ma14:wrappingTextBoxFlag xmlns:ma14="http://schemas.microsoft.com/office/mac/drawingml/2011/main" xmlns="" val="1"/>
+                <ma14:wrappingTextBoxFlag xmlns="" xmlns:ma14="http://schemas.microsoft.com/office/mac/drawingml/2011/main" val="1"/>
               </a:ext>
             </a:extLst>
           </p:spPr>
@@ -4729,7 +4729,7 @@
             <a:effectLst/>
             <a:extLst>
               <a:ext uri="{C572A759-6A51-4108-AA02-DFA0A04FC94B}">
-                <ma14:wrappingTextBoxFlag xmlns:ma14="http://schemas.microsoft.com/office/mac/drawingml/2011/main" xmlns="" val="1"/>
+                <ma14:wrappingTextBoxFlag xmlns="" xmlns:ma14="http://schemas.microsoft.com/office/mac/drawingml/2011/main" val="1"/>
               </a:ext>
             </a:extLst>
           </p:spPr>
@@ -4931,7 +4931,7 @@
             <a:effectLst/>
             <a:extLst>
               <a:ext uri="{C572A759-6A51-4108-AA02-DFA0A04FC94B}">
-                <ma14:wrappingTextBoxFlag xmlns:ma14="http://schemas.microsoft.com/office/mac/drawingml/2011/main" xmlns="" val="1"/>
+                <ma14:wrappingTextBoxFlag xmlns="" xmlns:ma14="http://schemas.microsoft.com/office/mac/drawingml/2011/main" val="1"/>
               </a:ext>
             </a:extLst>
           </p:spPr>
@@ -5118,7 +5118,7 @@
             <a:effectLst/>
             <a:extLst>
               <a:ext uri="{C572A759-6A51-4108-AA02-DFA0A04FC94B}">
-                <ma14:wrappingTextBoxFlag xmlns:ma14="http://schemas.microsoft.com/office/mac/drawingml/2011/main" xmlns="" val="1"/>
+                <ma14:wrappingTextBoxFlag xmlns="" xmlns:ma14="http://schemas.microsoft.com/office/mac/drawingml/2011/main" val="1"/>
               </a:ext>
             </a:extLst>
           </p:spPr>
@@ -5305,7 +5305,7 @@
             <a:effectLst/>
             <a:extLst>
               <a:ext uri="{C572A759-6A51-4108-AA02-DFA0A04FC94B}">
-                <ma14:wrappingTextBoxFlag xmlns:ma14="http://schemas.microsoft.com/office/mac/drawingml/2011/main" xmlns="" val="1"/>
+                <ma14:wrappingTextBoxFlag xmlns="" xmlns:ma14="http://schemas.microsoft.com/office/mac/drawingml/2011/main" val="1"/>
               </a:ext>
             </a:extLst>
           </p:spPr>
@@ -5364,7 +5364,7 @@
           </a:ln>
           <a:extLst>
             <a:ext uri="{C572A759-6A51-4108-AA02-DFA0A04FC94B}">
-              <ma14:wrappingTextBoxFlag xmlns:ma14="http://schemas.microsoft.com/office/mac/drawingml/2011/main" xmlns="" val="1"/>
+              <ma14:wrappingTextBoxFlag xmlns="" xmlns:ma14="http://schemas.microsoft.com/office/mac/drawingml/2011/main" val="1"/>
             </a:ext>
           </a:extLst>
         </p:spPr>
@@ -5564,7 +5564,7 @@
           </a:ln>
           <a:extLst>
             <a:ext uri="{C572A759-6A51-4108-AA02-DFA0A04FC94B}">
-              <ma14:wrappingTextBoxFlag xmlns:ma14="http://schemas.microsoft.com/office/mac/drawingml/2011/main" xmlns="" val="1"/>
+              <ma14:wrappingTextBoxFlag xmlns="" xmlns:ma14="http://schemas.microsoft.com/office/mac/drawingml/2011/main" val="1"/>
             </a:ext>
           </a:extLst>
         </p:spPr>
@@ -5748,7 +5748,7 @@
           </a:ln>
           <a:extLst>
             <a:ext uri="{C572A759-6A51-4108-AA02-DFA0A04FC94B}">
-              <ma14:wrappingTextBoxFlag xmlns:ma14="http://schemas.microsoft.com/office/mac/drawingml/2011/main" xmlns="" val="1"/>
+              <ma14:wrappingTextBoxFlag xmlns="" xmlns:ma14="http://schemas.microsoft.com/office/mac/drawingml/2011/main" val="1"/>
             </a:ext>
           </a:extLst>
         </p:spPr>
@@ -5794,7 +5794,7 @@
           </a:ln>
           <a:extLst>
             <a:ext uri="{C572A759-6A51-4108-AA02-DFA0A04FC94B}">
-              <ma14:wrappingTextBoxFlag xmlns:ma14="http://schemas.microsoft.com/office/mac/drawingml/2011/main" xmlns="" val="1"/>
+              <ma14:wrappingTextBoxFlag xmlns="" xmlns:ma14="http://schemas.microsoft.com/office/mac/drawingml/2011/main" val="1"/>
             </a:ext>
           </a:extLst>
         </p:spPr>
@@ -5873,7 +5873,7 @@
           </a:ln>
           <a:extLst>
             <a:ext uri="{C572A759-6A51-4108-AA02-DFA0A04FC94B}">
-              <ma14:wrappingTextBoxFlag xmlns:ma14="http://schemas.microsoft.com/office/mac/drawingml/2011/main" xmlns="" val="1"/>
+              <ma14:wrappingTextBoxFlag xmlns="" xmlns:ma14="http://schemas.microsoft.com/office/mac/drawingml/2011/main" val="1"/>
             </a:ext>
           </a:extLst>
         </p:spPr>
@@ -5922,7 +5922,7 @@
           </a:ln>
           <a:extLst>
             <a:ext uri="{C572A759-6A51-4108-AA02-DFA0A04FC94B}">
-              <ma14:wrappingTextBoxFlag xmlns:ma14="http://schemas.microsoft.com/office/mac/drawingml/2011/main" xmlns="" val="1"/>
+              <ma14:wrappingTextBoxFlag xmlns="" xmlns:ma14="http://schemas.microsoft.com/office/mac/drawingml/2011/main" val="1"/>
             </a:ext>
           </a:extLst>
         </p:spPr>
@@ -6058,7 +6058,7 @@
           </a:effectLst>
           <a:extLst>
             <a:ext uri="{C572A759-6A51-4108-AA02-DFA0A04FC94B}">
-              <ma14:wrappingTextBoxFlag xmlns:ma14="http://schemas.microsoft.com/office/mac/drawingml/2011/main" xmlns="" val="1"/>
+              <ma14:wrappingTextBoxFlag xmlns="" xmlns:ma14="http://schemas.microsoft.com/office/mac/drawingml/2011/main" val="1"/>
             </a:ext>
           </a:extLst>
         </p:spPr>
@@ -6109,7 +6109,7 @@
           </a:effectLst>
           <a:extLst>
             <a:ext uri="{C572A759-6A51-4108-AA02-DFA0A04FC94B}">
-              <ma14:wrappingTextBoxFlag xmlns:ma14="http://schemas.microsoft.com/office/mac/drawingml/2011/main" xmlns="" val="1"/>
+              <ma14:wrappingTextBoxFlag xmlns="" xmlns:ma14="http://schemas.microsoft.com/office/mac/drawingml/2011/main" val="1"/>
             </a:ext>
           </a:extLst>
         </p:spPr>
@@ -6164,7 +6164,7 @@
           </a:effectLst>
           <a:extLst>
             <a:ext uri="{C572A759-6A51-4108-AA02-DFA0A04FC94B}">
-              <ma14:wrappingTextBoxFlag xmlns:ma14="http://schemas.microsoft.com/office/mac/drawingml/2011/main" xmlns="" val="1"/>
+              <ma14:wrappingTextBoxFlag xmlns="" xmlns:ma14="http://schemas.microsoft.com/office/mac/drawingml/2011/main" val="1"/>
             </a:ext>
           </a:extLst>
         </p:spPr>
@@ -6219,7 +6219,7 @@
           </a:effectLst>
           <a:extLst>
             <a:ext uri="{C572A759-6A51-4108-AA02-DFA0A04FC94B}">
-              <ma14:wrappingTextBoxFlag xmlns:ma14="http://schemas.microsoft.com/office/mac/drawingml/2011/main" xmlns="" val="1"/>
+              <ma14:wrappingTextBoxFlag xmlns="" xmlns:ma14="http://schemas.microsoft.com/office/mac/drawingml/2011/main" val="1"/>
             </a:ext>
           </a:extLst>
         </p:spPr>
@@ -6274,7 +6274,7 @@
           </a:effectLst>
           <a:extLst>
             <a:ext uri="{C572A759-6A51-4108-AA02-DFA0A04FC94B}">
-              <ma14:wrappingTextBoxFlag xmlns:ma14="http://schemas.microsoft.com/office/mac/drawingml/2011/main" xmlns="" val="1"/>
+              <ma14:wrappingTextBoxFlag xmlns="" xmlns:ma14="http://schemas.microsoft.com/office/mac/drawingml/2011/main" val="1"/>
             </a:ext>
           </a:extLst>
         </p:spPr>
@@ -6329,7 +6329,7 @@
           </a:effectLst>
           <a:extLst>
             <a:ext uri="{C572A759-6A51-4108-AA02-DFA0A04FC94B}">
-              <ma14:wrappingTextBoxFlag xmlns:ma14="http://schemas.microsoft.com/office/mac/drawingml/2011/main" xmlns="" val="1"/>
+              <ma14:wrappingTextBoxFlag xmlns="" xmlns:ma14="http://schemas.microsoft.com/office/mac/drawingml/2011/main" val="1"/>
             </a:ext>
           </a:extLst>
         </p:spPr>
@@ -6384,7 +6384,7 @@
           </a:effectLst>
           <a:extLst>
             <a:ext uri="{C572A759-6A51-4108-AA02-DFA0A04FC94B}">
-              <ma14:wrappingTextBoxFlag xmlns:ma14="http://schemas.microsoft.com/office/mac/drawingml/2011/main" xmlns="" val="1"/>
+              <ma14:wrappingTextBoxFlag xmlns="" xmlns:ma14="http://schemas.microsoft.com/office/mac/drawingml/2011/main" val="1"/>
             </a:ext>
           </a:extLst>
         </p:spPr>
@@ -6435,7 +6435,7 @@
           </a:effectLst>
           <a:extLst>
             <a:ext uri="{C572A759-6A51-4108-AA02-DFA0A04FC94B}">
-              <ma14:wrappingTextBoxFlag xmlns:ma14="http://schemas.microsoft.com/office/mac/drawingml/2011/main" xmlns="" val="1"/>
+              <ma14:wrappingTextBoxFlag xmlns="" xmlns:ma14="http://schemas.microsoft.com/office/mac/drawingml/2011/main" val="1"/>
             </a:ext>
           </a:extLst>
         </p:spPr>
@@ -6490,7 +6490,7 @@
           </a:effectLst>
           <a:extLst>
             <a:ext uri="{C572A759-6A51-4108-AA02-DFA0A04FC94B}">
-              <ma14:wrappingTextBoxFlag xmlns:ma14="http://schemas.microsoft.com/office/mac/drawingml/2011/main" xmlns="" val="1"/>
+              <ma14:wrappingTextBoxFlag xmlns="" xmlns:ma14="http://schemas.microsoft.com/office/mac/drawingml/2011/main" val="1"/>
             </a:ext>
           </a:extLst>
         </p:spPr>
@@ -6544,7 +6544,7 @@
           </a:effectLst>
           <a:extLst>
             <a:ext uri="{C572A759-6A51-4108-AA02-DFA0A04FC94B}">
-              <ma14:wrappingTextBoxFlag xmlns:ma14="http://schemas.microsoft.com/office/mac/drawingml/2011/main" xmlns="" val="1"/>
+              <ma14:wrappingTextBoxFlag xmlns="" xmlns:ma14="http://schemas.microsoft.com/office/mac/drawingml/2011/main" val="1"/>
             </a:ext>
           </a:extLst>
         </p:spPr>
@@ -6595,7 +6595,7 @@
           </a:effectLst>
           <a:extLst>
             <a:ext uri="{C572A759-6A51-4108-AA02-DFA0A04FC94B}">
-              <ma14:wrappingTextBoxFlag xmlns:ma14="http://schemas.microsoft.com/office/mac/drawingml/2011/main" xmlns="" val="1"/>
+              <ma14:wrappingTextBoxFlag xmlns="" xmlns:ma14="http://schemas.microsoft.com/office/mac/drawingml/2011/main" val="1"/>
             </a:ext>
           </a:extLst>
         </p:spPr>
@@ -6646,7 +6646,7 @@
           </a:effectLst>
           <a:extLst>
             <a:ext uri="{C572A759-6A51-4108-AA02-DFA0A04FC94B}">
-              <ma14:wrappingTextBoxFlag xmlns:ma14="http://schemas.microsoft.com/office/mac/drawingml/2011/main" xmlns="" val="1"/>
+              <ma14:wrappingTextBoxFlag xmlns="" xmlns:ma14="http://schemas.microsoft.com/office/mac/drawingml/2011/main" val="1"/>
             </a:ext>
           </a:extLst>
         </p:spPr>
@@ -6701,7 +6701,7 @@
           </a:effectLst>
           <a:extLst>
             <a:ext uri="{C572A759-6A51-4108-AA02-DFA0A04FC94B}">
-              <ma14:wrappingTextBoxFlag xmlns:ma14="http://schemas.microsoft.com/office/mac/drawingml/2011/main" xmlns="" val="1"/>
+              <ma14:wrappingTextBoxFlag xmlns="" xmlns:ma14="http://schemas.microsoft.com/office/mac/drawingml/2011/main" val="1"/>
             </a:ext>
           </a:extLst>
         </p:spPr>
@@ -6756,7 +6756,7 @@
           </a:effectLst>
           <a:extLst>
             <a:ext uri="{C572A759-6A51-4108-AA02-DFA0A04FC94B}">
-              <ma14:wrappingTextBoxFlag xmlns:ma14="http://schemas.microsoft.com/office/mac/drawingml/2011/main" xmlns="" val="1"/>
+              <ma14:wrappingTextBoxFlag xmlns="" xmlns:ma14="http://schemas.microsoft.com/office/mac/drawingml/2011/main" val="1"/>
             </a:ext>
           </a:extLst>
         </p:spPr>
@@ -6811,7 +6811,7 @@
           </a:effectLst>
           <a:extLst>
             <a:ext uri="{C572A759-6A51-4108-AA02-DFA0A04FC94B}">
-              <ma14:wrappingTextBoxFlag xmlns:ma14="http://schemas.microsoft.com/office/mac/drawingml/2011/main" xmlns="" val="1"/>
+              <ma14:wrappingTextBoxFlag xmlns="" xmlns:ma14="http://schemas.microsoft.com/office/mac/drawingml/2011/main" val="1"/>
             </a:ext>
           </a:extLst>
         </p:spPr>
@@ -6865,7 +6865,7 @@
           </a:effectLst>
           <a:extLst>
             <a:ext uri="{C572A759-6A51-4108-AA02-DFA0A04FC94B}">
-              <ma14:wrappingTextBoxFlag xmlns:ma14="http://schemas.microsoft.com/office/mac/drawingml/2011/main" xmlns="" val="1"/>
+              <ma14:wrappingTextBoxFlag xmlns="" xmlns:ma14="http://schemas.microsoft.com/office/mac/drawingml/2011/main" val="1"/>
             </a:ext>
           </a:extLst>
         </p:spPr>
@@ -6934,7 +6934,7 @@
           </a:effectLst>
           <a:extLst>
             <a:ext uri="{C572A759-6A51-4108-AA02-DFA0A04FC94B}">
-              <ma14:wrappingTextBoxFlag xmlns:ma14="http://schemas.microsoft.com/office/mac/drawingml/2011/main" xmlns="" val="1"/>
+              <ma14:wrappingTextBoxFlag xmlns="" xmlns:ma14="http://schemas.microsoft.com/office/mac/drawingml/2011/main" val="1"/>
             </a:ext>
           </a:extLst>
         </p:spPr>
@@ -6992,7 +6992,7 @@
           </a:effectLst>
           <a:extLst>
             <a:ext uri="{C572A759-6A51-4108-AA02-DFA0A04FC94B}">
-              <ma14:wrappingTextBoxFlag xmlns:ma14="http://schemas.microsoft.com/office/mac/drawingml/2011/main" xmlns="" val="1"/>
+              <ma14:wrappingTextBoxFlag xmlns="" xmlns:ma14="http://schemas.microsoft.com/office/mac/drawingml/2011/main" val="1"/>
             </a:ext>
           </a:extLst>
         </p:spPr>
@@ -7057,7 +7057,7 @@
           </a:effectLst>
           <a:extLst>
             <a:ext uri="{C572A759-6A51-4108-AA02-DFA0A04FC94B}">
-              <ma14:wrappingTextBoxFlag xmlns:ma14="http://schemas.microsoft.com/office/mac/drawingml/2011/main" xmlns="" val="1"/>
+              <ma14:wrappingTextBoxFlag xmlns="" xmlns:ma14="http://schemas.microsoft.com/office/mac/drawingml/2011/main" val="1"/>
             </a:ext>
           </a:extLst>
         </p:spPr>
@@ -7330,6 +7330,35 @@
           <a:chExt cx="0" cy="0"/>
         </a:xfrm>
       </p:grpSpPr>
+      <p:pic>
+        <p:nvPicPr>
+          <p:cNvPr id="214" name="Pacote Bundle.png"/>
+          <p:cNvPicPr>
+            <a:picLocks noChangeAspect="1"/>
+          </p:cNvPicPr>
+          <p:nvPr/>
+        </p:nvPicPr>
+        <p:blipFill>
+          <a:blip r:embed="rId2">
+            <a:extLst/>
+          </a:blip>
+          <a:stretch>
+            <a:fillRect/>
+          </a:stretch>
+        </p:blipFill>
+        <p:spPr>
+          <a:xfrm>
+            <a:off x="5504358" y="82339"/>
+            <a:ext cx="7500442" cy="9671261"/>
+          </a:xfrm>
+          <a:prstGeom prst="rect">
+            <a:avLst/>
+          </a:prstGeom>
+          <a:ln w="12700">
+            <a:miter lim="400000"/>
+          </a:ln>
+        </p:spPr>
+      </p:pic>
       <p:sp>
         <p:nvSpPr>
           <p:cNvPr id="212" name="Shape 212"/>
@@ -7341,6 +7370,10 @@
           </p:nvPr>
         </p:nvSpPr>
         <p:spPr>
+          <a:xfrm>
+            <a:off x="-2451100" y="0"/>
+            <a:ext cx="11099800" cy="2159000"/>
+          </a:xfrm>
           <a:prstGeom prst="rect">
             <a:avLst/>
           </a:prstGeom>
@@ -7350,8 +7383,10 @@
           <a:lstStyle/>
           <a:p>
             <a:r>
+              <a:rPr dirty="0" err="1"/>
               <a:t>Pacotes</a:t>
             </a:r>
+            <a:endParaRPr dirty="0"/>
           </a:p>
         </p:txBody>
       </p:sp>
@@ -7470,35 +7505,6 @@
           </a:p>
         </p:txBody>
       </p:sp>
-      <p:pic>
-        <p:nvPicPr>
-          <p:cNvPr id="214" name="Pacote Bundle.png"/>
-          <p:cNvPicPr>
-            <a:picLocks noChangeAspect="1"/>
-          </p:cNvPicPr>
-          <p:nvPr/>
-        </p:nvPicPr>
-        <p:blipFill>
-          <a:blip r:embed="rId2">
-            <a:extLst/>
-          </a:blip>
-          <a:stretch>
-            <a:fillRect/>
-          </a:stretch>
-        </p:blipFill>
-        <p:spPr>
-          <a:xfrm>
-            <a:off x="6530032" y="2283668"/>
-            <a:ext cx="5710536" cy="7023147"/>
-          </a:xfrm>
-          <a:prstGeom prst="rect">
-            <a:avLst/>
-          </a:prstGeom>
-          <a:ln w="12700">
-            <a:miter lim="400000"/>
-          </a:ln>
-        </p:spPr>
-      </p:pic>
     </p:spTree>
   </p:cSld>
   <p:clrMapOvr>
@@ -7525,6 +7531,35 @@
           <a:chExt cx="0" cy="0"/>
         </a:xfrm>
       </p:grpSpPr>
+      <p:pic>
+        <p:nvPicPr>
+          <p:cNvPr id="218" name="Diretório Web.png"/>
+          <p:cNvPicPr>
+            <a:picLocks noChangeAspect="1"/>
+          </p:cNvPicPr>
+          <p:nvPr/>
+        </p:nvPicPr>
+        <p:blipFill>
+          <a:blip r:embed="rId2">
+            <a:extLst/>
+          </a:blip>
+          <a:stretch>
+            <a:fillRect/>
+          </a:stretch>
+        </p:blipFill>
+        <p:spPr>
+          <a:xfrm>
+            <a:off x="6337653" y="492135"/>
+            <a:ext cx="6667147" cy="9240183"/>
+          </a:xfrm>
+          <a:prstGeom prst="rect">
+            <a:avLst/>
+          </a:prstGeom>
+          <a:ln w="12700">
+            <a:miter lim="400000"/>
+          </a:ln>
+        </p:spPr>
+      </p:pic>
       <p:sp>
         <p:nvSpPr>
           <p:cNvPr id="216" name="Shape 216"/>
@@ -7536,6 +7571,10 @@
           </p:nvPr>
         </p:nvSpPr>
         <p:spPr>
+          <a:xfrm>
+            <a:off x="-2197100" y="1524000"/>
+            <a:ext cx="11099800" cy="2159000"/>
+          </a:xfrm>
           <a:prstGeom prst="rect">
             <a:avLst/>
           </a:prstGeom>
@@ -7545,7 +7584,12 @@
           <a:lstStyle/>
           <a:p>
             <a:r>
-              <a:t>Diretório Web</a:t>
+              <a:rPr dirty="0" err="1"/>
+              <a:t>Diretório</a:t>
+            </a:r>
+            <a:r>
+              <a:rPr dirty="0"/>
+              <a:t> Web</a:t>
             </a:r>
           </a:p>
         </p:txBody>
@@ -7575,35 +7619,6 @@
           </a:p>
         </p:txBody>
       </p:sp>
-      <p:pic>
-        <p:nvPicPr>
-          <p:cNvPr id="218" name="Diretório Web.png"/>
-          <p:cNvPicPr>
-            <a:picLocks noChangeAspect="1"/>
-          </p:cNvPicPr>
-          <p:nvPr/>
-        </p:nvPicPr>
-        <p:blipFill>
-          <a:blip r:embed="rId2">
-            <a:extLst/>
-          </a:blip>
-          <a:stretch>
-            <a:fillRect/>
-          </a:stretch>
-        </p:blipFill>
-        <p:spPr>
-          <a:xfrm>
-            <a:off x="7122678" y="2561188"/>
-            <a:ext cx="5174246" cy="7171130"/>
-          </a:xfrm>
-          <a:prstGeom prst="rect">
-            <a:avLst/>
-          </a:prstGeom>
-          <a:ln w="12700">
-            <a:miter lim="400000"/>
-          </a:ln>
-        </p:spPr>
-      </p:pic>
     </p:spTree>
   </p:cSld>
   <p:clrMapOvr>

</xml_diff>